<commit_message>
Se cambia nombre de archivo. Se actualiza diagrama de bloques
</commit_message>
<xml_diff>
--- a/Desarrollo/PythonScripts/bloques.pptx
+++ b/Desarrollo/PythonScripts/bloques.pptx
@@ -261,7 +261,7 @@
           <a:p>
             <a:fld id="{9846D6DE-BF85-4A33-B9EA-55968A0DA751}" type="datetimeFigureOut">
               <a:rPr lang="es-UY" smtClean="0"/>
-              <a:t>28/2/2023</a:t>
+              <a:t>1/3/2023</a:t>
             </a:fld>
             <a:endParaRPr lang="es-UY"/>
           </a:p>
@@ -461,7 +461,7 @@
           <a:p>
             <a:fld id="{9846D6DE-BF85-4A33-B9EA-55968A0DA751}" type="datetimeFigureOut">
               <a:rPr lang="es-UY" smtClean="0"/>
-              <a:t>28/2/2023</a:t>
+              <a:t>1/3/2023</a:t>
             </a:fld>
             <a:endParaRPr lang="es-UY"/>
           </a:p>
@@ -671,7 +671,7 @@
           <a:p>
             <a:fld id="{9846D6DE-BF85-4A33-B9EA-55968A0DA751}" type="datetimeFigureOut">
               <a:rPr lang="es-UY" smtClean="0"/>
-              <a:t>28/2/2023</a:t>
+              <a:t>1/3/2023</a:t>
             </a:fld>
             <a:endParaRPr lang="es-UY"/>
           </a:p>
@@ -871,7 +871,7 @@
           <a:p>
             <a:fld id="{9846D6DE-BF85-4A33-B9EA-55968A0DA751}" type="datetimeFigureOut">
               <a:rPr lang="es-UY" smtClean="0"/>
-              <a:t>28/2/2023</a:t>
+              <a:t>1/3/2023</a:t>
             </a:fld>
             <a:endParaRPr lang="es-UY"/>
           </a:p>
@@ -1147,7 +1147,7 @@
           <a:p>
             <a:fld id="{9846D6DE-BF85-4A33-B9EA-55968A0DA751}" type="datetimeFigureOut">
               <a:rPr lang="es-UY" smtClean="0"/>
-              <a:t>28/2/2023</a:t>
+              <a:t>1/3/2023</a:t>
             </a:fld>
             <a:endParaRPr lang="es-UY"/>
           </a:p>
@@ -1415,7 +1415,7 @@
           <a:p>
             <a:fld id="{9846D6DE-BF85-4A33-B9EA-55968A0DA751}" type="datetimeFigureOut">
               <a:rPr lang="es-UY" smtClean="0"/>
-              <a:t>28/2/2023</a:t>
+              <a:t>1/3/2023</a:t>
             </a:fld>
             <a:endParaRPr lang="es-UY"/>
           </a:p>
@@ -1830,7 +1830,7 @@
           <a:p>
             <a:fld id="{9846D6DE-BF85-4A33-B9EA-55968A0DA751}" type="datetimeFigureOut">
               <a:rPr lang="es-UY" smtClean="0"/>
-              <a:t>28/2/2023</a:t>
+              <a:t>1/3/2023</a:t>
             </a:fld>
             <a:endParaRPr lang="es-UY"/>
           </a:p>
@@ -1972,7 +1972,7 @@
           <a:p>
             <a:fld id="{9846D6DE-BF85-4A33-B9EA-55968A0DA751}" type="datetimeFigureOut">
               <a:rPr lang="es-UY" smtClean="0"/>
-              <a:t>28/2/2023</a:t>
+              <a:t>1/3/2023</a:t>
             </a:fld>
             <a:endParaRPr lang="es-UY"/>
           </a:p>
@@ -2085,7 +2085,7 @@
           <a:p>
             <a:fld id="{9846D6DE-BF85-4A33-B9EA-55968A0DA751}" type="datetimeFigureOut">
               <a:rPr lang="es-UY" smtClean="0"/>
-              <a:t>28/2/2023</a:t>
+              <a:t>1/3/2023</a:t>
             </a:fld>
             <a:endParaRPr lang="es-UY"/>
           </a:p>
@@ -2398,7 +2398,7 @@
           <a:p>
             <a:fld id="{9846D6DE-BF85-4A33-B9EA-55968A0DA751}" type="datetimeFigureOut">
               <a:rPr lang="es-UY" smtClean="0"/>
-              <a:t>28/2/2023</a:t>
+              <a:t>1/3/2023</a:t>
             </a:fld>
             <a:endParaRPr lang="es-UY"/>
           </a:p>
@@ -2687,7 +2687,7 @@
           <a:p>
             <a:fld id="{9846D6DE-BF85-4A33-B9EA-55968A0DA751}" type="datetimeFigureOut">
               <a:rPr lang="es-UY" smtClean="0"/>
-              <a:t>28/2/2023</a:t>
+              <a:t>1/3/2023</a:t>
             </a:fld>
             <a:endParaRPr lang="es-UY"/>
           </a:p>
@@ -2930,7 +2930,7 @@
           <a:p>
             <a:fld id="{9846D6DE-BF85-4A33-B9EA-55968A0DA751}" type="datetimeFigureOut">
               <a:rPr lang="es-UY" smtClean="0"/>
-              <a:t>28/2/2023</a:t>
+              <a:t>1/3/2023</a:t>
             </a:fld>
             <a:endParaRPr lang="es-UY"/>
           </a:p>
@@ -3519,7 +3519,7 @@
         </p:nvSpPr>
         <p:spPr>
           <a:xfrm>
-            <a:off x="3968308" y="4182534"/>
+            <a:off x="3993532" y="4182534"/>
             <a:ext cx="3494381" cy="2023533"/>
           </a:xfrm>
           <a:prstGeom prst="rect">
@@ -3565,7 +3565,7 @@
           <a:lstStyle/>
           <a:p>
             <a:pPr algn="ctr"/>
-            <a:endParaRPr lang="es-UY" sz="1600"/>
+            <a:endParaRPr lang="es-UY" sz="1600" dirty="0"/>
           </a:p>
         </p:txBody>
       </p:sp>
@@ -3583,8 +3583,8 @@
         </p:nvSpPr>
         <p:spPr>
           <a:xfrm>
-            <a:off x="4537931" y="4312679"/>
-            <a:ext cx="2355132" cy="369332"/>
+            <a:off x="4895402" y="4312679"/>
+            <a:ext cx="1640194" cy="369332"/>
           </a:xfrm>
           <a:prstGeom prst="rect">
             <a:avLst/>
@@ -3599,10 +3599,10 @@
           <a:p>
             <a:pPr algn="ctr"/>
             <a:r>
-              <a:rPr lang="es-AR" dirty="0">
+              <a:rPr lang="es-AR">
                 <a:latin typeface="Berlin Sans FB" panose="020E0602020502020306" pitchFamily="34" charset="0"/>
               </a:rPr>
-              <a:t>Procesamiento de EEG</a:t>
+              <a:t>SignalProcessor</a:t>
             </a:r>
             <a:endParaRPr lang="es-UY" dirty="0">
               <a:latin typeface="Berlin Sans FB" panose="020E0602020502020306" pitchFamily="34" charset="0"/>
@@ -3908,7 +3908,7 @@
         <p:spPr>
           <a:xfrm>
             <a:off x="5715496" y="3547636"/>
-            <a:ext cx="3" cy="634898"/>
+            <a:ext cx="25227" cy="634898"/>
           </a:xfrm>
           <a:prstGeom prst="straightConnector1">
             <a:avLst/>
@@ -4229,7 +4229,7 @@
         <p:spPr>
           <a:xfrm>
             <a:off x="2737874" y="5194301"/>
-            <a:ext cx="1230434" cy="0"/>
+            <a:ext cx="1255658" cy="0"/>
           </a:xfrm>
           <a:prstGeom prst="straightConnector1">
             <a:avLst/>
@@ -4277,8 +4277,8 @@
         </p:nvCxnSpPr>
         <p:spPr>
           <a:xfrm>
-            <a:off x="7462689" y="5194301"/>
-            <a:ext cx="1236864" cy="0"/>
+            <a:off x="7487913" y="5194301"/>
+            <a:ext cx="1211640" cy="0"/>
           </a:xfrm>
           <a:prstGeom prst="straightConnector1">
             <a:avLst/>

</xml_diff>

<commit_message>
Se actualiza nombres de variables. Se actualiza diagrama de bloques.
</commit_message>
<xml_diff>
--- a/Desarrollo/PythonScripts/bloques.pptx
+++ b/Desarrollo/PythonScripts/bloques.pptx
@@ -3362,7 +3362,7 @@
         <p:spPr>
           <a:xfrm>
             <a:off x="214573" y="4182534"/>
-            <a:ext cx="2523301" cy="2023533"/>
+            <a:ext cx="2523301" cy="2396066"/>
           </a:xfrm>
           <a:prstGeom prst="rect">
             <a:avLst/>
@@ -3466,8 +3466,8 @@
         </p:nvSpPr>
         <p:spPr>
           <a:xfrm>
-            <a:off x="464695" y="4783892"/>
-            <a:ext cx="1993897" cy="1323439"/>
+            <a:off x="464695" y="4723937"/>
+            <a:ext cx="1993897" cy="1815882"/>
           </a:xfrm>
           <a:prstGeom prst="rect">
             <a:avLst/>
@@ -3501,7 +3501,26 @@
               <a:rPr lang="es-AR" sz="1600" dirty="0"/>
               <a:t>. Adquisición de EEG. Almacenamiento de EEG</a:t>
             </a:r>
-            <a:endParaRPr lang="es-UY" sz="1600" dirty="0"/>
+          </a:p>
+          <a:p>
+            <a:pPr algn="ctr"/>
+            <a:endParaRPr lang="es-AR" sz="1600" dirty="0"/>
+          </a:p>
+          <a:p>
+            <a:pPr algn="ctr"/>
+            <a:r>
+              <a:rPr lang="es-AR" sz="1600" dirty="0">
+                <a:highlight>
+                  <a:srgbClr val="FFFF00"/>
+                </a:highlight>
+              </a:rPr>
+              <a:t>EEGLogger.py</a:t>
+            </a:r>
+            <a:endParaRPr lang="es-UY" sz="1600" dirty="0">
+              <a:highlight>
+                <a:srgbClr val="FFFF00"/>
+              </a:highlight>
+            </a:endParaRPr>
           </a:p>
         </p:txBody>
       </p:sp>
@@ -3520,7 +3539,7 @@
         <p:spPr>
           <a:xfrm>
             <a:off x="3993532" y="4182534"/>
-            <a:ext cx="3494381" cy="2023533"/>
+            <a:ext cx="3494381" cy="2396066"/>
           </a:xfrm>
           <a:prstGeom prst="rect">
             <a:avLst/>
@@ -3624,8 +3643,8 @@
         </p:nvSpPr>
         <p:spPr>
           <a:xfrm>
-            <a:off x="4247589" y="5164668"/>
-            <a:ext cx="2935818" cy="861774"/>
+            <a:off x="4256126" y="4691932"/>
+            <a:ext cx="2935818" cy="1815882"/>
           </a:xfrm>
           <a:prstGeom prst="rect">
             <a:avLst/>
@@ -3646,200 +3665,273 @@
           </a:bodyPr>
           <a:lstStyle/>
           <a:p>
-            <a:pPr algn="ctr"/>
-            <a:r>
-              <a:rPr lang="es-AR" sz="1600" dirty="0"/>
-              <a:t>Filtrado</a:t>
-            </a:r>
-          </a:p>
-          <a:p>
-            <a:pPr algn="ctr"/>
-            <a:r>
-              <a:rPr lang="es-AR" sz="1600" dirty="0"/>
-              <a:t>Extracción de características</a:t>
-            </a:r>
-          </a:p>
-          <a:p>
-            <a:pPr algn="ctr"/>
-            <a:r>
-              <a:rPr lang="es-AR" sz="1600" dirty="0"/>
-              <a:t>Clasificación</a:t>
-            </a:r>
-            <a:endParaRPr lang="es-UY" sz="1600" dirty="0"/>
-          </a:p>
-        </p:txBody>
-      </p:sp>
-      <p:grpSp>
-        <p:nvGrpSpPr>
-          <p:cNvPr id="82" name="Group 81">
-            <a:extLst>
-              <a:ext uri="{FF2B5EF4-FFF2-40B4-BE49-F238E27FC236}">
-                <a16:creationId xmlns:a16="http://schemas.microsoft.com/office/drawing/2014/main" id="{F8CBF6B9-8A73-491D-A9DE-285CEA95980F}"/>
-              </a:ext>
-            </a:extLst>
-          </p:cNvPr>
-          <p:cNvGrpSpPr/>
+            <a:pPr marL="285750" indent="-285750" algn="ctr">
+              <a:buFont typeface="Arial" panose="020B0604020202020204" pitchFamily="34" charset="0"/>
+              <a:buChar char="•"/>
+            </a:pPr>
+            <a:r>
+              <a:rPr lang="es-AR" sz="1400" dirty="0"/>
+              <a:t>Filtrado con </a:t>
+            </a:r>
+            <a:r>
+              <a:rPr lang="es-AR" sz="1400" dirty="0">
+                <a:highlight>
+                  <a:srgbClr val="FFFF00"/>
+                </a:highlight>
+              </a:rPr>
+              <a:t>Filter.py</a:t>
+            </a:r>
+          </a:p>
+          <a:p>
+            <a:pPr marL="285750" indent="-285750" algn="ctr">
+              <a:buFont typeface="Arial" panose="020B0604020202020204" pitchFamily="34" charset="0"/>
+              <a:buChar char="•"/>
+            </a:pPr>
+            <a:r>
+              <a:rPr lang="es-AR" sz="1400" dirty="0"/>
+              <a:t>Extracción de características con </a:t>
+            </a:r>
+            <a:r>
+              <a:rPr lang="es-AR" sz="1400" dirty="0">
+                <a:highlight>
+                  <a:srgbClr val="FFFF00"/>
+                </a:highlight>
+              </a:rPr>
+              <a:t>FeatureExtractor.py</a:t>
+            </a:r>
+          </a:p>
+          <a:p>
+            <a:pPr marL="285750" indent="-285750" algn="ctr">
+              <a:buFont typeface="Arial" panose="020B0604020202020204" pitchFamily="34" charset="0"/>
+              <a:buChar char="•"/>
+            </a:pPr>
+            <a:r>
+              <a:rPr lang="es-AR" sz="1400" dirty="0"/>
+              <a:t>Clasificación </a:t>
+            </a:r>
+            <a:r>
+              <a:rPr lang="es-AR" sz="1400" dirty="0" err="1"/>
+              <a:t>onlnie</a:t>
+            </a:r>
+            <a:r>
+              <a:rPr lang="es-AR" sz="1400" dirty="0"/>
+              <a:t> con </a:t>
+            </a:r>
+            <a:r>
+              <a:rPr lang="es-AR" sz="1400" dirty="0">
+                <a:highlight>
+                  <a:srgbClr val="FFFF00"/>
+                </a:highlight>
+              </a:rPr>
+              <a:t>Classifier.py</a:t>
+            </a:r>
+          </a:p>
+          <a:p>
+            <a:pPr marL="285750" indent="-285750" algn="ctr">
+              <a:buFont typeface="Arial" panose="020B0604020202020204" pitchFamily="34" charset="0"/>
+              <a:buChar char="•"/>
+            </a:pPr>
+            <a:r>
+              <a:rPr lang="es-AR" sz="1400" dirty="0"/>
+              <a:t>Entrenamiento de diferentes clasificadores (</a:t>
+            </a:r>
+            <a:r>
+              <a:rPr lang="es-AR" sz="1400" dirty="0" err="1">
+                <a:highlight>
+                  <a:srgbClr val="FFFF00"/>
+                </a:highlight>
+              </a:rPr>
+              <a:t>SVMClassifier</a:t>
+            </a:r>
+            <a:r>
+              <a:rPr lang="es-AR" sz="1400" dirty="0"/>
+              <a:t>, </a:t>
+            </a:r>
+            <a:r>
+              <a:rPr lang="es-AR" sz="1400" dirty="0" err="1">
+                <a:highlight>
+                  <a:srgbClr val="FFFF00"/>
+                </a:highlight>
+              </a:rPr>
+              <a:t>NeuralNetworkClassifier</a:t>
+            </a:r>
+            <a:r>
+              <a:rPr lang="es-AR" sz="1400" dirty="0"/>
+              <a:t>, etc.)</a:t>
+            </a:r>
+            <a:endParaRPr lang="es-UY" sz="1400" dirty="0"/>
+          </a:p>
+        </p:txBody>
+      </p:sp>
+      <p:sp>
+        <p:nvSpPr>
+          <p:cNvPr id="15" name="Rectangle 14">
+            <a:extLst>
+              <a:ext uri="{FF2B5EF4-FFF2-40B4-BE49-F238E27FC236}">
+                <a16:creationId xmlns:a16="http://schemas.microsoft.com/office/drawing/2014/main" id="{B3787F86-EB79-4CE8-960E-0642D1C2A583}"/>
+              </a:ext>
+            </a:extLst>
+          </p:cNvPr>
+          <p:cNvSpPr/>
           <p:nvPr/>
-        </p:nvGrpSpPr>
-        <p:grpSpPr>
+        </p:nvSpPr>
+        <p:spPr>
           <a:xfrm>
             <a:off x="8699553" y="4182534"/>
-            <a:ext cx="2523301" cy="2023533"/>
-            <a:chOff x="8622969" y="3107267"/>
-            <a:chExt cx="2523301" cy="2023533"/>
-          </a:xfrm>
-        </p:grpSpPr>
-        <p:sp>
-          <p:nvSpPr>
-            <p:cNvPr id="15" name="Rectangle 14">
-              <a:extLst>
-                <a:ext uri="{FF2B5EF4-FFF2-40B4-BE49-F238E27FC236}">
-                  <a16:creationId xmlns:a16="http://schemas.microsoft.com/office/drawing/2014/main" id="{B3787F86-EB79-4CE8-960E-0642D1C2A583}"/>
-                </a:ext>
-              </a:extLst>
-            </p:cNvPr>
-            <p:cNvSpPr/>
-            <p:nvPr/>
-          </p:nvSpPr>
-          <p:spPr>
-            <a:xfrm>
-              <a:off x="8622969" y="3107267"/>
-              <a:ext cx="2523301" cy="2023533"/>
-            </a:xfrm>
-            <a:prstGeom prst="rect">
-              <a:avLst/>
-            </a:prstGeom>
+            <a:ext cx="2523301" cy="2396066"/>
+          </a:xfrm>
+          <a:prstGeom prst="rect">
+            <a:avLst/>
+          </a:prstGeom>
+          <a:solidFill>
+            <a:schemeClr val="bg1">
+              <a:lumMod val="75000"/>
+            </a:schemeClr>
+          </a:solidFill>
+          <a:ln>
             <a:solidFill>
-              <a:schemeClr val="bg1">
+              <a:schemeClr val="tx1">
                 <a:lumMod val="75000"/>
+                <a:lumOff val="25000"/>
               </a:schemeClr>
             </a:solidFill>
-            <a:ln>
-              <a:solidFill>
-                <a:schemeClr val="tx1">
-                  <a:lumMod val="75000"/>
-                  <a:lumOff val="25000"/>
-                </a:schemeClr>
-              </a:solidFill>
-            </a:ln>
-          </p:spPr>
-          <p:style>
-            <a:lnRef idx="2">
-              <a:schemeClr val="accent1">
-                <a:shade val="50000"/>
-              </a:schemeClr>
-            </a:lnRef>
-            <a:fillRef idx="1">
-              <a:schemeClr val="accent1"/>
-            </a:fillRef>
-            <a:effectRef idx="0">
-              <a:schemeClr val="accent1"/>
-            </a:effectRef>
-            <a:fontRef idx="minor">
-              <a:schemeClr val="lt1"/>
-            </a:fontRef>
-          </p:style>
-          <p:txBody>
-            <a:bodyPr rot="0" spcFirstLastPara="0" vertOverflow="overflow" horzOverflow="overflow" vert="horz" wrap="square" lIns="91440" tIns="45720" rIns="91440" bIns="45720" numCol="1" spcCol="0" rtlCol="0" fromWordArt="0" anchor="ctr" anchorCtr="0" forceAA="0" compatLnSpc="1">
-              <a:prstTxWarp prst="textNoShape">
-                <a:avLst/>
-              </a:prstTxWarp>
-              <a:noAutofit/>
-            </a:bodyPr>
-            <a:lstStyle/>
-            <a:p>
-              <a:pPr algn="ctr"/>
-              <a:endParaRPr lang="es-UY"/>
-            </a:p>
-          </p:txBody>
-        </p:sp>
-        <p:sp>
-          <p:nvSpPr>
-            <p:cNvPr id="16" name="TextBox 15">
-              <a:extLst>
-                <a:ext uri="{FF2B5EF4-FFF2-40B4-BE49-F238E27FC236}">
-                  <a16:creationId xmlns:a16="http://schemas.microsoft.com/office/drawing/2014/main" id="{ABE21E4B-57B2-4785-882B-ECB165E4750C}"/>
-                </a:ext>
-              </a:extLst>
-            </p:cNvPr>
-            <p:cNvSpPr txBox="1"/>
-            <p:nvPr/>
-          </p:nvSpPr>
-          <p:spPr>
-            <a:xfrm>
-              <a:off x="9302899" y="3237412"/>
-              <a:ext cx="1152880" cy="369332"/>
-            </a:xfrm>
-            <a:prstGeom prst="rect">
+          </a:ln>
+        </p:spPr>
+        <p:style>
+          <a:lnRef idx="2">
+            <a:schemeClr val="accent1">
+              <a:shade val="50000"/>
+            </a:schemeClr>
+          </a:lnRef>
+          <a:fillRef idx="1">
+            <a:schemeClr val="accent1"/>
+          </a:fillRef>
+          <a:effectRef idx="0">
+            <a:schemeClr val="accent1"/>
+          </a:effectRef>
+          <a:fontRef idx="minor">
+            <a:schemeClr val="lt1"/>
+          </a:fontRef>
+        </p:style>
+        <p:txBody>
+          <a:bodyPr rot="0" spcFirstLastPara="0" vertOverflow="overflow" horzOverflow="overflow" vert="horz" wrap="square" lIns="91440" tIns="45720" rIns="91440" bIns="45720" numCol="1" spcCol="0" rtlCol="0" fromWordArt="0" anchor="ctr" anchorCtr="0" forceAA="0" compatLnSpc="1">
+            <a:prstTxWarp prst="textNoShape">
               <a:avLst/>
-            </a:prstGeom>
-            <a:noFill/>
-          </p:spPr>
-          <p:txBody>
-            <a:bodyPr wrap="none" rtlCol="0">
-              <a:spAutoFit/>
-            </a:bodyPr>
-            <a:lstStyle/>
-            <a:p>
-              <a:pPr algn="ctr"/>
-              <a:r>
-                <a:rPr lang="es-AR" dirty="0">
-                  <a:latin typeface="Berlin Sans FB" panose="020E0602020502020306" pitchFamily="34" charset="0"/>
-                </a:rPr>
-                <a:t>Mensajero</a:t>
-              </a:r>
-              <a:endParaRPr lang="es-UY" dirty="0">
+            </a:prstTxWarp>
+            <a:noAutofit/>
+          </a:bodyPr>
+          <a:lstStyle/>
+          <a:p>
+            <a:pPr algn="ctr"/>
+            <a:endParaRPr lang="es-UY" dirty="0"/>
+          </a:p>
+        </p:txBody>
+      </p:sp>
+      <p:sp>
+        <p:nvSpPr>
+          <p:cNvPr id="16" name="TextBox 15">
+            <a:extLst>
+              <a:ext uri="{FF2B5EF4-FFF2-40B4-BE49-F238E27FC236}">
+                <a16:creationId xmlns:a16="http://schemas.microsoft.com/office/drawing/2014/main" id="{ABE21E4B-57B2-4785-882B-ECB165E4750C}"/>
+              </a:ext>
+            </a:extLst>
+          </p:cNvPr>
+          <p:cNvSpPr txBox="1"/>
+          <p:nvPr/>
+        </p:nvSpPr>
+        <p:spPr>
+          <a:xfrm>
+            <a:off x="9378683" y="4312679"/>
+            <a:ext cx="1154483" cy="369332"/>
+          </a:xfrm>
+          <a:prstGeom prst="rect">
+            <a:avLst/>
+          </a:prstGeom>
+          <a:noFill/>
+        </p:spPr>
+        <p:txBody>
+          <a:bodyPr wrap="none" rtlCol="0">
+            <a:spAutoFit/>
+          </a:bodyPr>
+          <a:lstStyle/>
+          <a:p>
+            <a:pPr algn="ctr"/>
+            <a:r>
+              <a:rPr lang="es-AR" dirty="0">
                 <a:latin typeface="Berlin Sans FB" panose="020E0602020502020306" pitchFamily="34" charset="0"/>
-              </a:endParaRPr>
-            </a:p>
-          </p:txBody>
-        </p:sp>
-        <p:sp>
-          <p:nvSpPr>
-            <p:cNvPr id="17" name="TextBox 16">
-              <a:extLst>
-                <a:ext uri="{FF2B5EF4-FFF2-40B4-BE49-F238E27FC236}">
-                  <a16:creationId xmlns:a16="http://schemas.microsoft.com/office/drawing/2014/main" id="{DCCA1567-6E36-4C80-B9CD-D87E277126BD}"/>
-                </a:ext>
-              </a:extLst>
-            </p:cNvPr>
-            <p:cNvSpPr txBox="1"/>
-            <p:nvPr/>
-          </p:nvSpPr>
-          <p:spPr>
-            <a:xfrm>
-              <a:off x="8882390" y="3809199"/>
-              <a:ext cx="1993897" cy="1077218"/>
-            </a:xfrm>
-            <a:prstGeom prst="rect">
-              <a:avLst/>
-            </a:prstGeom>
+              </a:rPr>
+              <a:t>Messenger</a:t>
+            </a:r>
+            <a:endParaRPr lang="es-UY" dirty="0">
+              <a:latin typeface="Berlin Sans FB" panose="020E0602020502020306" pitchFamily="34" charset="0"/>
+            </a:endParaRPr>
+          </a:p>
+        </p:txBody>
+      </p:sp>
+      <p:sp>
+        <p:nvSpPr>
+          <p:cNvPr id="17" name="TextBox 16">
+            <a:extLst>
+              <a:ext uri="{FF2B5EF4-FFF2-40B4-BE49-F238E27FC236}">
+                <a16:creationId xmlns:a16="http://schemas.microsoft.com/office/drawing/2014/main" id="{DCCA1567-6E36-4C80-B9CD-D87E277126BD}"/>
+              </a:ext>
+            </a:extLst>
+          </p:cNvPr>
+          <p:cNvSpPr txBox="1"/>
+          <p:nvPr/>
+        </p:nvSpPr>
+        <p:spPr>
+          <a:xfrm>
+            <a:off x="8958974" y="4884466"/>
+            <a:ext cx="1993897" cy="1569660"/>
+          </a:xfrm>
+          <a:prstGeom prst="rect">
+            <a:avLst/>
+          </a:prstGeom>
+          <a:solidFill>
+            <a:schemeClr val="bg1"/>
+          </a:solidFill>
+          <a:ln>
             <a:solidFill>
-              <a:schemeClr val="bg1"/>
+              <a:srgbClr val="002060"/>
             </a:solidFill>
-            <a:ln>
-              <a:solidFill>
-                <a:srgbClr val="002060"/>
-              </a:solidFill>
-              <a:prstDash val="dash"/>
-            </a:ln>
-          </p:spPr>
-          <p:txBody>
-            <a:bodyPr wrap="square" rtlCol="0">
-              <a:spAutoFit/>
-            </a:bodyPr>
-            <a:lstStyle/>
-            <a:p>
-              <a:pPr algn="ctr"/>
-              <a:r>
-                <a:rPr lang="es-AR" sz="1600" dirty="0"/>
-                <a:t>Envía comandos y recibe mensajes desde los dispositivos a controlar/comandar</a:t>
-              </a:r>
-              <a:endParaRPr lang="es-UY" sz="1600" dirty="0"/>
-            </a:p>
-          </p:txBody>
-        </p:sp>
-      </p:grpSp>
+            <a:prstDash val="dash"/>
+          </a:ln>
+        </p:spPr>
+        <p:txBody>
+          <a:bodyPr wrap="square" rtlCol="0">
+            <a:spAutoFit/>
+          </a:bodyPr>
+          <a:lstStyle/>
+          <a:p>
+            <a:pPr algn="ctr"/>
+            <a:r>
+              <a:rPr lang="es-AR" sz="1600" dirty="0"/>
+              <a:t>Envía comandos y recibe mensajes desde los dispositivos a controlar/comandar</a:t>
+            </a:r>
+          </a:p>
+          <a:p>
+            <a:pPr algn="ctr"/>
+            <a:endParaRPr lang="es-AR" sz="1600" dirty="0"/>
+          </a:p>
+          <a:p>
+            <a:pPr algn="ctr"/>
+            <a:r>
+              <a:rPr lang="es-AR" sz="1600" dirty="0">
+                <a:highlight>
+                  <a:srgbClr val="FFFF00"/>
+                </a:highlight>
+              </a:rPr>
+              <a:t>Messenger.py</a:t>
+            </a:r>
+            <a:endParaRPr lang="es-UY" sz="1600" dirty="0">
+              <a:highlight>
+                <a:srgbClr val="FFFF00"/>
+              </a:highlight>
+            </a:endParaRPr>
+          </a:p>
+        </p:txBody>
+      </p:sp>
       <p:cxnSp>
         <p:nvCxnSpPr>
           <p:cNvPr id="19" name="Straight Arrow Connector 18">
@@ -4153,62 +4245,6 @@
             </a:p>
           </p:txBody>
         </p:sp>
-        <p:sp>
-          <p:nvSpPr>
-            <p:cNvPr id="42" name="TextBox 41">
-              <a:extLst>
-                <a:ext uri="{FF2B5EF4-FFF2-40B4-BE49-F238E27FC236}">
-                  <a16:creationId xmlns:a16="http://schemas.microsoft.com/office/drawing/2014/main" id="{D5A83B5A-E2E5-437A-A6F6-C0661408A226}"/>
-                </a:ext>
-              </a:extLst>
-            </p:cNvPr>
-            <p:cNvSpPr txBox="1"/>
-            <p:nvPr/>
-          </p:nvSpPr>
-          <p:spPr>
-            <a:xfrm>
-              <a:off x="306390" y="2401934"/>
-              <a:ext cx="2559588" cy="769441"/>
-            </a:xfrm>
-            <a:prstGeom prst="rect">
-              <a:avLst/>
-            </a:prstGeom>
-            <a:solidFill>
-              <a:schemeClr val="accent3">
-                <a:lumMod val="50000"/>
-              </a:schemeClr>
-            </a:solidFill>
-            <a:ln>
-              <a:solidFill>
-                <a:schemeClr val="tx1">
-                  <a:lumMod val="75000"/>
-                  <a:lumOff val="25000"/>
-                </a:schemeClr>
-              </a:solidFill>
-            </a:ln>
-          </p:spPr>
-          <p:txBody>
-            <a:bodyPr wrap="square" rtlCol="0">
-              <a:spAutoFit/>
-            </a:bodyPr>
-            <a:lstStyle/>
-            <a:p>
-              <a:r>
-                <a:rPr lang="es-AR" sz="1100" dirty="0">
-                  <a:solidFill>
-                    <a:schemeClr val="bg1"/>
-                  </a:solidFill>
-                </a:rPr>
-                <a:t>En la primera versión, la configuración del sistema se hará desde un archivo. Se evaluará generar una GUI posteriormente.</a:t>
-              </a:r>
-              <a:endParaRPr lang="es-UY" sz="1100" dirty="0">
-                <a:solidFill>
-                  <a:schemeClr val="bg1"/>
-                </a:solidFill>
-              </a:endParaRPr>
-            </a:p>
-          </p:txBody>
-        </p:sp>
       </p:grpSp>
       <p:cxnSp>
         <p:nvCxnSpPr>
@@ -4228,7 +4264,7 @@
         </p:nvCxnSpPr>
         <p:spPr>
           <a:xfrm>
-            <a:off x="2737874" y="5194301"/>
+            <a:off x="2737874" y="5380567"/>
             <a:ext cx="1255658" cy="0"/>
           </a:xfrm>
           <a:prstGeom prst="straightConnector1">
@@ -4277,7 +4313,7 @@
         </p:nvCxnSpPr>
         <p:spPr>
           <a:xfrm>
-            <a:off x="7487913" y="5194301"/>
+            <a:off x="7487913" y="5380567"/>
             <a:ext cx="1211640" cy="0"/>
           </a:xfrm>
           <a:prstGeom prst="straightConnector1">
@@ -4325,8 +4361,8 @@
         </p:nvCxnSpPr>
         <p:spPr>
           <a:xfrm>
-            <a:off x="11222854" y="5194301"/>
-            <a:ext cx="754573" cy="0"/>
+            <a:off x="11222854" y="5380567"/>
+            <a:ext cx="825213" cy="0"/>
           </a:xfrm>
           <a:prstGeom prst="straightConnector1">
             <a:avLst/>
@@ -4370,7 +4406,7 @@
         </p:nvSpPr>
         <p:spPr>
           <a:xfrm>
-            <a:off x="2840936" y="4681808"/>
+            <a:off x="2840936" y="4848654"/>
             <a:ext cx="851580" cy="461665"/>
           </a:xfrm>
           <a:prstGeom prst="rect">
@@ -4414,7 +4450,7 @@
         </p:nvSpPr>
         <p:spPr>
           <a:xfrm>
-            <a:off x="2789639" y="5317541"/>
+            <a:off x="2789639" y="5484387"/>
             <a:ext cx="954173" cy="276999"/>
           </a:xfrm>
           <a:prstGeom prst="rect">
@@ -4451,7 +4487,7 @@
         </p:nvSpPr>
         <p:spPr>
           <a:xfrm>
-            <a:off x="7547673" y="4681807"/>
+            <a:off x="7547673" y="4848653"/>
             <a:ext cx="1066895" cy="461665"/>
           </a:xfrm>
           <a:prstGeom prst="rect">
@@ -4488,7 +4524,7 @@
         </p:nvSpPr>
         <p:spPr>
           <a:xfrm>
-            <a:off x="7604034" y="5317541"/>
+            <a:off x="7604034" y="5484387"/>
             <a:ext cx="954173" cy="276999"/>
           </a:xfrm>
           <a:prstGeom prst="rect">
@@ -4563,7 +4599,7 @@
         <p:spPr>
           <a:xfrm>
             <a:off x="137989" y="258132"/>
-            <a:ext cx="3855543" cy="369332"/>
+            <a:ext cx="3781805" cy="369332"/>
           </a:xfrm>
           <a:prstGeom prst="rect">
             <a:avLst/>
@@ -4580,7 +4616,7 @@
               <a:rPr lang="es-AR" dirty="0">
                 <a:latin typeface="Berlin Sans FB" panose="020E0602020502020306" pitchFamily="34" charset="0"/>
               </a:rPr>
-              <a:t>Diagrama de bloques para BCI – V2.0</a:t>
+              <a:t>Diagrama de bloques para BCI – V1.3</a:t>
             </a:r>
             <a:endParaRPr lang="es-UY" dirty="0">
               <a:latin typeface="Berlin Sans FB" panose="020E0602020502020306" pitchFamily="34" charset="0"/>
@@ -4602,7 +4638,7 @@
         </p:nvSpPr>
         <p:spPr>
           <a:xfrm>
-            <a:off x="11125105" y="4471685"/>
+            <a:off x="11125105" y="4638531"/>
             <a:ext cx="1066895" cy="646331"/>
           </a:xfrm>
           <a:prstGeom prst="rect">
@@ -4703,8 +4739,8 @@
         </p:nvSpPr>
         <p:spPr>
           <a:xfrm>
-            <a:off x="9129735" y="264830"/>
-            <a:ext cx="1641796" cy="332380"/>
+            <a:off x="9677162" y="264830"/>
+            <a:ext cx="546945" cy="369332"/>
           </a:xfrm>
           <a:prstGeom prst="rect">
             <a:avLst/>
@@ -4722,7 +4758,7 @@
               <a:rPr lang="es-AR" dirty="0">
                 <a:latin typeface="Berlin Sans FB" panose="020E0602020502020306" pitchFamily="34" charset="0"/>
               </a:rPr>
-              <a:t>Interfaz gráfica</a:t>
+              <a:t>GUI</a:t>
             </a:r>
             <a:endParaRPr lang="es-UY" dirty="0">
               <a:latin typeface="Berlin Sans FB" panose="020E0602020502020306" pitchFamily="34" charset="0"/>
@@ -4838,7 +4874,7 @@
         </p:nvSpPr>
         <p:spPr>
           <a:xfrm>
-            <a:off x="5852572" y="3020629"/>
+            <a:off x="671972" y="3045521"/>
             <a:ext cx="2629669" cy="369332"/>
           </a:xfrm>
           <a:prstGeom prst="rect">
@@ -4883,7 +4919,7 @@
         </p:nvSpPr>
         <p:spPr>
           <a:xfrm>
-            <a:off x="2956646" y="3014869"/>
+            <a:off x="671972" y="2605119"/>
             <a:ext cx="2629669" cy="369332"/>
           </a:xfrm>
           <a:prstGeom prst="rect">

</xml_diff>

<commit_message>
Se implementa una primera versión de FeatureExtractor.py
</commit_message>
<xml_diff>
--- a/Desarrollo/PythonScripts/bloques.pptx
+++ b/Desarrollo/PythonScripts/bloques.pptx
@@ -261,7 +261,7 @@
           <a:p>
             <a:fld id="{9846D6DE-BF85-4A33-B9EA-55968A0DA751}" type="datetimeFigureOut">
               <a:rPr lang="es-UY" smtClean="0"/>
-              <a:t>1/3/2023</a:t>
+              <a:t>2/3/2023</a:t>
             </a:fld>
             <a:endParaRPr lang="es-UY"/>
           </a:p>
@@ -461,7 +461,7 @@
           <a:p>
             <a:fld id="{9846D6DE-BF85-4A33-B9EA-55968A0DA751}" type="datetimeFigureOut">
               <a:rPr lang="es-UY" smtClean="0"/>
-              <a:t>1/3/2023</a:t>
+              <a:t>2/3/2023</a:t>
             </a:fld>
             <a:endParaRPr lang="es-UY"/>
           </a:p>
@@ -671,7 +671,7 @@
           <a:p>
             <a:fld id="{9846D6DE-BF85-4A33-B9EA-55968A0DA751}" type="datetimeFigureOut">
               <a:rPr lang="es-UY" smtClean="0"/>
-              <a:t>1/3/2023</a:t>
+              <a:t>2/3/2023</a:t>
             </a:fld>
             <a:endParaRPr lang="es-UY"/>
           </a:p>
@@ -871,7 +871,7 @@
           <a:p>
             <a:fld id="{9846D6DE-BF85-4A33-B9EA-55968A0DA751}" type="datetimeFigureOut">
               <a:rPr lang="es-UY" smtClean="0"/>
-              <a:t>1/3/2023</a:t>
+              <a:t>2/3/2023</a:t>
             </a:fld>
             <a:endParaRPr lang="es-UY"/>
           </a:p>
@@ -1147,7 +1147,7 @@
           <a:p>
             <a:fld id="{9846D6DE-BF85-4A33-B9EA-55968A0DA751}" type="datetimeFigureOut">
               <a:rPr lang="es-UY" smtClean="0"/>
-              <a:t>1/3/2023</a:t>
+              <a:t>2/3/2023</a:t>
             </a:fld>
             <a:endParaRPr lang="es-UY"/>
           </a:p>
@@ -1415,7 +1415,7 @@
           <a:p>
             <a:fld id="{9846D6DE-BF85-4A33-B9EA-55968A0DA751}" type="datetimeFigureOut">
               <a:rPr lang="es-UY" smtClean="0"/>
-              <a:t>1/3/2023</a:t>
+              <a:t>2/3/2023</a:t>
             </a:fld>
             <a:endParaRPr lang="es-UY"/>
           </a:p>
@@ -1830,7 +1830,7 @@
           <a:p>
             <a:fld id="{9846D6DE-BF85-4A33-B9EA-55968A0DA751}" type="datetimeFigureOut">
               <a:rPr lang="es-UY" smtClean="0"/>
-              <a:t>1/3/2023</a:t>
+              <a:t>2/3/2023</a:t>
             </a:fld>
             <a:endParaRPr lang="es-UY"/>
           </a:p>
@@ -1972,7 +1972,7 @@
           <a:p>
             <a:fld id="{9846D6DE-BF85-4A33-B9EA-55968A0DA751}" type="datetimeFigureOut">
               <a:rPr lang="es-UY" smtClean="0"/>
-              <a:t>1/3/2023</a:t>
+              <a:t>2/3/2023</a:t>
             </a:fld>
             <a:endParaRPr lang="es-UY"/>
           </a:p>
@@ -2085,7 +2085,7 @@
           <a:p>
             <a:fld id="{9846D6DE-BF85-4A33-B9EA-55968A0DA751}" type="datetimeFigureOut">
               <a:rPr lang="es-UY" smtClean="0"/>
-              <a:t>1/3/2023</a:t>
+              <a:t>2/3/2023</a:t>
             </a:fld>
             <a:endParaRPr lang="es-UY"/>
           </a:p>
@@ -2398,7 +2398,7 @@
           <a:p>
             <a:fld id="{9846D6DE-BF85-4A33-B9EA-55968A0DA751}" type="datetimeFigureOut">
               <a:rPr lang="es-UY" smtClean="0"/>
-              <a:t>1/3/2023</a:t>
+              <a:t>2/3/2023</a:t>
             </a:fld>
             <a:endParaRPr lang="es-UY"/>
           </a:p>
@@ -2687,7 +2687,7 @@
           <a:p>
             <a:fld id="{9846D6DE-BF85-4A33-B9EA-55968A0DA751}" type="datetimeFigureOut">
               <a:rPr lang="es-UY" smtClean="0"/>
-              <a:t>1/3/2023</a:t>
+              <a:t>2/3/2023</a:t>
             </a:fld>
             <a:endParaRPr lang="es-UY"/>
           </a:p>
@@ -2930,7 +2930,7 @@
           <a:p>
             <a:fld id="{9846D6DE-BF85-4A33-B9EA-55968A0DA751}" type="datetimeFigureOut">
               <a:rPr lang="es-UY" smtClean="0"/>
-              <a:t>1/3/2023</a:t>
+              <a:t>2/3/2023</a:t>
             </a:fld>
             <a:endParaRPr lang="es-UY"/>
           </a:p>
@@ -4173,8 +4173,8 @@
           </p:nvSpPr>
           <p:spPr>
             <a:xfrm>
-              <a:off x="4811114" y="2497771"/>
-              <a:ext cx="1537600" cy="400110"/>
+              <a:off x="4915310" y="2497771"/>
+              <a:ext cx="1329210" cy="400110"/>
             </a:xfrm>
             <a:prstGeom prst="rect">
               <a:avLst/>
@@ -4192,7 +4192,7 @@
                 <a:rPr lang="es-AR" sz="2000" dirty="0">
                   <a:latin typeface="Berlin Sans FB" panose="020E0602020502020306" pitchFamily="34" charset="0"/>
                 </a:rPr>
-                <a:t>Core Module</a:t>
+                <a:t>Core Block</a:t>
               </a:r>
               <a:endParaRPr lang="es-UY" sz="2000" dirty="0">
                 <a:latin typeface="Berlin Sans FB" panose="020E0602020502020306" pitchFamily="34" charset="0"/>

</xml_diff>

<commit_message>
Se actualiza diagrama de bloques
</commit_message>
<xml_diff>
--- a/Desarrollo/PythonScripts/bloques.pptx
+++ b/Desarrollo/PythonScripts/bloques.pptx
@@ -2,18 +2,18 @@
 <file path=ppt/presentation.xml><?xml version="1.0" encoding="utf-8"?>
 <p:presentation xmlns:a="http://schemas.openxmlformats.org/drawingml/2006/main" xmlns:r="http://schemas.openxmlformats.org/officeDocument/2006/relationships" xmlns:p="http://schemas.openxmlformats.org/presentationml/2006/main" saveSubsetFonts="1">
   <p:sldMasterIdLst>
-    <p:sldMasterId id="2147483648" r:id="rId1"/>
+    <p:sldMasterId id="2147483684" r:id="rId1"/>
   </p:sldMasterIdLst>
   <p:sldIdLst>
     <p:sldId id="256" r:id="rId2"/>
   </p:sldIdLst>
-  <p:sldSz cx="12192000" cy="6858000"/>
+  <p:sldSz cx="13716000" cy="8229600"/>
   <p:notesSz cx="6858000" cy="9144000"/>
   <p:defaultTextStyle>
     <a:defPPr>
-      <a:defRPr lang="es-UY"/>
+      <a:defRPr lang="en-US"/>
     </a:defPPr>
-    <a:lvl1pPr marL="0" algn="l" defTabSz="914400" rtl="0" eaLnBrk="1" latinLnBrk="0" hangingPunct="1">
+    <a:lvl1pPr marL="0" algn="l" defTabSz="457200" rtl="0" eaLnBrk="1" latinLnBrk="0" hangingPunct="1">
       <a:defRPr sz="1800" kern="1200">
         <a:solidFill>
           <a:schemeClr val="tx1"/>
@@ -23,7 +23,7 @@
         <a:cs typeface="+mn-cs"/>
       </a:defRPr>
     </a:lvl1pPr>
-    <a:lvl2pPr marL="457200" algn="l" defTabSz="914400" rtl="0" eaLnBrk="1" latinLnBrk="0" hangingPunct="1">
+    <a:lvl2pPr marL="457200" algn="l" defTabSz="457200" rtl="0" eaLnBrk="1" latinLnBrk="0" hangingPunct="1">
       <a:defRPr sz="1800" kern="1200">
         <a:solidFill>
           <a:schemeClr val="tx1"/>
@@ -33,7 +33,7 @@
         <a:cs typeface="+mn-cs"/>
       </a:defRPr>
     </a:lvl2pPr>
-    <a:lvl3pPr marL="914400" algn="l" defTabSz="914400" rtl="0" eaLnBrk="1" latinLnBrk="0" hangingPunct="1">
+    <a:lvl3pPr marL="914400" algn="l" defTabSz="457200" rtl="0" eaLnBrk="1" latinLnBrk="0" hangingPunct="1">
       <a:defRPr sz="1800" kern="1200">
         <a:solidFill>
           <a:schemeClr val="tx1"/>
@@ -43,7 +43,7 @@
         <a:cs typeface="+mn-cs"/>
       </a:defRPr>
     </a:lvl3pPr>
-    <a:lvl4pPr marL="1371600" algn="l" defTabSz="914400" rtl="0" eaLnBrk="1" latinLnBrk="0" hangingPunct="1">
+    <a:lvl4pPr marL="1371600" algn="l" defTabSz="457200" rtl="0" eaLnBrk="1" latinLnBrk="0" hangingPunct="1">
       <a:defRPr sz="1800" kern="1200">
         <a:solidFill>
           <a:schemeClr val="tx1"/>
@@ -53,7 +53,7 @@
         <a:cs typeface="+mn-cs"/>
       </a:defRPr>
     </a:lvl4pPr>
-    <a:lvl5pPr marL="1828800" algn="l" defTabSz="914400" rtl="0" eaLnBrk="1" latinLnBrk="0" hangingPunct="1">
+    <a:lvl5pPr marL="1828800" algn="l" defTabSz="457200" rtl="0" eaLnBrk="1" latinLnBrk="0" hangingPunct="1">
       <a:defRPr sz="1800" kern="1200">
         <a:solidFill>
           <a:schemeClr val="tx1"/>
@@ -63,7 +63,7 @@
         <a:cs typeface="+mn-cs"/>
       </a:defRPr>
     </a:lvl5pPr>
-    <a:lvl6pPr marL="2286000" algn="l" defTabSz="914400" rtl="0" eaLnBrk="1" latinLnBrk="0" hangingPunct="1">
+    <a:lvl6pPr marL="2286000" algn="l" defTabSz="457200" rtl="0" eaLnBrk="1" latinLnBrk="0" hangingPunct="1">
       <a:defRPr sz="1800" kern="1200">
         <a:solidFill>
           <a:schemeClr val="tx1"/>
@@ -73,7 +73,7 @@
         <a:cs typeface="+mn-cs"/>
       </a:defRPr>
     </a:lvl6pPr>
-    <a:lvl7pPr marL="2743200" algn="l" defTabSz="914400" rtl="0" eaLnBrk="1" latinLnBrk="0" hangingPunct="1">
+    <a:lvl7pPr marL="2743200" algn="l" defTabSz="457200" rtl="0" eaLnBrk="1" latinLnBrk="0" hangingPunct="1">
       <a:defRPr sz="1800" kern="1200">
         <a:solidFill>
           <a:schemeClr val="tx1"/>
@@ -83,7 +83,7 @@
         <a:cs typeface="+mn-cs"/>
       </a:defRPr>
     </a:lvl7pPr>
-    <a:lvl8pPr marL="3200400" algn="l" defTabSz="914400" rtl="0" eaLnBrk="1" latinLnBrk="0" hangingPunct="1">
+    <a:lvl8pPr marL="3200400" algn="l" defTabSz="457200" rtl="0" eaLnBrk="1" latinLnBrk="0" hangingPunct="1">
       <a:defRPr sz="1800" kern="1200">
         <a:solidFill>
           <a:schemeClr val="tx1"/>
@@ -93,7 +93,7 @@
         <a:cs typeface="+mn-cs"/>
       </a:defRPr>
     </a:lvl8pPr>
-    <a:lvl9pPr marL="3657600" algn="l" defTabSz="914400" rtl="0" eaLnBrk="1" latinLnBrk="0" hangingPunct="1">
+    <a:lvl9pPr marL="3657600" algn="l" defTabSz="457200" rtl="0" eaLnBrk="1" latinLnBrk="0" hangingPunct="1">
       <a:defRPr sz="1800" kern="1200">
         <a:solidFill>
           <a:schemeClr val="tx1"/>
@@ -131,13 +131,7 @@
       </p:grpSpPr>
       <p:sp>
         <p:nvSpPr>
-          <p:cNvPr id="2" name="Title 1">
-            <a:extLst>
-              <a:ext uri="{FF2B5EF4-FFF2-40B4-BE49-F238E27FC236}">
-                <a16:creationId xmlns:a16="http://schemas.microsoft.com/office/drawing/2014/main" id="{E0ADA826-C1EF-45F1-B761-42AFB8DF0E92}"/>
-              </a:ext>
-            </a:extLst>
-          </p:cNvPr>
+          <p:cNvPr id="2" name="Title 1"/>
           <p:cNvSpPr>
             <a:spLocks noGrp="1"/>
           </p:cNvSpPr>
@@ -147,15 +141,15 @@
         </p:nvSpPr>
         <p:spPr>
           <a:xfrm>
-            <a:off x="1524000" y="1122363"/>
-            <a:ext cx="9144000" cy="2387600"/>
+            <a:off x="1714500" y="1346836"/>
+            <a:ext cx="10287000" cy="2865120"/>
           </a:xfrm>
         </p:spPr>
         <p:txBody>
           <a:bodyPr anchor="b"/>
           <a:lstStyle>
             <a:lvl1pPr algn="ctr">
-              <a:defRPr sz="6000"/>
+              <a:defRPr sz="6750"/>
             </a:lvl1pPr>
           </a:lstStyle>
           <a:p>
@@ -163,19 +157,13 @@
               <a:rPr lang="en-US"/>
               <a:t>Click to edit Master title style</a:t>
             </a:r>
-            <a:endParaRPr lang="es-UY"/>
-          </a:p>
-        </p:txBody>
-      </p:sp>
-      <p:sp>
-        <p:nvSpPr>
-          <p:cNvPr id="3" name="Subtitle 2">
-            <a:extLst>
-              <a:ext uri="{FF2B5EF4-FFF2-40B4-BE49-F238E27FC236}">
-                <a16:creationId xmlns:a16="http://schemas.microsoft.com/office/drawing/2014/main" id="{4C6ED2CE-91F5-4CB6-9592-553BCE6423AF}"/>
-              </a:ext>
-            </a:extLst>
-          </p:cNvPr>
+            <a:endParaRPr lang="en-US" dirty="0"/>
+          </a:p>
+        </p:txBody>
+      </p:sp>
+      <p:sp>
+        <p:nvSpPr>
+          <p:cNvPr id="3" name="Subtitle 2"/>
           <p:cNvSpPr>
             <a:spLocks noGrp="1"/>
           </p:cNvSpPr>
@@ -185,8 +173,8 @@
         </p:nvSpPr>
         <p:spPr>
           <a:xfrm>
-            <a:off x="1524000" y="3602038"/>
-            <a:ext cx="9144000" cy="1655762"/>
+            <a:off x="1714500" y="4322446"/>
+            <a:ext cx="10287000" cy="1986914"/>
           </a:xfrm>
         </p:spPr>
         <p:txBody>
@@ -194,39 +182,39 @@
           <a:lstStyle>
             <a:lvl1pPr marL="0" indent="0" algn="ctr">
               <a:buNone/>
-              <a:defRPr sz="2400"/>
+              <a:defRPr sz="2700"/>
             </a:lvl1pPr>
-            <a:lvl2pPr marL="457200" indent="0" algn="ctr">
-              <a:buNone/>
-              <a:defRPr sz="2000"/>
+            <a:lvl2pPr marL="514350" indent="0" algn="ctr">
+              <a:buNone/>
+              <a:defRPr sz="2250"/>
             </a:lvl2pPr>
-            <a:lvl3pPr marL="914400" indent="0" algn="ctr">
+            <a:lvl3pPr marL="1028700" indent="0" algn="ctr">
+              <a:buNone/>
+              <a:defRPr sz="2025"/>
+            </a:lvl3pPr>
+            <a:lvl4pPr marL="1543050" indent="0" algn="ctr">
               <a:buNone/>
               <a:defRPr sz="1800"/>
-            </a:lvl3pPr>
-            <a:lvl4pPr marL="1371600" indent="0" algn="ctr">
-              <a:buNone/>
-              <a:defRPr sz="1600"/>
             </a:lvl4pPr>
-            <a:lvl5pPr marL="1828800" indent="0" algn="ctr">
-              <a:buNone/>
-              <a:defRPr sz="1600"/>
+            <a:lvl5pPr marL="2057400" indent="0" algn="ctr">
+              <a:buNone/>
+              <a:defRPr sz="1800"/>
             </a:lvl5pPr>
-            <a:lvl6pPr marL="2286000" indent="0" algn="ctr">
-              <a:buNone/>
-              <a:defRPr sz="1600"/>
+            <a:lvl6pPr marL="2571750" indent="0" algn="ctr">
+              <a:buNone/>
+              <a:defRPr sz="1800"/>
             </a:lvl6pPr>
-            <a:lvl7pPr marL="2743200" indent="0" algn="ctr">
-              <a:buNone/>
-              <a:defRPr sz="1600"/>
+            <a:lvl7pPr marL="3086100" indent="0" algn="ctr">
+              <a:buNone/>
+              <a:defRPr sz="1800"/>
             </a:lvl7pPr>
-            <a:lvl8pPr marL="3200400" indent="0" algn="ctr">
-              <a:buNone/>
-              <a:defRPr sz="1600"/>
+            <a:lvl8pPr marL="3600450" indent="0" algn="ctr">
+              <a:buNone/>
+              <a:defRPr sz="1800"/>
             </a:lvl8pPr>
-            <a:lvl9pPr marL="3657600" indent="0" algn="ctr">
-              <a:buNone/>
-              <a:defRPr sz="1600"/>
+            <a:lvl9pPr marL="4114800" indent="0" algn="ctr">
+              <a:buNone/>
+              <a:defRPr sz="1800"/>
             </a:lvl9pPr>
           </a:lstStyle>
           <a:p>
@@ -234,19 +222,13 @@
               <a:rPr lang="en-US"/>
               <a:t>Click to edit Master subtitle style</a:t>
             </a:r>
-            <a:endParaRPr lang="es-UY"/>
-          </a:p>
-        </p:txBody>
-      </p:sp>
-      <p:sp>
-        <p:nvSpPr>
-          <p:cNvPr id="4" name="Date Placeholder 3">
-            <a:extLst>
-              <a:ext uri="{FF2B5EF4-FFF2-40B4-BE49-F238E27FC236}">
-                <a16:creationId xmlns:a16="http://schemas.microsoft.com/office/drawing/2014/main" id="{1468F18C-25F9-4B7A-9CF1-20400F7ED505}"/>
-              </a:ext>
-            </a:extLst>
-          </p:cNvPr>
+            <a:endParaRPr lang="en-US" dirty="0"/>
+          </a:p>
+        </p:txBody>
+      </p:sp>
+      <p:sp>
+        <p:nvSpPr>
+          <p:cNvPr id="4" name="Date Placeholder 3"/>
           <p:cNvSpPr>
             <a:spLocks noGrp="1"/>
           </p:cNvSpPr>
@@ -269,13 +251,7 @@
       </p:sp>
       <p:sp>
         <p:nvSpPr>
-          <p:cNvPr id="5" name="Footer Placeholder 4">
-            <a:extLst>
-              <a:ext uri="{FF2B5EF4-FFF2-40B4-BE49-F238E27FC236}">
-                <a16:creationId xmlns:a16="http://schemas.microsoft.com/office/drawing/2014/main" id="{9206C3D5-9A93-4E87-83ED-8BEFBF40BBDD}"/>
-              </a:ext>
-            </a:extLst>
-          </p:cNvPr>
+          <p:cNvPr id="5" name="Footer Placeholder 4"/>
           <p:cNvSpPr>
             <a:spLocks noGrp="1"/>
           </p:cNvSpPr>
@@ -294,13 +270,7 @@
       </p:sp>
       <p:sp>
         <p:nvSpPr>
-          <p:cNvPr id="6" name="Slide Number Placeholder 5">
-            <a:extLst>
-              <a:ext uri="{FF2B5EF4-FFF2-40B4-BE49-F238E27FC236}">
-                <a16:creationId xmlns:a16="http://schemas.microsoft.com/office/drawing/2014/main" id="{F8B469D0-345E-4E32-AF48-DF74443280E9}"/>
-              </a:ext>
-            </a:extLst>
-          </p:cNvPr>
+          <p:cNvPr id="6" name="Slide Number Placeholder 5"/>
           <p:cNvSpPr>
             <a:spLocks noGrp="1"/>
           </p:cNvSpPr>
@@ -324,7 +294,7 @@
     </p:spTree>
     <p:extLst>
       <p:ext uri="{BB962C8B-B14F-4D97-AF65-F5344CB8AC3E}">
-        <p14:creationId xmlns:p14="http://schemas.microsoft.com/office/powerpoint/2010/main" val="427634633"/>
+        <p14:creationId xmlns:p14="http://schemas.microsoft.com/office/powerpoint/2010/main" val="2206157499"/>
       </p:ext>
     </p:extLst>
   </p:cSld>
@@ -353,13 +323,7 @@
       </p:grpSpPr>
       <p:sp>
         <p:nvSpPr>
-          <p:cNvPr id="2" name="Title 1">
-            <a:extLst>
-              <a:ext uri="{FF2B5EF4-FFF2-40B4-BE49-F238E27FC236}">
-                <a16:creationId xmlns:a16="http://schemas.microsoft.com/office/drawing/2014/main" id="{EE9FDB16-C954-42BC-86FF-6CDAEED44261}"/>
-              </a:ext>
-            </a:extLst>
-          </p:cNvPr>
+          <p:cNvPr id="2" name="Title 1"/>
           <p:cNvSpPr>
             <a:spLocks noGrp="1"/>
           </p:cNvSpPr>
@@ -376,19 +340,13 @@
               <a:rPr lang="en-US"/>
               <a:t>Click to edit Master title style</a:t>
             </a:r>
-            <a:endParaRPr lang="es-UY"/>
-          </a:p>
-        </p:txBody>
-      </p:sp>
-      <p:sp>
-        <p:nvSpPr>
-          <p:cNvPr id="3" name="Vertical Text Placeholder 2">
-            <a:extLst>
-              <a:ext uri="{FF2B5EF4-FFF2-40B4-BE49-F238E27FC236}">
-                <a16:creationId xmlns:a16="http://schemas.microsoft.com/office/drawing/2014/main" id="{691FEE73-CFD8-4953-9D2A-927CAE024B20}"/>
-              </a:ext>
-            </a:extLst>
-          </p:cNvPr>
+            <a:endParaRPr lang="en-US" dirty="0"/>
+          </a:p>
+        </p:txBody>
+      </p:sp>
+      <p:sp>
+        <p:nvSpPr>
+          <p:cNvPr id="3" name="Vertical Text Placeholder 2"/>
           <p:cNvSpPr>
             <a:spLocks noGrp="1"/>
           </p:cNvSpPr>
@@ -434,19 +392,13 @@
               <a:rPr lang="en-US"/>
               <a:t>Fifth level</a:t>
             </a:r>
-            <a:endParaRPr lang="es-UY"/>
-          </a:p>
-        </p:txBody>
-      </p:sp>
-      <p:sp>
-        <p:nvSpPr>
-          <p:cNvPr id="4" name="Date Placeholder 3">
-            <a:extLst>
-              <a:ext uri="{FF2B5EF4-FFF2-40B4-BE49-F238E27FC236}">
-                <a16:creationId xmlns:a16="http://schemas.microsoft.com/office/drawing/2014/main" id="{1E897371-7694-4B24-A56C-7FFABBC8D70C}"/>
-              </a:ext>
-            </a:extLst>
-          </p:cNvPr>
+            <a:endParaRPr lang="en-US" dirty="0"/>
+          </a:p>
+        </p:txBody>
+      </p:sp>
+      <p:sp>
+        <p:nvSpPr>
+          <p:cNvPr id="4" name="Date Placeholder 3"/>
           <p:cNvSpPr>
             <a:spLocks noGrp="1"/>
           </p:cNvSpPr>
@@ -469,13 +421,7 @@
       </p:sp>
       <p:sp>
         <p:nvSpPr>
-          <p:cNvPr id="5" name="Footer Placeholder 4">
-            <a:extLst>
-              <a:ext uri="{FF2B5EF4-FFF2-40B4-BE49-F238E27FC236}">
-                <a16:creationId xmlns:a16="http://schemas.microsoft.com/office/drawing/2014/main" id="{26EB7971-514D-4DC5-9C9D-5DF751A6B19F}"/>
-              </a:ext>
-            </a:extLst>
-          </p:cNvPr>
+          <p:cNvPr id="5" name="Footer Placeholder 4"/>
           <p:cNvSpPr>
             <a:spLocks noGrp="1"/>
           </p:cNvSpPr>
@@ -494,13 +440,7 @@
       </p:sp>
       <p:sp>
         <p:nvSpPr>
-          <p:cNvPr id="6" name="Slide Number Placeholder 5">
-            <a:extLst>
-              <a:ext uri="{FF2B5EF4-FFF2-40B4-BE49-F238E27FC236}">
-                <a16:creationId xmlns:a16="http://schemas.microsoft.com/office/drawing/2014/main" id="{DCFE493E-4765-4816-8808-5065767FD1EF}"/>
-              </a:ext>
-            </a:extLst>
-          </p:cNvPr>
+          <p:cNvPr id="6" name="Slide Number Placeholder 5"/>
           <p:cNvSpPr>
             <a:spLocks noGrp="1"/>
           </p:cNvSpPr>
@@ -524,7 +464,7 @@
     </p:spTree>
     <p:extLst>
       <p:ext uri="{BB962C8B-B14F-4D97-AF65-F5344CB8AC3E}">
-        <p14:creationId xmlns:p14="http://schemas.microsoft.com/office/powerpoint/2010/main" val="2349789910"/>
+        <p14:creationId xmlns:p14="http://schemas.microsoft.com/office/powerpoint/2010/main" val="1853836226"/>
       </p:ext>
     </p:extLst>
   </p:cSld>
@@ -553,13 +493,7 @@
       </p:grpSpPr>
       <p:sp>
         <p:nvSpPr>
-          <p:cNvPr id="2" name="Vertical Title 1">
-            <a:extLst>
-              <a:ext uri="{FF2B5EF4-FFF2-40B4-BE49-F238E27FC236}">
-                <a16:creationId xmlns:a16="http://schemas.microsoft.com/office/drawing/2014/main" id="{AE0AD033-A3E6-4C2B-BA63-965B2F179166}"/>
-              </a:ext>
-            </a:extLst>
-          </p:cNvPr>
+          <p:cNvPr id="2" name="Vertical Title 1"/>
           <p:cNvSpPr>
             <a:spLocks noGrp="1"/>
           </p:cNvSpPr>
@@ -569,8 +503,8 @@
         </p:nvSpPr>
         <p:spPr>
           <a:xfrm>
-            <a:off x="8724900" y="365125"/>
-            <a:ext cx="2628900" cy="5811838"/>
+            <a:off x="9815512" y="438150"/>
+            <a:ext cx="2957513" cy="6974206"/>
           </a:xfrm>
         </p:spPr>
         <p:txBody>
@@ -581,19 +515,13 @@
               <a:rPr lang="en-US"/>
               <a:t>Click to edit Master title style</a:t>
             </a:r>
-            <a:endParaRPr lang="es-UY"/>
-          </a:p>
-        </p:txBody>
-      </p:sp>
-      <p:sp>
-        <p:nvSpPr>
-          <p:cNvPr id="3" name="Vertical Text Placeholder 2">
-            <a:extLst>
-              <a:ext uri="{FF2B5EF4-FFF2-40B4-BE49-F238E27FC236}">
-                <a16:creationId xmlns:a16="http://schemas.microsoft.com/office/drawing/2014/main" id="{6A898F2A-FE15-45FE-8F23-F8B701459025}"/>
-              </a:ext>
-            </a:extLst>
-          </p:cNvPr>
+            <a:endParaRPr lang="en-US" dirty="0"/>
+          </a:p>
+        </p:txBody>
+      </p:sp>
+      <p:sp>
+        <p:nvSpPr>
+          <p:cNvPr id="3" name="Vertical Text Placeholder 2"/>
           <p:cNvSpPr>
             <a:spLocks noGrp="1"/>
           </p:cNvSpPr>
@@ -603,8 +531,8 @@
         </p:nvSpPr>
         <p:spPr>
           <a:xfrm>
-            <a:off x="838200" y="365125"/>
-            <a:ext cx="7734300" cy="5811838"/>
+            <a:off x="942975" y="438150"/>
+            <a:ext cx="8701088" cy="6974206"/>
           </a:xfrm>
         </p:spPr>
         <p:txBody>
@@ -644,19 +572,13 @@
               <a:rPr lang="en-US"/>
               <a:t>Fifth level</a:t>
             </a:r>
-            <a:endParaRPr lang="es-UY"/>
-          </a:p>
-        </p:txBody>
-      </p:sp>
-      <p:sp>
-        <p:nvSpPr>
-          <p:cNvPr id="4" name="Date Placeholder 3">
-            <a:extLst>
-              <a:ext uri="{FF2B5EF4-FFF2-40B4-BE49-F238E27FC236}">
-                <a16:creationId xmlns:a16="http://schemas.microsoft.com/office/drawing/2014/main" id="{17B92597-EAD2-4C2E-A2CB-B76D1E95585B}"/>
-              </a:ext>
-            </a:extLst>
-          </p:cNvPr>
+            <a:endParaRPr lang="en-US" dirty="0"/>
+          </a:p>
+        </p:txBody>
+      </p:sp>
+      <p:sp>
+        <p:nvSpPr>
+          <p:cNvPr id="4" name="Date Placeholder 3"/>
           <p:cNvSpPr>
             <a:spLocks noGrp="1"/>
           </p:cNvSpPr>
@@ -679,13 +601,7 @@
       </p:sp>
       <p:sp>
         <p:nvSpPr>
-          <p:cNvPr id="5" name="Footer Placeholder 4">
-            <a:extLst>
-              <a:ext uri="{FF2B5EF4-FFF2-40B4-BE49-F238E27FC236}">
-                <a16:creationId xmlns:a16="http://schemas.microsoft.com/office/drawing/2014/main" id="{9F93F387-AC58-4391-9051-9D282DC8F943}"/>
-              </a:ext>
-            </a:extLst>
-          </p:cNvPr>
+          <p:cNvPr id="5" name="Footer Placeholder 4"/>
           <p:cNvSpPr>
             <a:spLocks noGrp="1"/>
           </p:cNvSpPr>
@@ -704,13 +620,7 @@
       </p:sp>
       <p:sp>
         <p:nvSpPr>
-          <p:cNvPr id="6" name="Slide Number Placeholder 5">
-            <a:extLst>
-              <a:ext uri="{FF2B5EF4-FFF2-40B4-BE49-F238E27FC236}">
-                <a16:creationId xmlns:a16="http://schemas.microsoft.com/office/drawing/2014/main" id="{0DABD0A5-365B-4027-9863-88801D227D56}"/>
-              </a:ext>
-            </a:extLst>
-          </p:cNvPr>
+          <p:cNvPr id="6" name="Slide Number Placeholder 5"/>
           <p:cNvSpPr>
             <a:spLocks noGrp="1"/>
           </p:cNvSpPr>
@@ -734,7 +644,7 @@
     </p:spTree>
     <p:extLst>
       <p:ext uri="{BB962C8B-B14F-4D97-AF65-F5344CB8AC3E}">
-        <p14:creationId xmlns:p14="http://schemas.microsoft.com/office/powerpoint/2010/main" val="2428696118"/>
+        <p14:creationId xmlns:p14="http://schemas.microsoft.com/office/powerpoint/2010/main" val="231980546"/>
       </p:ext>
     </p:extLst>
   </p:cSld>
@@ -763,13 +673,7 @@
       </p:grpSpPr>
       <p:sp>
         <p:nvSpPr>
-          <p:cNvPr id="2" name="Title 1">
-            <a:extLst>
-              <a:ext uri="{FF2B5EF4-FFF2-40B4-BE49-F238E27FC236}">
-                <a16:creationId xmlns:a16="http://schemas.microsoft.com/office/drawing/2014/main" id="{69D89CBA-FA7B-406C-A03D-BC0BBC53E6B0}"/>
-              </a:ext>
-            </a:extLst>
-          </p:cNvPr>
+          <p:cNvPr id="2" name="Title 1"/>
           <p:cNvSpPr>
             <a:spLocks noGrp="1"/>
           </p:cNvSpPr>
@@ -786,19 +690,13 @@
               <a:rPr lang="en-US"/>
               <a:t>Click to edit Master title style</a:t>
             </a:r>
-            <a:endParaRPr lang="es-UY"/>
-          </a:p>
-        </p:txBody>
-      </p:sp>
-      <p:sp>
-        <p:nvSpPr>
-          <p:cNvPr id="3" name="Content Placeholder 2">
-            <a:extLst>
-              <a:ext uri="{FF2B5EF4-FFF2-40B4-BE49-F238E27FC236}">
-                <a16:creationId xmlns:a16="http://schemas.microsoft.com/office/drawing/2014/main" id="{A8BB1D24-E370-4A57-A2C1-38F1EDE03B4B}"/>
-              </a:ext>
-            </a:extLst>
-          </p:cNvPr>
+            <a:endParaRPr lang="en-US" dirty="0"/>
+          </a:p>
+        </p:txBody>
+      </p:sp>
+      <p:sp>
+        <p:nvSpPr>
+          <p:cNvPr id="3" name="Content Placeholder 2"/>
           <p:cNvSpPr>
             <a:spLocks noGrp="1"/>
           </p:cNvSpPr>
@@ -844,19 +742,13 @@
               <a:rPr lang="en-US"/>
               <a:t>Fifth level</a:t>
             </a:r>
-            <a:endParaRPr lang="es-UY"/>
-          </a:p>
-        </p:txBody>
-      </p:sp>
-      <p:sp>
-        <p:nvSpPr>
-          <p:cNvPr id="4" name="Date Placeholder 3">
-            <a:extLst>
-              <a:ext uri="{FF2B5EF4-FFF2-40B4-BE49-F238E27FC236}">
-                <a16:creationId xmlns:a16="http://schemas.microsoft.com/office/drawing/2014/main" id="{52D5C33A-E3DE-49AA-967F-4FC97E1BE94B}"/>
-              </a:ext>
-            </a:extLst>
-          </p:cNvPr>
+            <a:endParaRPr lang="en-US" dirty="0"/>
+          </a:p>
+        </p:txBody>
+      </p:sp>
+      <p:sp>
+        <p:nvSpPr>
+          <p:cNvPr id="4" name="Date Placeholder 3"/>
           <p:cNvSpPr>
             <a:spLocks noGrp="1"/>
           </p:cNvSpPr>
@@ -879,13 +771,7 @@
       </p:sp>
       <p:sp>
         <p:nvSpPr>
-          <p:cNvPr id="5" name="Footer Placeholder 4">
-            <a:extLst>
-              <a:ext uri="{FF2B5EF4-FFF2-40B4-BE49-F238E27FC236}">
-                <a16:creationId xmlns:a16="http://schemas.microsoft.com/office/drawing/2014/main" id="{0326DDC6-5CBF-43DC-A61B-681ADD869A66}"/>
-              </a:ext>
-            </a:extLst>
-          </p:cNvPr>
+          <p:cNvPr id="5" name="Footer Placeholder 4"/>
           <p:cNvSpPr>
             <a:spLocks noGrp="1"/>
           </p:cNvSpPr>
@@ -904,13 +790,7 @@
       </p:sp>
       <p:sp>
         <p:nvSpPr>
-          <p:cNvPr id="6" name="Slide Number Placeholder 5">
-            <a:extLst>
-              <a:ext uri="{FF2B5EF4-FFF2-40B4-BE49-F238E27FC236}">
-                <a16:creationId xmlns:a16="http://schemas.microsoft.com/office/drawing/2014/main" id="{6EA7C12A-94F7-4049-9EF9-93BF0EC13BE7}"/>
-              </a:ext>
-            </a:extLst>
-          </p:cNvPr>
+          <p:cNvPr id="6" name="Slide Number Placeholder 5"/>
           <p:cNvSpPr>
             <a:spLocks noGrp="1"/>
           </p:cNvSpPr>
@@ -934,7 +814,7 @@
     </p:spTree>
     <p:extLst>
       <p:ext uri="{BB962C8B-B14F-4D97-AF65-F5344CB8AC3E}">
-        <p14:creationId xmlns:p14="http://schemas.microsoft.com/office/powerpoint/2010/main" val="3175602996"/>
+        <p14:creationId xmlns:p14="http://schemas.microsoft.com/office/powerpoint/2010/main" val="2354619321"/>
       </p:ext>
     </p:extLst>
   </p:cSld>
@@ -963,13 +843,7 @@
       </p:grpSpPr>
       <p:sp>
         <p:nvSpPr>
-          <p:cNvPr id="2" name="Title 1">
-            <a:extLst>
-              <a:ext uri="{FF2B5EF4-FFF2-40B4-BE49-F238E27FC236}">
-                <a16:creationId xmlns:a16="http://schemas.microsoft.com/office/drawing/2014/main" id="{281CE9D4-9B1E-429D-8E74-C143A94EF1C6}"/>
-              </a:ext>
-            </a:extLst>
-          </p:cNvPr>
+          <p:cNvPr id="2" name="Title 1"/>
           <p:cNvSpPr>
             <a:spLocks noGrp="1"/>
           </p:cNvSpPr>
@@ -979,15 +853,15 @@
         </p:nvSpPr>
         <p:spPr>
           <a:xfrm>
-            <a:off x="831850" y="1709738"/>
-            <a:ext cx="10515600" cy="2852737"/>
+            <a:off x="935831" y="2051686"/>
+            <a:ext cx="11830050" cy="3423284"/>
           </a:xfrm>
         </p:spPr>
         <p:txBody>
           <a:bodyPr anchor="b"/>
           <a:lstStyle>
             <a:lvl1pPr>
-              <a:defRPr sz="6000"/>
+              <a:defRPr sz="6750"/>
             </a:lvl1pPr>
           </a:lstStyle>
           <a:p>
@@ -995,19 +869,13 @@
               <a:rPr lang="en-US"/>
               <a:t>Click to edit Master title style</a:t>
             </a:r>
-            <a:endParaRPr lang="es-UY"/>
-          </a:p>
-        </p:txBody>
-      </p:sp>
-      <p:sp>
-        <p:nvSpPr>
-          <p:cNvPr id="3" name="Text Placeholder 2">
-            <a:extLst>
-              <a:ext uri="{FF2B5EF4-FFF2-40B4-BE49-F238E27FC236}">
-                <a16:creationId xmlns:a16="http://schemas.microsoft.com/office/drawing/2014/main" id="{3E24E76E-BBE9-4421-A9C8-5612B27874DA}"/>
-              </a:ext>
-            </a:extLst>
-          </p:cNvPr>
+            <a:endParaRPr lang="en-US" dirty="0"/>
+          </a:p>
+        </p:txBody>
+      </p:sp>
+      <p:sp>
+        <p:nvSpPr>
+          <p:cNvPr id="3" name="Text Placeholder 2"/>
           <p:cNvSpPr>
             <a:spLocks noGrp="1"/>
           </p:cNvSpPr>
@@ -1017,8 +885,8 @@
         </p:nvSpPr>
         <p:spPr>
           <a:xfrm>
-            <a:off x="831850" y="4589463"/>
-            <a:ext cx="10515600" cy="1500187"/>
+            <a:off x="935831" y="5507356"/>
+            <a:ext cx="11830050" cy="1800224"/>
           </a:xfrm>
         </p:spPr>
         <p:txBody>
@@ -1026,7 +894,7 @@
           <a:lstStyle>
             <a:lvl1pPr marL="0" indent="0">
               <a:buNone/>
-              <a:defRPr sz="2400">
+              <a:defRPr sz="2700">
                 <a:solidFill>
                   <a:schemeClr val="tx1">
                     <a:tint val="75000"/>
@@ -1034,9 +902,9 @@
                 </a:solidFill>
               </a:defRPr>
             </a:lvl1pPr>
-            <a:lvl2pPr marL="457200" indent="0">
-              <a:buNone/>
-              <a:defRPr sz="2000">
+            <a:lvl2pPr marL="514350" indent="0">
+              <a:buNone/>
+              <a:defRPr sz="2250">
                 <a:solidFill>
                   <a:schemeClr val="tx1">
                     <a:tint val="75000"/>
@@ -1044,7 +912,17 @@
                 </a:solidFill>
               </a:defRPr>
             </a:lvl2pPr>
-            <a:lvl3pPr marL="914400" indent="0">
+            <a:lvl3pPr marL="1028700" indent="0">
+              <a:buNone/>
+              <a:defRPr sz="2025">
+                <a:solidFill>
+                  <a:schemeClr val="tx1">
+                    <a:tint val="75000"/>
+                  </a:schemeClr>
+                </a:solidFill>
+              </a:defRPr>
+            </a:lvl3pPr>
+            <a:lvl4pPr marL="1543050" indent="0">
               <a:buNone/>
               <a:defRPr sz="1800">
                 <a:solidFill>
@@ -1053,20 +931,10 @@
                   </a:schemeClr>
                 </a:solidFill>
               </a:defRPr>
-            </a:lvl3pPr>
-            <a:lvl4pPr marL="1371600" indent="0">
-              <a:buNone/>
-              <a:defRPr sz="1600">
-                <a:solidFill>
-                  <a:schemeClr val="tx1">
-                    <a:tint val="75000"/>
-                  </a:schemeClr>
-                </a:solidFill>
-              </a:defRPr>
             </a:lvl4pPr>
-            <a:lvl5pPr marL="1828800" indent="0">
-              <a:buNone/>
-              <a:defRPr sz="1600">
+            <a:lvl5pPr marL="2057400" indent="0">
+              <a:buNone/>
+              <a:defRPr sz="1800">
                 <a:solidFill>
                   <a:schemeClr val="tx1">
                     <a:tint val="75000"/>
@@ -1074,9 +942,9 @@
                 </a:solidFill>
               </a:defRPr>
             </a:lvl5pPr>
-            <a:lvl6pPr marL="2286000" indent="0">
-              <a:buNone/>
-              <a:defRPr sz="1600">
+            <a:lvl6pPr marL="2571750" indent="0">
+              <a:buNone/>
+              <a:defRPr sz="1800">
                 <a:solidFill>
                   <a:schemeClr val="tx1">
                     <a:tint val="75000"/>
@@ -1084,9 +952,9 @@
                 </a:solidFill>
               </a:defRPr>
             </a:lvl6pPr>
-            <a:lvl7pPr marL="2743200" indent="0">
-              <a:buNone/>
-              <a:defRPr sz="1600">
+            <a:lvl7pPr marL="3086100" indent="0">
+              <a:buNone/>
+              <a:defRPr sz="1800">
                 <a:solidFill>
                   <a:schemeClr val="tx1">
                     <a:tint val="75000"/>
@@ -1094,9 +962,9 @@
                 </a:solidFill>
               </a:defRPr>
             </a:lvl7pPr>
-            <a:lvl8pPr marL="3200400" indent="0">
-              <a:buNone/>
-              <a:defRPr sz="1600">
+            <a:lvl8pPr marL="3600450" indent="0">
+              <a:buNone/>
+              <a:defRPr sz="1800">
                 <a:solidFill>
                   <a:schemeClr val="tx1">
                     <a:tint val="75000"/>
@@ -1104,9 +972,9 @@
                 </a:solidFill>
               </a:defRPr>
             </a:lvl8pPr>
-            <a:lvl9pPr marL="3657600" indent="0">
-              <a:buNone/>
-              <a:defRPr sz="1600">
+            <a:lvl9pPr marL="4114800" indent="0">
+              <a:buNone/>
+              <a:defRPr sz="1800">
                 <a:solidFill>
                   <a:schemeClr val="tx1">
                     <a:tint val="75000"/>
@@ -1126,13 +994,7 @@
       </p:sp>
       <p:sp>
         <p:nvSpPr>
-          <p:cNvPr id="4" name="Date Placeholder 3">
-            <a:extLst>
-              <a:ext uri="{FF2B5EF4-FFF2-40B4-BE49-F238E27FC236}">
-                <a16:creationId xmlns:a16="http://schemas.microsoft.com/office/drawing/2014/main" id="{9AFF6643-06D7-406A-85BD-B799AFDD2C4E}"/>
-              </a:ext>
-            </a:extLst>
-          </p:cNvPr>
+          <p:cNvPr id="4" name="Date Placeholder 3"/>
           <p:cNvSpPr>
             <a:spLocks noGrp="1"/>
           </p:cNvSpPr>
@@ -1155,13 +1017,7 @@
       </p:sp>
       <p:sp>
         <p:nvSpPr>
-          <p:cNvPr id="5" name="Footer Placeholder 4">
-            <a:extLst>
-              <a:ext uri="{FF2B5EF4-FFF2-40B4-BE49-F238E27FC236}">
-                <a16:creationId xmlns:a16="http://schemas.microsoft.com/office/drawing/2014/main" id="{DA89586A-2804-4FA1-804C-295C3400D333}"/>
-              </a:ext>
-            </a:extLst>
-          </p:cNvPr>
+          <p:cNvPr id="5" name="Footer Placeholder 4"/>
           <p:cNvSpPr>
             <a:spLocks noGrp="1"/>
           </p:cNvSpPr>
@@ -1180,13 +1036,7 @@
       </p:sp>
       <p:sp>
         <p:nvSpPr>
-          <p:cNvPr id="6" name="Slide Number Placeholder 5">
-            <a:extLst>
-              <a:ext uri="{FF2B5EF4-FFF2-40B4-BE49-F238E27FC236}">
-                <a16:creationId xmlns:a16="http://schemas.microsoft.com/office/drawing/2014/main" id="{584D3916-E807-4946-A96D-40DEB4EC65EB}"/>
-              </a:ext>
-            </a:extLst>
-          </p:cNvPr>
+          <p:cNvPr id="6" name="Slide Number Placeholder 5"/>
           <p:cNvSpPr>
             <a:spLocks noGrp="1"/>
           </p:cNvSpPr>
@@ -1210,7 +1060,7 @@
     </p:spTree>
     <p:extLst>
       <p:ext uri="{BB962C8B-B14F-4D97-AF65-F5344CB8AC3E}">
-        <p14:creationId xmlns:p14="http://schemas.microsoft.com/office/powerpoint/2010/main" val="2242901466"/>
+        <p14:creationId xmlns:p14="http://schemas.microsoft.com/office/powerpoint/2010/main" val="1658765801"/>
       </p:ext>
     </p:extLst>
   </p:cSld>
@@ -1239,13 +1089,7 @@
       </p:grpSpPr>
       <p:sp>
         <p:nvSpPr>
-          <p:cNvPr id="2" name="Title 1">
-            <a:extLst>
-              <a:ext uri="{FF2B5EF4-FFF2-40B4-BE49-F238E27FC236}">
-                <a16:creationId xmlns:a16="http://schemas.microsoft.com/office/drawing/2014/main" id="{E5F98EA0-9F12-48EA-981F-489B65EE4782}"/>
-              </a:ext>
-            </a:extLst>
-          </p:cNvPr>
+          <p:cNvPr id="2" name="Title 1"/>
           <p:cNvSpPr>
             <a:spLocks noGrp="1"/>
           </p:cNvSpPr>
@@ -1262,19 +1106,13 @@
               <a:rPr lang="en-US"/>
               <a:t>Click to edit Master title style</a:t>
             </a:r>
-            <a:endParaRPr lang="es-UY"/>
-          </a:p>
-        </p:txBody>
-      </p:sp>
-      <p:sp>
-        <p:nvSpPr>
-          <p:cNvPr id="3" name="Content Placeholder 2">
-            <a:extLst>
-              <a:ext uri="{FF2B5EF4-FFF2-40B4-BE49-F238E27FC236}">
-                <a16:creationId xmlns:a16="http://schemas.microsoft.com/office/drawing/2014/main" id="{0F84767F-789C-4BEF-BEEF-EADEF27C69A0}"/>
-              </a:ext>
-            </a:extLst>
-          </p:cNvPr>
+            <a:endParaRPr lang="en-US" dirty="0"/>
+          </a:p>
+        </p:txBody>
+      </p:sp>
+      <p:sp>
+        <p:nvSpPr>
+          <p:cNvPr id="3" name="Content Placeholder 2"/>
           <p:cNvSpPr>
             <a:spLocks noGrp="1"/>
           </p:cNvSpPr>
@@ -1284,8 +1122,8 @@
         </p:nvSpPr>
         <p:spPr>
           <a:xfrm>
-            <a:off x="838200" y="1825625"/>
-            <a:ext cx="5181600" cy="4351338"/>
+            <a:off x="942975" y="2190750"/>
+            <a:ext cx="5829300" cy="5221606"/>
           </a:xfrm>
         </p:spPr>
         <p:txBody>
@@ -1325,19 +1163,13 @@
               <a:rPr lang="en-US"/>
               <a:t>Fifth level</a:t>
             </a:r>
-            <a:endParaRPr lang="es-UY"/>
-          </a:p>
-        </p:txBody>
-      </p:sp>
-      <p:sp>
-        <p:nvSpPr>
-          <p:cNvPr id="4" name="Content Placeholder 3">
-            <a:extLst>
-              <a:ext uri="{FF2B5EF4-FFF2-40B4-BE49-F238E27FC236}">
-                <a16:creationId xmlns:a16="http://schemas.microsoft.com/office/drawing/2014/main" id="{EF032383-8D31-4ED7-817B-E88DB23A9822}"/>
-              </a:ext>
-            </a:extLst>
-          </p:cNvPr>
+            <a:endParaRPr lang="en-US" dirty="0"/>
+          </a:p>
+        </p:txBody>
+      </p:sp>
+      <p:sp>
+        <p:nvSpPr>
+          <p:cNvPr id="4" name="Content Placeholder 3"/>
           <p:cNvSpPr>
             <a:spLocks noGrp="1"/>
           </p:cNvSpPr>
@@ -1347,8 +1179,8 @@
         </p:nvSpPr>
         <p:spPr>
           <a:xfrm>
-            <a:off x="6172200" y="1825625"/>
-            <a:ext cx="5181600" cy="4351338"/>
+            <a:off x="6943725" y="2190750"/>
+            <a:ext cx="5829300" cy="5221606"/>
           </a:xfrm>
         </p:spPr>
         <p:txBody>
@@ -1388,19 +1220,13 @@
               <a:rPr lang="en-US"/>
               <a:t>Fifth level</a:t>
             </a:r>
-            <a:endParaRPr lang="es-UY"/>
-          </a:p>
-        </p:txBody>
-      </p:sp>
-      <p:sp>
-        <p:nvSpPr>
-          <p:cNvPr id="5" name="Date Placeholder 4">
-            <a:extLst>
-              <a:ext uri="{FF2B5EF4-FFF2-40B4-BE49-F238E27FC236}">
-                <a16:creationId xmlns:a16="http://schemas.microsoft.com/office/drawing/2014/main" id="{8099D88C-A835-452A-B351-0313ACDD300E}"/>
-              </a:ext>
-            </a:extLst>
-          </p:cNvPr>
+            <a:endParaRPr lang="en-US" dirty="0"/>
+          </a:p>
+        </p:txBody>
+      </p:sp>
+      <p:sp>
+        <p:nvSpPr>
+          <p:cNvPr id="5" name="Date Placeholder 4"/>
           <p:cNvSpPr>
             <a:spLocks noGrp="1"/>
           </p:cNvSpPr>
@@ -1423,13 +1249,7 @@
       </p:sp>
       <p:sp>
         <p:nvSpPr>
-          <p:cNvPr id="6" name="Footer Placeholder 5">
-            <a:extLst>
-              <a:ext uri="{FF2B5EF4-FFF2-40B4-BE49-F238E27FC236}">
-                <a16:creationId xmlns:a16="http://schemas.microsoft.com/office/drawing/2014/main" id="{30EF7235-520A-4C60-BECC-F61162B979DD}"/>
-              </a:ext>
-            </a:extLst>
-          </p:cNvPr>
+          <p:cNvPr id="6" name="Footer Placeholder 5"/>
           <p:cNvSpPr>
             <a:spLocks noGrp="1"/>
           </p:cNvSpPr>
@@ -1448,13 +1268,7 @@
       </p:sp>
       <p:sp>
         <p:nvSpPr>
-          <p:cNvPr id="7" name="Slide Number Placeholder 6">
-            <a:extLst>
-              <a:ext uri="{FF2B5EF4-FFF2-40B4-BE49-F238E27FC236}">
-                <a16:creationId xmlns:a16="http://schemas.microsoft.com/office/drawing/2014/main" id="{69FA07D8-C201-4CB6-BD91-56CC0706BADA}"/>
-              </a:ext>
-            </a:extLst>
-          </p:cNvPr>
+          <p:cNvPr id="7" name="Slide Number Placeholder 6"/>
           <p:cNvSpPr>
             <a:spLocks noGrp="1"/>
           </p:cNvSpPr>
@@ -1478,7 +1292,7 @@
     </p:spTree>
     <p:extLst>
       <p:ext uri="{BB962C8B-B14F-4D97-AF65-F5344CB8AC3E}">
-        <p14:creationId xmlns:p14="http://schemas.microsoft.com/office/powerpoint/2010/main" val="2318963717"/>
+        <p14:creationId xmlns:p14="http://schemas.microsoft.com/office/powerpoint/2010/main" val="733669916"/>
       </p:ext>
     </p:extLst>
   </p:cSld>
@@ -1507,13 +1321,7 @@
       </p:grpSpPr>
       <p:sp>
         <p:nvSpPr>
-          <p:cNvPr id="2" name="Title 1">
-            <a:extLst>
-              <a:ext uri="{FF2B5EF4-FFF2-40B4-BE49-F238E27FC236}">
-                <a16:creationId xmlns:a16="http://schemas.microsoft.com/office/drawing/2014/main" id="{5E543D6D-B40C-4F0A-9FF7-CC31A945FFD5}"/>
-              </a:ext>
-            </a:extLst>
-          </p:cNvPr>
+          <p:cNvPr id="2" name="Title 1"/>
           <p:cNvSpPr>
             <a:spLocks noGrp="1"/>
           </p:cNvSpPr>
@@ -1523,8 +1331,8 @@
         </p:nvSpPr>
         <p:spPr>
           <a:xfrm>
-            <a:off x="839788" y="365125"/>
-            <a:ext cx="10515600" cy="1325563"/>
+            <a:off x="944762" y="438150"/>
+            <a:ext cx="11830050" cy="1590676"/>
           </a:xfrm>
         </p:spPr>
         <p:txBody>
@@ -1535,19 +1343,13 @@
               <a:rPr lang="en-US"/>
               <a:t>Click to edit Master title style</a:t>
             </a:r>
-            <a:endParaRPr lang="es-UY"/>
-          </a:p>
-        </p:txBody>
-      </p:sp>
-      <p:sp>
-        <p:nvSpPr>
-          <p:cNvPr id="3" name="Text Placeholder 2">
-            <a:extLst>
-              <a:ext uri="{FF2B5EF4-FFF2-40B4-BE49-F238E27FC236}">
-                <a16:creationId xmlns:a16="http://schemas.microsoft.com/office/drawing/2014/main" id="{5FE70F42-13F8-4078-8196-3E286FE82005}"/>
-              </a:ext>
-            </a:extLst>
-          </p:cNvPr>
+            <a:endParaRPr lang="en-US" dirty="0"/>
+          </a:p>
+        </p:txBody>
+      </p:sp>
+      <p:sp>
+        <p:nvSpPr>
+          <p:cNvPr id="3" name="Text Placeholder 2"/>
           <p:cNvSpPr>
             <a:spLocks noGrp="1"/>
           </p:cNvSpPr>
@@ -1557,8 +1359,8 @@
         </p:nvSpPr>
         <p:spPr>
           <a:xfrm>
-            <a:off x="839788" y="1681163"/>
-            <a:ext cx="5157787" cy="823912"/>
+            <a:off x="944762" y="2017396"/>
+            <a:ext cx="5802510" cy="988694"/>
           </a:xfrm>
         </p:spPr>
         <p:txBody>
@@ -1566,39 +1368,39 @@
           <a:lstStyle>
             <a:lvl1pPr marL="0" indent="0">
               <a:buNone/>
-              <a:defRPr sz="2400" b="1"/>
+              <a:defRPr sz="2700" b="1"/>
             </a:lvl1pPr>
-            <a:lvl2pPr marL="457200" indent="0">
-              <a:buNone/>
-              <a:defRPr sz="2000" b="1"/>
+            <a:lvl2pPr marL="514350" indent="0">
+              <a:buNone/>
+              <a:defRPr sz="2250" b="1"/>
             </a:lvl2pPr>
-            <a:lvl3pPr marL="914400" indent="0">
+            <a:lvl3pPr marL="1028700" indent="0">
+              <a:buNone/>
+              <a:defRPr sz="2025" b="1"/>
+            </a:lvl3pPr>
+            <a:lvl4pPr marL="1543050" indent="0">
               <a:buNone/>
               <a:defRPr sz="1800" b="1"/>
-            </a:lvl3pPr>
-            <a:lvl4pPr marL="1371600" indent="0">
-              <a:buNone/>
-              <a:defRPr sz="1600" b="1"/>
             </a:lvl4pPr>
-            <a:lvl5pPr marL="1828800" indent="0">
-              <a:buNone/>
-              <a:defRPr sz="1600" b="1"/>
+            <a:lvl5pPr marL="2057400" indent="0">
+              <a:buNone/>
+              <a:defRPr sz="1800" b="1"/>
             </a:lvl5pPr>
-            <a:lvl6pPr marL="2286000" indent="0">
-              <a:buNone/>
-              <a:defRPr sz="1600" b="1"/>
+            <a:lvl6pPr marL="2571750" indent="0">
+              <a:buNone/>
+              <a:defRPr sz="1800" b="1"/>
             </a:lvl6pPr>
-            <a:lvl7pPr marL="2743200" indent="0">
-              <a:buNone/>
-              <a:defRPr sz="1600" b="1"/>
+            <a:lvl7pPr marL="3086100" indent="0">
+              <a:buNone/>
+              <a:defRPr sz="1800" b="1"/>
             </a:lvl7pPr>
-            <a:lvl8pPr marL="3200400" indent="0">
-              <a:buNone/>
-              <a:defRPr sz="1600" b="1"/>
+            <a:lvl8pPr marL="3600450" indent="0">
+              <a:buNone/>
+              <a:defRPr sz="1800" b="1"/>
             </a:lvl8pPr>
-            <a:lvl9pPr marL="3657600" indent="0">
-              <a:buNone/>
-              <a:defRPr sz="1600" b="1"/>
+            <a:lvl9pPr marL="4114800" indent="0">
+              <a:buNone/>
+              <a:defRPr sz="1800" b="1"/>
             </a:lvl9pPr>
           </a:lstStyle>
           <a:p>
@@ -1612,13 +1414,7 @@
       </p:sp>
       <p:sp>
         <p:nvSpPr>
-          <p:cNvPr id="4" name="Content Placeholder 3">
-            <a:extLst>
-              <a:ext uri="{FF2B5EF4-FFF2-40B4-BE49-F238E27FC236}">
-                <a16:creationId xmlns:a16="http://schemas.microsoft.com/office/drawing/2014/main" id="{6FBBB8E1-B7B2-4CF2-967F-EADDCEB77D54}"/>
-              </a:ext>
-            </a:extLst>
-          </p:cNvPr>
+          <p:cNvPr id="4" name="Content Placeholder 3"/>
           <p:cNvSpPr>
             <a:spLocks noGrp="1"/>
           </p:cNvSpPr>
@@ -1628,8 +1424,8 @@
         </p:nvSpPr>
         <p:spPr>
           <a:xfrm>
-            <a:off x="839788" y="2505075"/>
-            <a:ext cx="5157787" cy="3684588"/>
+            <a:off x="944762" y="3006090"/>
+            <a:ext cx="5802510" cy="4421506"/>
           </a:xfrm>
         </p:spPr>
         <p:txBody>
@@ -1669,19 +1465,13 @@
               <a:rPr lang="en-US"/>
               <a:t>Fifth level</a:t>
             </a:r>
-            <a:endParaRPr lang="es-UY"/>
-          </a:p>
-        </p:txBody>
-      </p:sp>
-      <p:sp>
-        <p:nvSpPr>
-          <p:cNvPr id="5" name="Text Placeholder 4">
-            <a:extLst>
-              <a:ext uri="{FF2B5EF4-FFF2-40B4-BE49-F238E27FC236}">
-                <a16:creationId xmlns:a16="http://schemas.microsoft.com/office/drawing/2014/main" id="{9BEAB0B1-059E-4307-A290-B4998C73F9A9}"/>
-              </a:ext>
-            </a:extLst>
-          </p:cNvPr>
+            <a:endParaRPr lang="en-US" dirty="0"/>
+          </a:p>
+        </p:txBody>
+      </p:sp>
+      <p:sp>
+        <p:nvSpPr>
+          <p:cNvPr id="5" name="Text Placeholder 4"/>
           <p:cNvSpPr>
             <a:spLocks noGrp="1"/>
           </p:cNvSpPr>
@@ -1691,8 +1481,8 @@
         </p:nvSpPr>
         <p:spPr>
           <a:xfrm>
-            <a:off x="6172200" y="1681163"/>
-            <a:ext cx="5183188" cy="823912"/>
+            <a:off x="6943725" y="2017396"/>
+            <a:ext cx="5831087" cy="988694"/>
           </a:xfrm>
         </p:spPr>
         <p:txBody>
@@ -1700,39 +1490,39 @@
           <a:lstStyle>
             <a:lvl1pPr marL="0" indent="0">
               <a:buNone/>
-              <a:defRPr sz="2400" b="1"/>
+              <a:defRPr sz="2700" b="1"/>
             </a:lvl1pPr>
-            <a:lvl2pPr marL="457200" indent="0">
-              <a:buNone/>
-              <a:defRPr sz="2000" b="1"/>
+            <a:lvl2pPr marL="514350" indent="0">
+              <a:buNone/>
+              <a:defRPr sz="2250" b="1"/>
             </a:lvl2pPr>
-            <a:lvl3pPr marL="914400" indent="0">
+            <a:lvl3pPr marL="1028700" indent="0">
+              <a:buNone/>
+              <a:defRPr sz="2025" b="1"/>
+            </a:lvl3pPr>
+            <a:lvl4pPr marL="1543050" indent="0">
               <a:buNone/>
               <a:defRPr sz="1800" b="1"/>
-            </a:lvl3pPr>
-            <a:lvl4pPr marL="1371600" indent="0">
-              <a:buNone/>
-              <a:defRPr sz="1600" b="1"/>
             </a:lvl4pPr>
-            <a:lvl5pPr marL="1828800" indent="0">
-              <a:buNone/>
-              <a:defRPr sz="1600" b="1"/>
+            <a:lvl5pPr marL="2057400" indent="0">
+              <a:buNone/>
+              <a:defRPr sz="1800" b="1"/>
             </a:lvl5pPr>
-            <a:lvl6pPr marL="2286000" indent="0">
-              <a:buNone/>
-              <a:defRPr sz="1600" b="1"/>
+            <a:lvl6pPr marL="2571750" indent="0">
+              <a:buNone/>
+              <a:defRPr sz="1800" b="1"/>
             </a:lvl6pPr>
-            <a:lvl7pPr marL="2743200" indent="0">
-              <a:buNone/>
-              <a:defRPr sz="1600" b="1"/>
+            <a:lvl7pPr marL="3086100" indent="0">
+              <a:buNone/>
+              <a:defRPr sz="1800" b="1"/>
             </a:lvl7pPr>
-            <a:lvl8pPr marL="3200400" indent="0">
-              <a:buNone/>
-              <a:defRPr sz="1600" b="1"/>
+            <a:lvl8pPr marL="3600450" indent="0">
+              <a:buNone/>
+              <a:defRPr sz="1800" b="1"/>
             </a:lvl8pPr>
-            <a:lvl9pPr marL="3657600" indent="0">
-              <a:buNone/>
-              <a:defRPr sz="1600" b="1"/>
+            <a:lvl9pPr marL="4114800" indent="0">
+              <a:buNone/>
+              <a:defRPr sz="1800" b="1"/>
             </a:lvl9pPr>
           </a:lstStyle>
           <a:p>
@@ -1746,13 +1536,7 @@
       </p:sp>
       <p:sp>
         <p:nvSpPr>
-          <p:cNvPr id="6" name="Content Placeholder 5">
-            <a:extLst>
-              <a:ext uri="{FF2B5EF4-FFF2-40B4-BE49-F238E27FC236}">
-                <a16:creationId xmlns:a16="http://schemas.microsoft.com/office/drawing/2014/main" id="{2D921FAF-88B0-42E3-9C0D-D00E0574D030}"/>
-              </a:ext>
-            </a:extLst>
-          </p:cNvPr>
+          <p:cNvPr id="6" name="Content Placeholder 5"/>
           <p:cNvSpPr>
             <a:spLocks noGrp="1"/>
           </p:cNvSpPr>
@@ -1762,8 +1546,8 @@
         </p:nvSpPr>
         <p:spPr>
           <a:xfrm>
-            <a:off x="6172200" y="2505075"/>
-            <a:ext cx="5183188" cy="3684588"/>
+            <a:off x="6943725" y="3006090"/>
+            <a:ext cx="5831087" cy="4421506"/>
           </a:xfrm>
         </p:spPr>
         <p:txBody>
@@ -1803,19 +1587,13 @@
               <a:rPr lang="en-US"/>
               <a:t>Fifth level</a:t>
             </a:r>
-            <a:endParaRPr lang="es-UY"/>
-          </a:p>
-        </p:txBody>
-      </p:sp>
-      <p:sp>
-        <p:nvSpPr>
-          <p:cNvPr id="7" name="Date Placeholder 6">
-            <a:extLst>
-              <a:ext uri="{FF2B5EF4-FFF2-40B4-BE49-F238E27FC236}">
-                <a16:creationId xmlns:a16="http://schemas.microsoft.com/office/drawing/2014/main" id="{2870D6C3-0272-4B7E-8589-A8D8B37C1A7D}"/>
-              </a:ext>
-            </a:extLst>
-          </p:cNvPr>
+            <a:endParaRPr lang="en-US" dirty="0"/>
+          </a:p>
+        </p:txBody>
+      </p:sp>
+      <p:sp>
+        <p:nvSpPr>
+          <p:cNvPr id="7" name="Date Placeholder 6"/>
           <p:cNvSpPr>
             <a:spLocks noGrp="1"/>
           </p:cNvSpPr>
@@ -1838,13 +1616,7 @@
       </p:sp>
       <p:sp>
         <p:nvSpPr>
-          <p:cNvPr id="8" name="Footer Placeholder 7">
-            <a:extLst>
-              <a:ext uri="{FF2B5EF4-FFF2-40B4-BE49-F238E27FC236}">
-                <a16:creationId xmlns:a16="http://schemas.microsoft.com/office/drawing/2014/main" id="{5E8E4265-CB37-4C58-AB2B-9EBCC85B9634}"/>
-              </a:ext>
-            </a:extLst>
-          </p:cNvPr>
+          <p:cNvPr id="8" name="Footer Placeholder 7"/>
           <p:cNvSpPr>
             <a:spLocks noGrp="1"/>
           </p:cNvSpPr>
@@ -1863,13 +1635,7 @@
       </p:sp>
       <p:sp>
         <p:nvSpPr>
-          <p:cNvPr id="9" name="Slide Number Placeholder 8">
-            <a:extLst>
-              <a:ext uri="{FF2B5EF4-FFF2-40B4-BE49-F238E27FC236}">
-                <a16:creationId xmlns:a16="http://schemas.microsoft.com/office/drawing/2014/main" id="{618E6CD2-7861-45B9-A875-AAB5733EDD8B}"/>
-              </a:ext>
-            </a:extLst>
-          </p:cNvPr>
+          <p:cNvPr id="9" name="Slide Number Placeholder 8"/>
           <p:cNvSpPr>
             <a:spLocks noGrp="1"/>
           </p:cNvSpPr>
@@ -1893,7 +1659,7 @@
     </p:spTree>
     <p:extLst>
       <p:ext uri="{BB962C8B-B14F-4D97-AF65-F5344CB8AC3E}">
-        <p14:creationId xmlns:p14="http://schemas.microsoft.com/office/powerpoint/2010/main" val="1009914487"/>
+        <p14:creationId xmlns:p14="http://schemas.microsoft.com/office/powerpoint/2010/main" val="2235744352"/>
       </p:ext>
     </p:extLst>
   </p:cSld>
@@ -1922,13 +1688,7 @@
       </p:grpSpPr>
       <p:sp>
         <p:nvSpPr>
-          <p:cNvPr id="2" name="Title 1">
-            <a:extLst>
-              <a:ext uri="{FF2B5EF4-FFF2-40B4-BE49-F238E27FC236}">
-                <a16:creationId xmlns:a16="http://schemas.microsoft.com/office/drawing/2014/main" id="{D94A4BFF-A611-4707-A6E7-20EB239F1836}"/>
-              </a:ext>
-            </a:extLst>
-          </p:cNvPr>
+          <p:cNvPr id="2" name="Title 1"/>
           <p:cNvSpPr>
             <a:spLocks noGrp="1"/>
           </p:cNvSpPr>
@@ -1945,19 +1705,13 @@
               <a:rPr lang="en-US"/>
               <a:t>Click to edit Master title style</a:t>
             </a:r>
-            <a:endParaRPr lang="es-UY"/>
-          </a:p>
-        </p:txBody>
-      </p:sp>
-      <p:sp>
-        <p:nvSpPr>
-          <p:cNvPr id="3" name="Date Placeholder 2">
-            <a:extLst>
-              <a:ext uri="{FF2B5EF4-FFF2-40B4-BE49-F238E27FC236}">
-                <a16:creationId xmlns:a16="http://schemas.microsoft.com/office/drawing/2014/main" id="{B5DF5F5D-B73E-478B-884A-0BFCC9805B9D}"/>
-              </a:ext>
-            </a:extLst>
-          </p:cNvPr>
+            <a:endParaRPr lang="en-US" dirty="0"/>
+          </a:p>
+        </p:txBody>
+      </p:sp>
+      <p:sp>
+        <p:nvSpPr>
+          <p:cNvPr id="3" name="Date Placeholder 2"/>
           <p:cNvSpPr>
             <a:spLocks noGrp="1"/>
           </p:cNvSpPr>
@@ -1980,13 +1734,7 @@
       </p:sp>
       <p:sp>
         <p:nvSpPr>
-          <p:cNvPr id="4" name="Footer Placeholder 3">
-            <a:extLst>
-              <a:ext uri="{FF2B5EF4-FFF2-40B4-BE49-F238E27FC236}">
-                <a16:creationId xmlns:a16="http://schemas.microsoft.com/office/drawing/2014/main" id="{3D2FC8AC-230B-412C-8E86-61B0852E9CF7}"/>
-              </a:ext>
-            </a:extLst>
-          </p:cNvPr>
+          <p:cNvPr id="4" name="Footer Placeholder 3"/>
           <p:cNvSpPr>
             <a:spLocks noGrp="1"/>
           </p:cNvSpPr>
@@ -2005,13 +1753,7 @@
       </p:sp>
       <p:sp>
         <p:nvSpPr>
-          <p:cNvPr id="5" name="Slide Number Placeholder 4">
-            <a:extLst>
-              <a:ext uri="{FF2B5EF4-FFF2-40B4-BE49-F238E27FC236}">
-                <a16:creationId xmlns:a16="http://schemas.microsoft.com/office/drawing/2014/main" id="{0E23F1A6-96EE-4E7E-AFCF-840757C62D86}"/>
-              </a:ext>
-            </a:extLst>
-          </p:cNvPr>
+          <p:cNvPr id="5" name="Slide Number Placeholder 4"/>
           <p:cNvSpPr>
             <a:spLocks noGrp="1"/>
           </p:cNvSpPr>
@@ -2035,7 +1777,7 @@
     </p:spTree>
     <p:extLst>
       <p:ext uri="{BB962C8B-B14F-4D97-AF65-F5344CB8AC3E}">
-        <p14:creationId xmlns:p14="http://schemas.microsoft.com/office/powerpoint/2010/main" val="1094850922"/>
+        <p14:creationId xmlns:p14="http://schemas.microsoft.com/office/powerpoint/2010/main" val="2920590494"/>
       </p:ext>
     </p:extLst>
   </p:cSld>
@@ -2064,13 +1806,7 @@
       </p:grpSpPr>
       <p:sp>
         <p:nvSpPr>
-          <p:cNvPr id="2" name="Date Placeholder 1">
-            <a:extLst>
-              <a:ext uri="{FF2B5EF4-FFF2-40B4-BE49-F238E27FC236}">
-                <a16:creationId xmlns:a16="http://schemas.microsoft.com/office/drawing/2014/main" id="{BDA98633-3AA6-4729-883E-BE27CC71E096}"/>
-              </a:ext>
-            </a:extLst>
-          </p:cNvPr>
+          <p:cNvPr id="2" name="Date Placeholder 1"/>
           <p:cNvSpPr>
             <a:spLocks noGrp="1"/>
           </p:cNvSpPr>
@@ -2093,13 +1829,7 @@
       </p:sp>
       <p:sp>
         <p:nvSpPr>
-          <p:cNvPr id="3" name="Footer Placeholder 2">
-            <a:extLst>
-              <a:ext uri="{FF2B5EF4-FFF2-40B4-BE49-F238E27FC236}">
-                <a16:creationId xmlns:a16="http://schemas.microsoft.com/office/drawing/2014/main" id="{B2C27ED9-378A-4B40-A581-C68D4B42F578}"/>
-              </a:ext>
-            </a:extLst>
-          </p:cNvPr>
+          <p:cNvPr id="3" name="Footer Placeholder 2"/>
           <p:cNvSpPr>
             <a:spLocks noGrp="1"/>
           </p:cNvSpPr>
@@ -2118,13 +1848,7 @@
       </p:sp>
       <p:sp>
         <p:nvSpPr>
-          <p:cNvPr id="4" name="Slide Number Placeholder 3">
-            <a:extLst>
-              <a:ext uri="{FF2B5EF4-FFF2-40B4-BE49-F238E27FC236}">
-                <a16:creationId xmlns:a16="http://schemas.microsoft.com/office/drawing/2014/main" id="{43058AA5-98A5-44BE-8737-DD4A1369A99F}"/>
-              </a:ext>
-            </a:extLst>
-          </p:cNvPr>
+          <p:cNvPr id="4" name="Slide Number Placeholder 3"/>
           <p:cNvSpPr>
             <a:spLocks noGrp="1"/>
           </p:cNvSpPr>
@@ -2148,7 +1872,7 @@
     </p:spTree>
     <p:extLst>
       <p:ext uri="{BB962C8B-B14F-4D97-AF65-F5344CB8AC3E}">
-        <p14:creationId xmlns:p14="http://schemas.microsoft.com/office/powerpoint/2010/main" val="3007860158"/>
+        <p14:creationId xmlns:p14="http://schemas.microsoft.com/office/powerpoint/2010/main" val="229832793"/>
       </p:ext>
     </p:extLst>
   </p:cSld>
@@ -2177,13 +1901,7 @@
       </p:grpSpPr>
       <p:sp>
         <p:nvSpPr>
-          <p:cNvPr id="2" name="Title 1">
-            <a:extLst>
-              <a:ext uri="{FF2B5EF4-FFF2-40B4-BE49-F238E27FC236}">
-                <a16:creationId xmlns:a16="http://schemas.microsoft.com/office/drawing/2014/main" id="{0CE38132-9D74-41EC-82B7-F874BDF832D2}"/>
-              </a:ext>
-            </a:extLst>
-          </p:cNvPr>
+          <p:cNvPr id="2" name="Title 1"/>
           <p:cNvSpPr>
             <a:spLocks noGrp="1"/>
           </p:cNvSpPr>
@@ -2193,15 +1911,15 @@
         </p:nvSpPr>
         <p:spPr>
           <a:xfrm>
-            <a:off x="839788" y="457200"/>
-            <a:ext cx="3932237" cy="1600200"/>
+            <a:off x="944762" y="548640"/>
+            <a:ext cx="4423767" cy="1920240"/>
           </a:xfrm>
         </p:spPr>
         <p:txBody>
           <a:bodyPr anchor="b"/>
           <a:lstStyle>
             <a:lvl1pPr>
-              <a:defRPr sz="3200"/>
+              <a:defRPr sz="3600"/>
             </a:lvl1pPr>
           </a:lstStyle>
           <a:p>
@@ -2209,19 +1927,13 @@
               <a:rPr lang="en-US"/>
               <a:t>Click to edit Master title style</a:t>
             </a:r>
-            <a:endParaRPr lang="es-UY"/>
-          </a:p>
-        </p:txBody>
-      </p:sp>
-      <p:sp>
-        <p:nvSpPr>
-          <p:cNvPr id="3" name="Content Placeholder 2">
-            <a:extLst>
-              <a:ext uri="{FF2B5EF4-FFF2-40B4-BE49-F238E27FC236}">
-                <a16:creationId xmlns:a16="http://schemas.microsoft.com/office/drawing/2014/main" id="{A8660CA1-1DD7-4439-A092-A92663F8A907}"/>
-              </a:ext>
-            </a:extLst>
-          </p:cNvPr>
+            <a:endParaRPr lang="en-US" dirty="0"/>
+          </a:p>
+        </p:txBody>
+      </p:sp>
+      <p:sp>
+        <p:nvSpPr>
+          <p:cNvPr id="3" name="Content Placeholder 2"/>
           <p:cNvSpPr>
             <a:spLocks noGrp="1"/>
           </p:cNvSpPr>
@@ -2231,39 +1943,39 @@
         </p:nvSpPr>
         <p:spPr>
           <a:xfrm>
-            <a:off x="5183188" y="987425"/>
-            <a:ext cx="6172200" cy="4873625"/>
+            <a:off x="5831087" y="1184911"/>
+            <a:ext cx="6943725" cy="5848350"/>
           </a:xfrm>
         </p:spPr>
         <p:txBody>
           <a:bodyPr/>
           <a:lstStyle>
             <a:lvl1pPr>
-              <a:defRPr sz="3200"/>
+              <a:defRPr sz="3600"/>
             </a:lvl1pPr>
             <a:lvl2pPr>
-              <a:defRPr sz="2800"/>
+              <a:defRPr sz="3150"/>
             </a:lvl2pPr>
             <a:lvl3pPr>
-              <a:defRPr sz="2400"/>
+              <a:defRPr sz="2700"/>
             </a:lvl3pPr>
             <a:lvl4pPr>
-              <a:defRPr sz="2000"/>
+              <a:defRPr sz="2250"/>
             </a:lvl4pPr>
             <a:lvl5pPr>
-              <a:defRPr sz="2000"/>
+              <a:defRPr sz="2250"/>
             </a:lvl5pPr>
             <a:lvl6pPr>
-              <a:defRPr sz="2000"/>
+              <a:defRPr sz="2250"/>
             </a:lvl6pPr>
             <a:lvl7pPr>
-              <a:defRPr sz="2000"/>
+              <a:defRPr sz="2250"/>
             </a:lvl7pPr>
             <a:lvl8pPr>
-              <a:defRPr sz="2000"/>
+              <a:defRPr sz="2250"/>
             </a:lvl8pPr>
             <a:lvl9pPr>
-              <a:defRPr sz="2000"/>
+              <a:defRPr sz="2250"/>
             </a:lvl9pPr>
           </a:lstStyle>
           <a:p>
@@ -2300,19 +2012,13 @@
               <a:rPr lang="en-US"/>
               <a:t>Fifth level</a:t>
             </a:r>
-            <a:endParaRPr lang="es-UY"/>
-          </a:p>
-        </p:txBody>
-      </p:sp>
-      <p:sp>
-        <p:nvSpPr>
-          <p:cNvPr id="4" name="Text Placeholder 3">
-            <a:extLst>
-              <a:ext uri="{FF2B5EF4-FFF2-40B4-BE49-F238E27FC236}">
-                <a16:creationId xmlns:a16="http://schemas.microsoft.com/office/drawing/2014/main" id="{50B5AA4F-7B4F-45DE-B6DE-D42185B51AD7}"/>
-              </a:ext>
-            </a:extLst>
-          </p:cNvPr>
+            <a:endParaRPr lang="en-US" dirty="0"/>
+          </a:p>
+        </p:txBody>
+      </p:sp>
+      <p:sp>
+        <p:nvSpPr>
+          <p:cNvPr id="4" name="Text Placeholder 3"/>
           <p:cNvSpPr>
             <a:spLocks noGrp="1"/>
           </p:cNvSpPr>
@@ -2322,8 +2028,8 @@
         </p:nvSpPr>
         <p:spPr>
           <a:xfrm>
-            <a:off x="839788" y="2057400"/>
-            <a:ext cx="3932237" cy="3811588"/>
+            <a:off x="944762" y="2468880"/>
+            <a:ext cx="4423767" cy="4573906"/>
           </a:xfrm>
         </p:spPr>
         <p:txBody>
@@ -2331,39 +2037,39 @@
           <a:lstStyle>
             <a:lvl1pPr marL="0" indent="0">
               <a:buNone/>
-              <a:defRPr sz="1600"/>
+              <a:defRPr sz="1800"/>
             </a:lvl1pPr>
-            <a:lvl2pPr marL="457200" indent="0">
-              <a:buNone/>
-              <a:defRPr sz="1400"/>
+            <a:lvl2pPr marL="514350" indent="0">
+              <a:buNone/>
+              <a:defRPr sz="1575"/>
             </a:lvl2pPr>
-            <a:lvl3pPr marL="914400" indent="0">
-              <a:buNone/>
-              <a:defRPr sz="1200"/>
+            <a:lvl3pPr marL="1028700" indent="0">
+              <a:buNone/>
+              <a:defRPr sz="1350"/>
             </a:lvl3pPr>
-            <a:lvl4pPr marL="1371600" indent="0">
-              <a:buNone/>
-              <a:defRPr sz="1000"/>
+            <a:lvl4pPr marL="1543050" indent="0">
+              <a:buNone/>
+              <a:defRPr sz="1125"/>
             </a:lvl4pPr>
-            <a:lvl5pPr marL="1828800" indent="0">
-              <a:buNone/>
-              <a:defRPr sz="1000"/>
+            <a:lvl5pPr marL="2057400" indent="0">
+              <a:buNone/>
+              <a:defRPr sz="1125"/>
             </a:lvl5pPr>
-            <a:lvl6pPr marL="2286000" indent="0">
-              <a:buNone/>
-              <a:defRPr sz="1000"/>
+            <a:lvl6pPr marL="2571750" indent="0">
+              <a:buNone/>
+              <a:defRPr sz="1125"/>
             </a:lvl6pPr>
-            <a:lvl7pPr marL="2743200" indent="0">
-              <a:buNone/>
-              <a:defRPr sz="1000"/>
+            <a:lvl7pPr marL="3086100" indent="0">
+              <a:buNone/>
+              <a:defRPr sz="1125"/>
             </a:lvl7pPr>
-            <a:lvl8pPr marL="3200400" indent="0">
-              <a:buNone/>
-              <a:defRPr sz="1000"/>
+            <a:lvl8pPr marL="3600450" indent="0">
+              <a:buNone/>
+              <a:defRPr sz="1125"/>
             </a:lvl8pPr>
-            <a:lvl9pPr marL="3657600" indent="0">
-              <a:buNone/>
-              <a:defRPr sz="1000"/>
+            <a:lvl9pPr marL="4114800" indent="0">
+              <a:buNone/>
+              <a:defRPr sz="1125"/>
             </a:lvl9pPr>
           </a:lstStyle>
           <a:p>
@@ -2377,13 +2083,7 @@
       </p:sp>
       <p:sp>
         <p:nvSpPr>
-          <p:cNvPr id="5" name="Date Placeholder 4">
-            <a:extLst>
-              <a:ext uri="{FF2B5EF4-FFF2-40B4-BE49-F238E27FC236}">
-                <a16:creationId xmlns:a16="http://schemas.microsoft.com/office/drawing/2014/main" id="{0EAD2AFB-3CB1-40A3-BC54-7289E7AECE85}"/>
-              </a:ext>
-            </a:extLst>
-          </p:cNvPr>
+          <p:cNvPr id="5" name="Date Placeholder 4"/>
           <p:cNvSpPr>
             <a:spLocks noGrp="1"/>
           </p:cNvSpPr>
@@ -2406,13 +2106,7 @@
       </p:sp>
       <p:sp>
         <p:nvSpPr>
-          <p:cNvPr id="6" name="Footer Placeholder 5">
-            <a:extLst>
-              <a:ext uri="{FF2B5EF4-FFF2-40B4-BE49-F238E27FC236}">
-                <a16:creationId xmlns:a16="http://schemas.microsoft.com/office/drawing/2014/main" id="{7FD568ED-21B9-4F4F-B9AA-821F613E9A21}"/>
-              </a:ext>
-            </a:extLst>
-          </p:cNvPr>
+          <p:cNvPr id="6" name="Footer Placeholder 5"/>
           <p:cNvSpPr>
             <a:spLocks noGrp="1"/>
           </p:cNvSpPr>
@@ -2431,13 +2125,7 @@
       </p:sp>
       <p:sp>
         <p:nvSpPr>
-          <p:cNvPr id="7" name="Slide Number Placeholder 6">
-            <a:extLst>
-              <a:ext uri="{FF2B5EF4-FFF2-40B4-BE49-F238E27FC236}">
-                <a16:creationId xmlns:a16="http://schemas.microsoft.com/office/drawing/2014/main" id="{E46A49FA-311C-42D6-9C23-1C7A0CF6A3E8}"/>
-              </a:ext>
-            </a:extLst>
-          </p:cNvPr>
+          <p:cNvPr id="7" name="Slide Number Placeholder 6"/>
           <p:cNvSpPr>
             <a:spLocks noGrp="1"/>
           </p:cNvSpPr>
@@ -2461,7 +2149,7 @@
     </p:spTree>
     <p:extLst>
       <p:ext uri="{BB962C8B-B14F-4D97-AF65-F5344CB8AC3E}">
-        <p14:creationId xmlns:p14="http://schemas.microsoft.com/office/powerpoint/2010/main" val="3738733954"/>
+        <p14:creationId xmlns:p14="http://schemas.microsoft.com/office/powerpoint/2010/main" val="588154892"/>
       </p:ext>
     </p:extLst>
   </p:cSld>
@@ -2490,13 +2178,7 @@
       </p:grpSpPr>
       <p:sp>
         <p:nvSpPr>
-          <p:cNvPr id="2" name="Title 1">
-            <a:extLst>
-              <a:ext uri="{FF2B5EF4-FFF2-40B4-BE49-F238E27FC236}">
-                <a16:creationId xmlns:a16="http://schemas.microsoft.com/office/drawing/2014/main" id="{3046C393-80D4-4C85-9FFC-448FBE1BD124}"/>
-              </a:ext>
-            </a:extLst>
-          </p:cNvPr>
+          <p:cNvPr id="2" name="Title 1"/>
           <p:cNvSpPr>
             <a:spLocks noGrp="1"/>
           </p:cNvSpPr>
@@ -2506,15 +2188,15 @@
         </p:nvSpPr>
         <p:spPr>
           <a:xfrm>
-            <a:off x="839788" y="457200"/>
-            <a:ext cx="3932237" cy="1600200"/>
+            <a:off x="944762" y="548640"/>
+            <a:ext cx="4423767" cy="1920240"/>
           </a:xfrm>
         </p:spPr>
         <p:txBody>
           <a:bodyPr anchor="b"/>
           <a:lstStyle>
             <a:lvl1pPr>
-              <a:defRPr sz="3200"/>
+              <a:defRPr sz="3600"/>
             </a:lvl1pPr>
           </a:lstStyle>
           <a:p>
@@ -2522,21 +2204,15 @@
               <a:rPr lang="en-US"/>
               <a:t>Click to edit Master title style</a:t>
             </a:r>
-            <a:endParaRPr lang="es-UY"/>
-          </a:p>
-        </p:txBody>
-      </p:sp>
-      <p:sp>
-        <p:nvSpPr>
-          <p:cNvPr id="3" name="Picture Placeholder 2">
-            <a:extLst>
-              <a:ext uri="{FF2B5EF4-FFF2-40B4-BE49-F238E27FC236}">
-                <a16:creationId xmlns:a16="http://schemas.microsoft.com/office/drawing/2014/main" id="{8A9ECAA0-980B-4627-A070-7AFA2926E13D}"/>
-              </a:ext>
-            </a:extLst>
-          </p:cNvPr>
-          <p:cNvSpPr>
-            <a:spLocks noGrp="1"/>
+            <a:endParaRPr lang="en-US" dirty="0"/>
+          </a:p>
+        </p:txBody>
+      </p:sp>
+      <p:sp>
+        <p:nvSpPr>
+          <p:cNvPr id="3" name="Picture Placeholder 2"/>
+          <p:cNvSpPr>
+            <a:spLocks noGrp="1" noChangeAspect="1"/>
           </p:cNvSpPr>
           <p:nvPr>
             <p:ph type="pic" idx="1"/>
@@ -2544,8 +2220,73 @@
         </p:nvSpPr>
         <p:spPr>
           <a:xfrm>
-            <a:off x="5183188" y="987425"/>
-            <a:ext cx="6172200" cy="4873625"/>
+            <a:off x="5831087" y="1184911"/>
+            <a:ext cx="6943725" cy="5848350"/>
+          </a:xfrm>
+        </p:spPr>
+        <p:txBody>
+          <a:bodyPr anchor="t"/>
+          <a:lstStyle>
+            <a:lvl1pPr marL="0" indent="0">
+              <a:buNone/>
+              <a:defRPr sz="3600"/>
+            </a:lvl1pPr>
+            <a:lvl2pPr marL="514350" indent="0">
+              <a:buNone/>
+              <a:defRPr sz="3150"/>
+            </a:lvl2pPr>
+            <a:lvl3pPr marL="1028700" indent="0">
+              <a:buNone/>
+              <a:defRPr sz="2700"/>
+            </a:lvl3pPr>
+            <a:lvl4pPr marL="1543050" indent="0">
+              <a:buNone/>
+              <a:defRPr sz="2250"/>
+            </a:lvl4pPr>
+            <a:lvl5pPr marL="2057400" indent="0">
+              <a:buNone/>
+              <a:defRPr sz="2250"/>
+            </a:lvl5pPr>
+            <a:lvl6pPr marL="2571750" indent="0">
+              <a:buNone/>
+              <a:defRPr sz="2250"/>
+            </a:lvl6pPr>
+            <a:lvl7pPr marL="3086100" indent="0">
+              <a:buNone/>
+              <a:defRPr sz="2250"/>
+            </a:lvl7pPr>
+            <a:lvl8pPr marL="3600450" indent="0">
+              <a:buNone/>
+              <a:defRPr sz="2250"/>
+            </a:lvl8pPr>
+            <a:lvl9pPr marL="4114800" indent="0">
+              <a:buNone/>
+              <a:defRPr sz="2250"/>
+            </a:lvl9pPr>
+          </a:lstStyle>
+          <a:p>
+            <a:r>
+              <a:rPr lang="en-US"/>
+              <a:t>Click icon to add picture</a:t>
+            </a:r>
+            <a:endParaRPr lang="en-US" dirty="0"/>
+          </a:p>
+        </p:txBody>
+      </p:sp>
+      <p:sp>
+        <p:nvSpPr>
+          <p:cNvPr id="4" name="Text Placeholder 3"/>
+          <p:cNvSpPr>
+            <a:spLocks noGrp="1"/>
+          </p:cNvSpPr>
+          <p:nvPr>
+            <p:ph type="body" sz="half" idx="2"/>
+          </p:nvPr>
+        </p:nvSpPr>
+        <p:spPr>
+          <a:xfrm>
+            <a:off x="944762" y="2468880"/>
+            <a:ext cx="4423767" cy="4573906"/>
           </a:xfrm>
         </p:spPr>
         <p:txBody>
@@ -2553,109 +2294,42 @@
           <a:lstStyle>
             <a:lvl1pPr marL="0" indent="0">
               <a:buNone/>
-              <a:defRPr sz="3200"/>
+              <a:defRPr sz="1800"/>
             </a:lvl1pPr>
-            <a:lvl2pPr marL="457200" indent="0">
-              <a:buNone/>
-              <a:defRPr sz="2800"/>
+            <a:lvl2pPr marL="514350" indent="0">
+              <a:buNone/>
+              <a:defRPr sz="1575"/>
             </a:lvl2pPr>
-            <a:lvl3pPr marL="914400" indent="0">
-              <a:buNone/>
-              <a:defRPr sz="2400"/>
+            <a:lvl3pPr marL="1028700" indent="0">
+              <a:buNone/>
+              <a:defRPr sz="1350"/>
             </a:lvl3pPr>
-            <a:lvl4pPr marL="1371600" indent="0">
-              <a:buNone/>
-              <a:defRPr sz="2000"/>
+            <a:lvl4pPr marL="1543050" indent="0">
+              <a:buNone/>
+              <a:defRPr sz="1125"/>
             </a:lvl4pPr>
-            <a:lvl5pPr marL="1828800" indent="0">
-              <a:buNone/>
-              <a:defRPr sz="2000"/>
+            <a:lvl5pPr marL="2057400" indent="0">
+              <a:buNone/>
+              <a:defRPr sz="1125"/>
             </a:lvl5pPr>
-            <a:lvl6pPr marL="2286000" indent="0">
-              <a:buNone/>
-              <a:defRPr sz="2000"/>
+            <a:lvl6pPr marL="2571750" indent="0">
+              <a:buNone/>
+              <a:defRPr sz="1125"/>
             </a:lvl6pPr>
-            <a:lvl7pPr marL="2743200" indent="0">
-              <a:buNone/>
-              <a:defRPr sz="2000"/>
+            <a:lvl7pPr marL="3086100" indent="0">
+              <a:buNone/>
+              <a:defRPr sz="1125"/>
             </a:lvl7pPr>
-            <a:lvl8pPr marL="3200400" indent="0">
-              <a:buNone/>
-              <a:defRPr sz="2000"/>
+            <a:lvl8pPr marL="3600450" indent="0">
+              <a:buNone/>
+              <a:defRPr sz="1125"/>
             </a:lvl8pPr>
-            <a:lvl9pPr marL="3657600" indent="0">
-              <a:buNone/>
-              <a:defRPr sz="2000"/>
+            <a:lvl9pPr marL="4114800" indent="0">
+              <a:buNone/>
+              <a:defRPr sz="1125"/>
             </a:lvl9pPr>
           </a:lstStyle>
           <a:p>
-            <a:endParaRPr lang="es-UY"/>
-          </a:p>
-        </p:txBody>
-      </p:sp>
-      <p:sp>
-        <p:nvSpPr>
-          <p:cNvPr id="4" name="Text Placeholder 3">
-            <a:extLst>
-              <a:ext uri="{FF2B5EF4-FFF2-40B4-BE49-F238E27FC236}">
-                <a16:creationId xmlns:a16="http://schemas.microsoft.com/office/drawing/2014/main" id="{766072A4-BB4C-478A-9414-392F31C8DBBB}"/>
-              </a:ext>
-            </a:extLst>
-          </p:cNvPr>
-          <p:cNvSpPr>
-            <a:spLocks noGrp="1"/>
-          </p:cNvSpPr>
-          <p:nvPr>
-            <p:ph type="body" sz="half" idx="2"/>
-          </p:nvPr>
-        </p:nvSpPr>
-        <p:spPr>
-          <a:xfrm>
-            <a:off x="839788" y="2057400"/>
-            <a:ext cx="3932237" cy="3811588"/>
-          </a:xfrm>
-        </p:spPr>
-        <p:txBody>
-          <a:bodyPr/>
-          <a:lstStyle>
-            <a:lvl1pPr marL="0" indent="0">
-              <a:buNone/>
-              <a:defRPr sz="1600"/>
-            </a:lvl1pPr>
-            <a:lvl2pPr marL="457200" indent="0">
-              <a:buNone/>
-              <a:defRPr sz="1400"/>
-            </a:lvl2pPr>
-            <a:lvl3pPr marL="914400" indent="0">
-              <a:buNone/>
-              <a:defRPr sz="1200"/>
-            </a:lvl3pPr>
-            <a:lvl4pPr marL="1371600" indent="0">
-              <a:buNone/>
-              <a:defRPr sz="1000"/>
-            </a:lvl4pPr>
-            <a:lvl5pPr marL="1828800" indent="0">
-              <a:buNone/>
-              <a:defRPr sz="1000"/>
-            </a:lvl5pPr>
-            <a:lvl6pPr marL="2286000" indent="0">
-              <a:buNone/>
-              <a:defRPr sz="1000"/>
-            </a:lvl6pPr>
-            <a:lvl7pPr marL="2743200" indent="0">
-              <a:buNone/>
-              <a:defRPr sz="1000"/>
-            </a:lvl7pPr>
-            <a:lvl8pPr marL="3200400" indent="0">
-              <a:buNone/>
-              <a:defRPr sz="1000"/>
-            </a:lvl8pPr>
-            <a:lvl9pPr marL="3657600" indent="0">
-              <a:buNone/>
-              <a:defRPr sz="1000"/>
-            </a:lvl9pPr>
-          </a:lstStyle>
-          <a:p>
             <a:pPr lvl="0"/>
             <a:r>
               <a:rPr lang="en-US"/>
@@ -2666,13 +2340,7 @@
       </p:sp>
       <p:sp>
         <p:nvSpPr>
-          <p:cNvPr id="5" name="Date Placeholder 4">
-            <a:extLst>
-              <a:ext uri="{FF2B5EF4-FFF2-40B4-BE49-F238E27FC236}">
-                <a16:creationId xmlns:a16="http://schemas.microsoft.com/office/drawing/2014/main" id="{6D097128-0CA5-411E-860F-7B79C271FD74}"/>
-              </a:ext>
-            </a:extLst>
-          </p:cNvPr>
+          <p:cNvPr id="5" name="Date Placeholder 4"/>
           <p:cNvSpPr>
             <a:spLocks noGrp="1"/>
           </p:cNvSpPr>
@@ -2695,13 +2363,7 @@
       </p:sp>
       <p:sp>
         <p:nvSpPr>
-          <p:cNvPr id="6" name="Footer Placeholder 5">
-            <a:extLst>
-              <a:ext uri="{FF2B5EF4-FFF2-40B4-BE49-F238E27FC236}">
-                <a16:creationId xmlns:a16="http://schemas.microsoft.com/office/drawing/2014/main" id="{50AA3659-E1AE-41FA-9143-666AB8CD790D}"/>
-              </a:ext>
-            </a:extLst>
-          </p:cNvPr>
+          <p:cNvPr id="6" name="Footer Placeholder 5"/>
           <p:cNvSpPr>
             <a:spLocks noGrp="1"/>
           </p:cNvSpPr>
@@ -2720,13 +2382,7 @@
       </p:sp>
       <p:sp>
         <p:nvSpPr>
-          <p:cNvPr id="7" name="Slide Number Placeholder 6">
-            <a:extLst>
-              <a:ext uri="{FF2B5EF4-FFF2-40B4-BE49-F238E27FC236}">
-                <a16:creationId xmlns:a16="http://schemas.microsoft.com/office/drawing/2014/main" id="{52980955-E6B7-457E-9B09-897F20EF2F8E}"/>
-              </a:ext>
-            </a:extLst>
-          </p:cNvPr>
+          <p:cNvPr id="7" name="Slide Number Placeholder 6"/>
           <p:cNvSpPr>
             <a:spLocks noGrp="1"/>
           </p:cNvSpPr>
@@ -2750,7 +2406,7 @@
     </p:spTree>
     <p:extLst>
       <p:ext uri="{BB962C8B-B14F-4D97-AF65-F5344CB8AC3E}">
-        <p14:creationId xmlns:p14="http://schemas.microsoft.com/office/powerpoint/2010/main" val="3817448946"/>
+        <p14:creationId xmlns:p14="http://schemas.microsoft.com/office/powerpoint/2010/main" val="2461148150"/>
       </p:ext>
     </p:extLst>
   </p:cSld>
@@ -2784,13 +2440,7 @@
       </p:grpSpPr>
       <p:sp>
         <p:nvSpPr>
-          <p:cNvPr id="2" name="Title Placeholder 1">
-            <a:extLst>
-              <a:ext uri="{FF2B5EF4-FFF2-40B4-BE49-F238E27FC236}">
-                <a16:creationId xmlns:a16="http://schemas.microsoft.com/office/drawing/2014/main" id="{B7D36768-6050-4E0D-871E-233AD20383DB}"/>
-              </a:ext>
-            </a:extLst>
-          </p:cNvPr>
+          <p:cNvPr id="2" name="Title Placeholder 1"/>
           <p:cNvSpPr>
             <a:spLocks noGrp="1"/>
           </p:cNvSpPr>
@@ -2800,8 +2450,8 @@
         </p:nvSpPr>
         <p:spPr>
           <a:xfrm>
-            <a:off x="838200" y="365125"/>
-            <a:ext cx="10515600" cy="1325563"/>
+            <a:off x="942975" y="438150"/>
+            <a:ext cx="11830050" cy="1590676"/>
           </a:xfrm>
           <a:prstGeom prst="rect">
             <a:avLst/>
@@ -2817,19 +2467,13 @@
               <a:rPr lang="en-US"/>
               <a:t>Click to edit Master title style</a:t>
             </a:r>
-            <a:endParaRPr lang="es-UY"/>
-          </a:p>
-        </p:txBody>
-      </p:sp>
-      <p:sp>
-        <p:nvSpPr>
-          <p:cNvPr id="3" name="Text Placeholder 2">
-            <a:extLst>
-              <a:ext uri="{FF2B5EF4-FFF2-40B4-BE49-F238E27FC236}">
-                <a16:creationId xmlns:a16="http://schemas.microsoft.com/office/drawing/2014/main" id="{D7F898FA-4787-4725-B63B-76B9B77EF01F}"/>
-              </a:ext>
-            </a:extLst>
-          </p:cNvPr>
+            <a:endParaRPr lang="en-US" dirty="0"/>
+          </a:p>
+        </p:txBody>
+      </p:sp>
+      <p:sp>
+        <p:nvSpPr>
+          <p:cNvPr id="3" name="Text Placeholder 2"/>
           <p:cNvSpPr>
             <a:spLocks noGrp="1"/>
           </p:cNvSpPr>
@@ -2839,8 +2483,8 @@
         </p:nvSpPr>
         <p:spPr>
           <a:xfrm>
-            <a:off x="838200" y="1825625"/>
-            <a:ext cx="10515600" cy="4351338"/>
+            <a:off x="942975" y="2190750"/>
+            <a:ext cx="11830050" cy="5221606"/>
           </a:xfrm>
           <a:prstGeom prst="rect">
             <a:avLst/>
@@ -2885,19 +2529,13 @@
               <a:rPr lang="en-US"/>
               <a:t>Fifth level</a:t>
             </a:r>
-            <a:endParaRPr lang="es-UY"/>
-          </a:p>
-        </p:txBody>
-      </p:sp>
-      <p:sp>
-        <p:nvSpPr>
-          <p:cNvPr id="4" name="Date Placeholder 3">
-            <a:extLst>
-              <a:ext uri="{FF2B5EF4-FFF2-40B4-BE49-F238E27FC236}">
-                <a16:creationId xmlns:a16="http://schemas.microsoft.com/office/drawing/2014/main" id="{D9F67C3F-CFD6-4003-BC1B-EA1B8687268B}"/>
-              </a:ext>
-            </a:extLst>
-          </p:cNvPr>
+            <a:endParaRPr lang="en-US" dirty="0"/>
+          </a:p>
+        </p:txBody>
+      </p:sp>
+      <p:sp>
+        <p:nvSpPr>
+          <p:cNvPr id="4" name="Date Placeholder 3"/>
           <p:cNvSpPr>
             <a:spLocks noGrp="1"/>
           </p:cNvSpPr>
@@ -2907,8 +2545,8 @@
         </p:nvSpPr>
         <p:spPr>
           <a:xfrm>
-            <a:off x="838200" y="6356350"/>
-            <a:ext cx="2743200" cy="365125"/>
+            <a:off x="942975" y="7627621"/>
+            <a:ext cx="3086100" cy="438150"/>
           </a:xfrm>
           <a:prstGeom prst="rect">
             <a:avLst/>
@@ -2918,7 +2556,7 @@
           <a:bodyPr vert="horz" lIns="91440" tIns="45720" rIns="91440" bIns="45720" rtlCol="0" anchor="ctr"/>
           <a:lstStyle>
             <a:lvl1pPr algn="l">
-              <a:defRPr sz="1200">
+              <a:defRPr sz="1350">
                 <a:solidFill>
                   <a:schemeClr val="tx1">
                     <a:tint val="75000"/>
@@ -2938,13 +2576,7 @@
       </p:sp>
       <p:sp>
         <p:nvSpPr>
-          <p:cNvPr id="5" name="Footer Placeholder 4">
-            <a:extLst>
-              <a:ext uri="{FF2B5EF4-FFF2-40B4-BE49-F238E27FC236}">
-                <a16:creationId xmlns:a16="http://schemas.microsoft.com/office/drawing/2014/main" id="{63787A6D-A63E-40B0-8C43-0DB7313E51C9}"/>
-              </a:ext>
-            </a:extLst>
-          </p:cNvPr>
+          <p:cNvPr id="5" name="Footer Placeholder 4"/>
           <p:cNvSpPr>
             <a:spLocks noGrp="1"/>
           </p:cNvSpPr>
@@ -2954,8 +2586,8 @@
         </p:nvSpPr>
         <p:spPr>
           <a:xfrm>
-            <a:off x="4038600" y="6356350"/>
-            <a:ext cx="4114800" cy="365125"/>
+            <a:off x="4543425" y="7627621"/>
+            <a:ext cx="4629150" cy="438150"/>
           </a:xfrm>
           <a:prstGeom prst="rect">
             <a:avLst/>
@@ -2965,7 +2597,7 @@
           <a:bodyPr vert="horz" lIns="91440" tIns="45720" rIns="91440" bIns="45720" rtlCol="0" anchor="ctr"/>
           <a:lstStyle>
             <a:lvl1pPr algn="ctr">
-              <a:defRPr sz="1200">
+              <a:defRPr sz="1350">
                 <a:solidFill>
                   <a:schemeClr val="tx1">
                     <a:tint val="75000"/>
@@ -2981,13 +2613,7 @@
       </p:sp>
       <p:sp>
         <p:nvSpPr>
-          <p:cNvPr id="6" name="Slide Number Placeholder 5">
-            <a:extLst>
-              <a:ext uri="{FF2B5EF4-FFF2-40B4-BE49-F238E27FC236}">
-                <a16:creationId xmlns:a16="http://schemas.microsoft.com/office/drawing/2014/main" id="{68EC30A3-B924-4B9C-8B92-0572D0F44EF1}"/>
-              </a:ext>
-            </a:extLst>
-          </p:cNvPr>
+          <p:cNvPr id="6" name="Slide Number Placeholder 5"/>
           <p:cNvSpPr>
             <a:spLocks noGrp="1"/>
           </p:cNvSpPr>
@@ -2997,8 +2623,8 @@
         </p:nvSpPr>
         <p:spPr>
           <a:xfrm>
-            <a:off x="8610600" y="6356350"/>
-            <a:ext cx="2743200" cy="365125"/>
+            <a:off x="9686925" y="7627621"/>
+            <a:ext cx="3086100" cy="438150"/>
           </a:xfrm>
           <a:prstGeom prst="rect">
             <a:avLst/>
@@ -3008,7 +2634,7 @@
           <a:bodyPr vert="horz" lIns="91440" tIns="45720" rIns="91440" bIns="45720" rtlCol="0" anchor="ctr"/>
           <a:lstStyle>
             <a:lvl1pPr algn="r">
-              <a:defRPr sz="1200">
+              <a:defRPr sz="1350">
                 <a:solidFill>
                   <a:schemeClr val="tx1">
                     <a:tint val="75000"/>
@@ -3029,27 +2655,27 @@
     </p:spTree>
     <p:extLst>
       <p:ext uri="{BB962C8B-B14F-4D97-AF65-F5344CB8AC3E}">
-        <p14:creationId xmlns:p14="http://schemas.microsoft.com/office/powerpoint/2010/main" val="1039528329"/>
+        <p14:creationId xmlns:p14="http://schemas.microsoft.com/office/powerpoint/2010/main" val="2238333648"/>
       </p:ext>
     </p:extLst>
   </p:cSld>
   <p:clrMap bg1="lt1" tx1="dk1" bg2="lt2" tx2="dk2" accent1="accent1" accent2="accent2" accent3="accent3" accent4="accent4" accent5="accent5" accent6="accent6" hlink="hlink" folHlink="folHlink"/>
   <p:sldLayoutIdLst>
-    <p:sldLayoutId id="2147483649" r:id="rId1"/>
-    <p:sldLayoutId id="2147483650" r:id="rId2"/>
-    <p:sldLayoutId id="2147483651" r:id="rId3"/>
-    <p:sldLayoutId id="2147483652" r:id="rId4"/>
-    <p:sldLayoutId id="2147483653" r:id="rId5"/>
-    <p:sldLayoutId id="2147483654" r:id="rId6"/>
-    <p:sldLayoutId id="2147483655" r:id="rId7"/>
-    <p:sldLayoutId id="2147483656" r:id="rId8"/>
-    <p:sldLayoutId id="2147483657" r:id="rId9"/>
-    <p:sldLayoutId id="2147483658" r:id="rId10"/>
-    <p:sldLayoutId id="2147483659" r:id="rId11"/>
+    <p:sldLayoutId id="2147483685" r:id="rId1"/>
+    <p:sldLayoutId id="2147483686" r:id="rId2"/>
+    <p:sldLayoutId id="2147483687" r:id="rId3"/>
+    <p:sldLayoutId id="2147483688" r:id="rId4"/>
+    <p:sldLayoutId id="2147483689" r:id="rId5"/>
+    <p:sldLayoutId id="2147483690" r:id="rId6"/>
+    <p:sldLayoutId id="2147483691" r:id="rId7"/>
+    <p:sldLayoutId id="2147483692" r:id="rId8"/>
+    <p:sldLayoutId id="2147483693" r:id="rId9"/>
+    <p:sldLayoutId id="2147483694" r:id="rId10"/>
+    <p:sldLayoutId id="2147483695" r:id="rId11"/>
   </p:sldLayoutIdLst>
   <p:txStyles>
     <p:titleStyle>
-      <a:lvl1pPr algn="l" defTabSz="914400" rtl="0" eaLnBrk="1" latinLnBrk="0" hangingPunct="1">
+      <a:lvl1pPr algn="l" defTabSz="1028700" rtl="0" eaLnBrk="1" latinLnBrk="0" hangingPunct="1">
         <a:lnSpc>
           <a:spcPct val="90000"/>
         </a:lnSpc>
@@ -3057,7 +2683,7 @@
           <a:spcPct val="0"/>
         </a:spcBef>
         <a:buNone/>
-        <a:defRPr sz="4400" kern="1200">
+        <a:defRPr sz="4950" kern="1200">
           <a:solidFill>
             <a:schemeClr val="tx1"/>
           </a:solidFill>
@@ -3068,16 +2694,16 @@
       </a:lvl1pPr>
     </p:titleStyle>
     <p:bodyStyle>
-      <a:lvl1pPr marL="228600" indent="-228600" algn="l" defTabSz="914400" rtl="0" eaLnBrk="1" latinLnBrk="0" hangingPunct="1">
+      <a:lvl1pPr marL="257175" indent="-257175" algn="l" defTabSz="1028700" rtl="0" eaLnBrk="1" latinLnBrk="0" hangingPunct="1">
         <a:lnSpc>
           <a:spcPct val="90000"/>
         </a:lnSpc>
         <a:spcBef>
-          <a:spcPts val="1000"/>
+          <a:spcPts val="1125"/>
         </a:spcBef>
         <a:buFont typeface="Arial" panose="020B0604020202020204" pitchFamily="34" charset="0"/>
         <a:buChar char="•"/>
-        <a:defRPr sz="2800" kern="1200">
+        <a:defRPr sz="3150" kern="1200">
           <a:solidFill>
             <a:schemeClr val="tx1"/>
           </a:solidFill>
@@ -3086,16 +2712,16 @@
           <a:cs typeface="+mn-cs"/>
         </a:defRPr>
       </a:lvl1pPr>
-      <a:lvl2pPr marL="685800" indent="-228600" algn="l" defTabSz="914400" rtl="0" eaLnBrk="1" latinLnBrk="0" hangingPunct="1">
+      <a:lvl2pPr marL="771525" indent="-257175" algn="l" defTabSz="1028700" rtl="0" eaLnBrk="1" latinLnBrk="0" hangingPunct="1">
         <a:lnSpc>
           <a:spcPct val="90000"/>
         </a:lnSpc>
         <a:spcBef>
-          <a:spcPts val="500"/>
+          <a:spcPts val="563"/>
         </a:spcBef>
         <a:buFont typeface="Arial" panose="020B0604020202020204" pitchFamily="34" charset="0"/>
         <a:buChar char="•"/>
-        <a:defRPr sz="2400" kern="1200">
+        <a:defRPr sz="2700" kern="1200">
           <a:solidFill>
             <a:schemeClr val="tx1"/>
           </a:solidFill>
@@ -3104,16 +2730,16 @@
           <a:cs typeface="+mn-cs"/>
         </a:defRPr>
       </a:lvl2pPr>
-      <a:lvl3pPr marL="1143000" indent="-228600" algn="l" defTabSz="914400" rtl="0" eaLnBrk="1" latinLnBrk="0" hangingPunct="1">
+      <a:lvl3pPr marL="1285875" indent="-257175" algn="l" defTabSz="1028700" rtl="0" eaLnBrk="1" latinLnBrk="0" hangingPunct="1">
         <a:lnSpc>
           <a:spcPct val="90000"/>
         </a:lnSpc>
         <a:spcBef>
-          <a:spcPts val="500"/>
+          <a:spcPts val="563"/>
         </a:spcBef>
         <a:buFont typeface="Arial" panose="020B0604020202020204" pitchFamily="34" charset="0"/>
         <a:buChar char="•"/>
-        <a:defRPr sz="2000" kern="1200">
+        <a:defRPr sz="2250" kern="1200">
           <a:solidFill>
             <a:schemeClr val="tx1"/>
           </a:solidFill>
@@ -3122,16 +2748,16 @@
           <a:cs typeface="+mn-cs"/>
         </a:defRPr>
       </a:lvl3pPr>
-      <a:lvl4pPr marL="1600200" indent="-228600" algn="l" defTabSz="914400" rtl="0" eaLnBrk="1" latinLnBrk="0" hangingPunct="1">
+      <a:lvl4pPr marL="1800225" indent="-257175" algn="l" defTabSz="1028700" rtl="0" eaLnBrk="1" latinLnBrk="0" hangingPunct="1">
         <a:lnSpc>
           <a:spcPct val="90000"/>
         </a:lnSpc>
         <a:spcBef>
-          <a:spcPts val="500"/>
+          <a:spcPts val="563"/>
         </a:spcBef>
         <a:buFont typeface="Arial" panose="020B0604020202020204" pitchFamily="34" charset="0"/>
         <a:buChar char="•"/>
-        <a:defRPr sz="1800" kern="1200">
+        <a:defRPr sz="2025" kern="1200">
           <a:solidFill>
             <a:schemeClr val="tx1"/>
           </a:solidFill>
@@ -3140,16 +2766,16 @@
           <a:cs typeface="+mn-cs"/>
         </a:defRPr>
       </a:lvl4pPr>
-      <a:lvl5pPr marL="2057400" indent="-228600" algn="l" defTabSz="914400" rtl="0" eaLnBrk="1" latinLnBrk="0" hangingPunct="1">
+      <a:lvl5pPr marL="2314575" indent="-257175" algn="l" defTabSz="1028700" rtl="0" eaLnBrk="1" latinLnBrk="0" hangingPunct="1">
         <a:lnSpc>
           <a:spcPct val="90000"/>
         </a:lnSpc>
         <a:spcBef>
-          <a:spcPts val="500"/>
+          <a:spcPts val="563"/>
         </a:spcBef>
         <a:buFont typeface="Arial" panose="020B0604020202020204" pitchFamily="34" charset="0"/>
         <a:buChar char="•"/>
-        <a:defRPr sz="1800" kern="1200">
+        <a:defRPr sz="2025" kern="1200">
           <a:solidFill>
             <a:schemeClr val="tx1"/>
           </a:solidFill>
@@ -3158,16 +2784,16 @@
           <a:cs typeface="+mn-cs"/>
         </a:defRPr>
       </a:lvl5pPr>
-      <a:lvl6pPr marL="2514600" indent="-228600" algn="l" defTabSz="914400" rtl="0" eaLnBrk="1" latinLnBrk="0" hangingPunct="1">
+      <a:lvl6pPr marL="2828925" indent="-257175" algn="l" defTabSz="1028700" rtl="0" eaLnBrk="1" latinLnBrk="0" hangingPunct="1">
         <a:lnSpc>
           <a:spcPct val="90000"/>
         </a:lnSpc>
         <a:spcBef>
-          <a:spcPts val="500"/>
+          <a:spcPts val="563"/>
         </a:spcBef>
         <a:buFont typeface="Arial" panose="020B0604020202020204" pitchFamily="34" charset="0"/>
         <a:buChar char="•"/>
-        <a:defRPr sz="1800" kern="1200">
+        <a:defRPr sz="2025" kern="1200">
           <a:solidFill>
             <a:schemeClr val="tx1"/>
           </a:solidFill>
@@ -3176,16 +2802,16 @@
           <a:cs typeface="+mn-cs"/>
         </a:defRPr>
       </a:lvl6pPr>
-      <a:lvl7pPr marL="2971800" indent="-228600" algn="l" defTabSz="914400" rtl="0" eaLnBrk="1" latinLnBrk="0" hangingPunct="1">
+      <a:lvl7pPr marL="3343275" indent="-257175" algn="l" defTabSz="1028700" rtl="0" eaLnBrk="1" latinLnBrk="0" hangingPunct="1">
         <a:lnSpc>
           <a:spcPct val="90000"/>
         </a:lnSpc>
         <a:spcBef>
-          <a:spcPts val="500"/>
+          <a:spcPts val="563"/>
         </a:spcBef>
         <a:buFont typeface="Arial" panose="020B0604020202020204" pitchFamily="34" charset="0"/>
         <a:buChar char="•"/>
-        <a:defRPr sz="1800" kern="1200">
+        <a:defRPr sz="2025" kern="1200">
           <a:solidFill>
             <a:schemeClr val="tx1"/>
           </a:solidFill>
@@ -3194,16 +2820,16 @@
           <a:cs typeface="+mn-cs"/>
         </a:defRPr>
       </a:lvl7pPr>
-      <a:lvl8pPr marL="3429000" indent="-228600" algn="l" defTabSz="914400" rtl="0" eaLnBrk="1" latinLnBrk="0" hangingPunct="1">
+      <a:lvl8pPr marL="3857625" indent="-257175" algn="l" defTabSz="1028700" rtl="0" eaLnBrk="1" latinLnBrk="0" hangingPunct="1">
         <a:lnSpc>
           <a:spcPct val="90000"/>
         </a:lnSpc>
         <a:spcBef>
-          <a:spcPts val="500"/>
+          <a:spcPts val="563"/>
         </a:spcBef>
         <a:buFont typeface="Arial" panose="020B0604020202020204" pitchFamily="34" charset="0"/>
         <a:buChar char="•"/>
-        <a:defRPr sz="1800" kern="1200">
+        <a:defRPr sz="2025" kern="1200">
           <a:solidFill>
             <a:schemeClr val="tx1"/>
           </a:solidFill>
@@ -3212,16 +2838,16 @@
           <a:cs typeface="+mn-cs"/>
         </a:defRPr>
       </a:lvl8pPr>
-      <a:lvl9pPr marL="3886200" indent="-228600" algn="l" defTabSz="914400" rtl="0" eaLnBrk="1" latinLnBrk="0" hangingPunct="1">
+      <a:lvl9pPr marL="4371975" indent="-257175" algn="l" defTabSz="1028700" rtl="0" eaLnBrk="1" latinLnBrk="0" hangingPunct="1">
         <a:lnSpc>
           <a:spcPct val="90000"/>
         </a:lnSpc>
         <a:spcBef>
-          <a:spcPts val="500"/>
+          <a:spcPts val="563"/>
         </a:spcBef>
         <a:buFont typeface="Arial" panose="020B0604020202020204" pitchFamily="34" charset="0"/>
         <a:buChar char="•"/>
-        <a:defRPr sz="1800" kern="1200">
+        <a:defRPr sz="2025" kern="1200">
           <a:solidFill>
             <a:schemeClr val="tx1"/>
           </a:solidFill>
@@ -3233,10 +2859,10 @@
     </p:bodyStyle>
     <p:otherStyle>
       <a:defPPr>
-        <a:defRPr lang="es-UY"/>
+        <a:defRPr lang="en-US"/>
       </a:defPPr>
-      <a:lvl1pPr marL="0" algn="l" defTabSz="914400" rtl="0" eaLnBrk="1" latinLnBrk="0" hangingPunct="1">
-        <a:defRPr sz="1800" kern="1200">
+      <a:lvl1pPr marL="0" algn="l" defTabSz="1028700" rtl="0" eaLnBrk="1" latinLnBrk="0" hangingPunct="1">
+        <a:defRPr sz="2025" kern="1200">
           <a:solidFill>
             <a:schemeClr val="tx1"/>
           </a:solidFill>
@@ -3245,8 +2871,8 @@
           <a:cs typeface="+mn-cs"/>
         </a:defRPr>
       </a:lvl1pPr>
-      <a:lvl2pPr marL="457200" algn="l" defTabSz="914400" rtl="0" eaLnBrk="1" latinLnBrk="0" hangingPunct="1">
-        <a:defRPr sz="1800" kern="1200">
+      <a:lvl2pPr marL="514350" algn="l" defTabSz="1028700" rtl="0" eaLnBrk="1" latinLnBrk="0" hangingPunct="1">
+        <a:defRPr sz="2025" kern="1200">
           <a:solidFill>
             <a:schemeClr val="tx1"/>
           </a:solidFill>
@@ -3255,8 +2881,8 @@
           <a:cs typeface="+mn-cs"/>
         </a:defRPr>
       </a:lvl2pPr>
-      <a:lvl3pPr marL="914400" algn="l" defTabSz="914400" rtl="0" eaLnBrk="1" latinLnBrk="0" hangingPunct="1">
-        <a:defRPr sz="1800" kern="1200">
+      <a:lvl3pPr marL="1028700" algn="l" defTabSz="1028700" rtl="0" eaLnBrk="1" latinLnBrk="0" hangingPunct="1">
+        <a:defRPr sz="2025" kern="1200">
           <a:solidFill>
             <a:schemeClr val="tx1"/>
           </a:solidFill>
@@ -3265,8 +2891,8 @@
           <a:cs typeface="+mn-cs"/>
         </a:defRPr>
       </a:lvl3pPr>
-      <a:lvl4pPr marL="1371600" algn="l" defTabSz="914400" rtl="0" eaLnBrk="1" latinLnBrk="0" hangingPunct="1">
-        <a:defRPr sz="1800" kern="1200">
+      <a:lvl4pPr marL="1543050" algn="l" defTabSz="1028700" rtl="0" eaLnBrk="1" latinLnBrk="0" hangingPunct="1">
+        <a:defRPr sz="2025" kern="1200">
           <a:solidFill>
             <a:schemeClr val="tx1"/>
           </a:solidFill>
@@ -3275,8 +2901,8 @@
           <a:cs typeface="+mn-cs"/>
         </a:defRPr>
       </a:lvl4pPr>
-      <a:lvl5pPr marL="1828800" algn="l" defTabSz="914400" rtl="0" eaLnBrk="1" latinLnBrk="0" hangingPunct="1">
-        <a:defRPr sz="1800" kern="1200">
+      <a:lvl5pPr marL="2057400" algn="l" defTabSz="1028700" rtl="0" eaLnBrk="1" latinLnBrk="0" hangingPunct="1">
+        <a:defRPr sz="2025" kern="1200">
           <a:solidFill>
             <a:schemeClr val="tx1"/>
           </a:solidFill>
@@ -3285,8 +2911,8 @@
           <a:cs typeface="+mn-cs"/>
         </a:defRPr>
       </a:lvl5pPr>
-      <a:lvl6pPr marL="2286000" algn="l" defTabSz="914400" rtl="0" eaLnBrk="1" latinLnBrk="0" hangingPunct="1">
-        <a:defRPr sz="1800" kern="1200">
+      <a:lvl6pPr marL="2571750" algn="l" defTabSz="1028700" rtl="0" eaLnBrk="1" latinLnBrk="0" hangingPunct="1">
+        <a:defRPr sz="2025" kern="1200">
           <a:solidFill>
             <a:schemeClr val="tx1"/>
           </a:solidFill>
@@ -3295,8 +2921,8 @@
           <a:cs typeface="+mn-cs"/>
         </a:defRPr>
       </a:lvl6pPr>
-      <a:lvl7pPr marL="2743200" algn="l" defTabSz="914400" rtl="0" eaLnBrk="1" latinLnBrk="0" hangingPunct="1">
-        <a:defRPr sz="1800" kern="1200">
+      <a:lvl7pPr marL="3086100" algn="l" defTabSz="1028700" rtl="0" eaLnBrk="1" latinLnBrk="0" hangingPunct="1">
+        <a:defRPr sz="2025" kern="1200">
           <a:solidFill>
             <a:schemeClr val="tx1"/>
           </a:solidFill>
@@ -3305,8 +2931,8 @@
           <a:cs typeface="+mn-cs"/>
         </a:defRPr>
       </a:lvl7pPr>
-      <a:lvl8pPr marL="3200400" algn="l" defTabSz="914400" rtl="0" eaLnBrk="1" latinLnBrk="0" hangingPunct="1">
-        <a:defRPr sz="1800" kern="1200">
+      <a:lvl8pPr marL="3600450" algn="l" defTabSz="1028700" rtl="0" eaLnBrk="1" latinLnBrk="0" hangingPunct="1">
+        <a:defRPr sz="2025" kern="1200">
           <a:solidFill>
             <a:schemeClr val="tx1"/>
           </a:solidFill>
@@ -3315,8 +2941,8 @@
           <a:cs typeface="+mn-cs"/>
         </a:defRPr>
       </a:lvl8pPr>
-      <a:lvl9pPr marL="3657600" algn="l" defTabSz="914400" rtl="0" eaLnBrk="1" latinLnBrk="0" hangingPunct="1">
-        <a:defRPr sz="1800" kern="1200">
+      <a:lvl9pPr marL="4114800" algn="l" defTabSz="1028700" rtl="0" eaLnBrk="1" latinLnBrk="0" hangingPunct="1">
+        <a:defRPr sz="2025" kern="1200">
           <a:solidFill>
             <a:schemeClr val="tx1"/>
           </a:solidFill>
@@ -3361,7 +2987,7 @@
         </p:nvSpPr>
         <p:spPr>
           <a:xfrm>
-            <a:off x="214573" y="4182534"/>
+            <a:off x="1306778" y="5681134"/>
             <a:ext cx="2523301" cy="2396066"/>
           </a:xfrm>
           <a:prstGeom prst="rect">
@@ -3398,7 +3024,7 @@
           </a:fontRef>
         </p:style>
         <p:txBody>
-          <a:bodyPr rot="0" spcFirstLastPara="0" vertOverflow="overflow" horzOverflow="overflow" vert="horz" wrap="square" lIns="91440" tIns="45720" rIns="91440" bIns="45720" numCol="1" spcCol="0" rtlCol="0" fromWordArt="0" anchor="ctr" anchorCtr="0" forceAA="0" compatLnSpc="1">
+          <a:bodyPr rot="0" spcFirstLastPara="0" vertOverflow="overflow" horzOverflow="overflow" vert="horz" wrap="square" lIns="91441" tIns="45720" rIns="91441" bIns="45720" numCol="1" spcCol="0" rtlCol="0" fromWordArt="0" anchor="ctr" anchorCtr="0" forceAA="0" compatLnSpc="1">
             <a:prstTxWarp prst="textNoShape">
               <a:avLst/>
             </a:prstTxWarp>
@@ -3407,7 +3033,7 @@
           <a:lstStyle/>
           <a:p>
             <a:pPr algn="ctr"/>
-            <a:endParaRPr lang="es-UY"/>
+            <a:endParaRPr lang="es-UY" sz="1452"/>
           </a:p>
         </p:txBody>
       </p:sp>
@@ -3425,8 +3051,8 @@
         </p:nvSpPr>
         <p:spPr>
           <a:xfrm>
-            <a:off x="848947" y="4315824"/>
-            <a:ext cx="1252266" cy="369332"/>
+            <a:off x="2043741" y="5814425"/>
+            <a:ext cx="1047082" cy="315792"/>
           </a:xfrm>
           <a:prstGeom prst="rect">
             <a:avLst/>
@@ -3441,12 +3067,12 @@
           <a:p>
             <a:pPr algn="ctr"/>
             <a:r>
-              <a:rPr lang="es-AR" dirty="0" err="1">
+              <a:rPr lang="es-AR" sz="1452" dirty="0" err="1">
                 <a:latin typeface="Berlin Sans FB" panose="020E0602020502020306" pitchFamily="34" charset="0"/>
               </a:rPr>
               <a:t>EEGLogger</a:t>
             </a:r>
-            <a:endParaRPr lang="es-UY" dirty="0">
+            <a:endParaRPr lang="es-UY" sz="1452" dirty="0">
               <a:latin typeface="Berlin Sans FB" panose="020E0602020502020306" pitchFamily="34" charset="0"/>
             </a:endParaRPr>
           </a:p>
@@ -3466,7 +3092,7 @@
         </p:nvSpPr>
         <p:spPr>
           <a:xfrm>
-            <a:off x="464695" y="4723937"/>
+            <a:off x="1556900" y="6222538"/>
             <a:ext cx="1993897" cy="1815882"/>
           </a:xfrm>
           <a:prstGeom prst="rect">
@@ -3538,7 +3164,7 @@
         </p:nvSpPr>
         <p:spPr>
           <a:xfrm>
-            <a:off x="3993532" y="4182534"/>
+            <a:off x="5058409" y="5685368"/>
             <a:ext cx="3494381" cy="2396066"/>
           </a:xfrm>
           <a:prstGeom prst="rect">
@@ -3575,7 +3201,7 @@
           </a:fontRef>
         </p:style>
         <p:txBody>
-          <a:bodyPr rot="0" spcFirstLastPara="0" vertOverflow="overflow" horzOverflow="overflow" vert="horz" wrap="square" lIns="91440" tIns="45720" rIns="91440" bIns="45720" numCol="1" spcCol="0" rtlCol="0" fromWordArt="0" anchor="ctr" anchorCtr="0" forceAA="0" compatLnSpc="1">
+          <a:bodyPr rot="0" spcFirstLastPara="0" vertOverflow="overflow" horzOverflow="overflow" vert="horz" wrap="square" lIns="91441" tIns="45720" rIns="91441" bIns="45720" numCol="1" spcCol="0" rtlCol="0" fromWordArt="0" anchor="ctr" anchorCtr="0" forceAA="0" compatLnSpc="1">
             <a:prstTxWarp prst="textNoShape">
               <a:avLst/>
             </a:prstTxWarp>
@@ -3602,8 +3228,8 @@
         </p:nvSpPr>
         <p:spPr>
           <a:xfrm>
-            <a:off x="4895402" y="4312679"/>
-            <a:ext cx="1640194" cy="369332"/>
+            <a:off x="6128670" y="5811281"/>
+            <a:ext cx="1358064" cy="315792"/>
           </a:xfrm>
           <a:prstGeom prst="rect">
             <a:avLst/>
@@ -3618,12 +3244,12 @@
           <a:p>
             <a:pPr algn="ctr"/>
             <a:r>
-              <a:rPr lang="es-AR">
+              <a:rPr lang="es-AR" sz="1452">
                 <a:latin typeface="Berlin Sans FB" panose="020E0602020502020306" pitchFamily="34" charset="0"/>
               </a:rPr>
               <a:t>SignalProcessor</a:t>
             </a:r>
-            <a:endParaRPr lang="es-UY" dirty="0">
+            <a:endParaRPr lang="es-UY" sz="1452" dirty="0">
               <a:latin typeface="Berlin Sans FB" panose="020E0602020502020306" pitchFamily="34" charset="0"/>
             </a:endParaRPr>
           </a:p>
@@ -3643,8 +3269,8 @@
         </p:nvSpPr>
         <p:spPr>
           <a:xfrm>
-            <a:off x="4256126" y="4691932"/>
-            <a:ext cx="2935818" cy="1815882"/>
+            <a:off x="5348328" y="6190532"/>
+            <a:ext cx="2935819" cy="1814856"/>
           </a:xfrm>
           <a:prstGeom prst="rect">
             <a:avLst/>
@@ -3665,16 +3291,16 @@
           </a:bodyPr>
           <a:lstStyle/>
           <a:p>
-            <a:pPr marL="285750" indent="-285750" algn="ctr">
+            <a:pPr marL="285745" indent="-285745" algn="ctr">
               <a:buFont typeface="Arial" panose="020B0604020202020204" pitchFamily="34" charset="0"/>
               <a:buChar char="•"/>
             </a:pPr>
             <a:r>
-              <a:rPr lang="es-AR" sz="1400" dirty="0"/>
+              <a:rPr lang="es-AR" sz="1399" dirty="0"/>
               <a:t>Filtrado con </a:t>
             </a:r>
             <a:r>
-              <a:rPr lang="es-AR" sz="1400" dirty="0">
+              <a:rPr lang="es-AR" sz="1399" dirty="0">
                 <a:highlight>
                   <a:srgbClr val="FFFF00"/>
                 </a:highlight>
@@ -3683,16 +3309,16 @@
             </a:r>
           </a:p>
           <a:p>
-            <a:pPr marL="285750" indent="-285750" algn="ctr">
+            <a:pPr marL="285745" indent="-285745" algn="ctr">
               <a:buFont typeface="Arial" panose="020B0604020202020204" pitchFamily="34" charset="0"/>
               <a:buChar char="•"/>
             </a:pPr>
             <a:r>
-              <a:rPr lang="es-AR" sz="1400" dirty="0"/>
+              <a:rPr lang="es-AR" sz="1399" dirty="0"/>
               <a:t>Extracción de características con </a:t>
             </a:r>
             <a:r>
-              <a:rPr lang="es-AR" sz="1400" dirty="0">
+              <a:rPr lang="es-AR" sz="1399" dirty="0">
                 <a:highlight>
                   <a:srgbClr val="FFFF00"/>
                 </a:highlight>
@@ -3701,24 +3327,24 @@
             </a:r>
           </a:p>
           <a:p>
-            <a:pPr marL="285750" indent="-285750" algn="ctr">
+            <a:pPr marL="285745" indent="-285745" algn="ctr">
               <a:buFont typeface="Arial" panose="020B0604020202020204" pitchFamily="34" charset="0"/>
               <a:buChar char="•"/>
             </a:pPr>
             <a:r>
-              <a:rPr lang="es-AR" sz="1400" dirty="0"/>
+              <a:rPr lang="es-AR" sz="1399" dirty="0"/>
               <a:t>Clasificación </a:t>
             </a:r>
             <a:r>
-              <a:rPr lang="es-AR" sz="1400" dirty="0" err="1"/>
+              <a:rPr lang="es-AR" sz="1399" dirty="0" err="1"/>
               <a:t>onlnie</a:t>
             </a:r>
             <a:r>
-              <a:rPr lang="es-AR" sz="1400" dirty="0"/>
+              <a:rPr lang="es-AR" sz="1399" dirty="0"/>
               <a:t> con </a:t>
             </a:r>
             <a:r>
-              <a:rPr lang="es-AR" sz="1400" dirty="0">
+              <a:rPr lang="es-AR" sz="1399" dirty="0">
                 <a:highlight>
                   <a:srgbClr val="FFFF00"/>
                 </a:highlight>
@@ -3727,16 +3353,16 @@
             </a:r>
           </a:p>
           <a:p>
-            <a:pPr marL="285750" indent="-285750" algn="ctr">
+            <a:pPr marL="285745" indent="-285745" algn="ctr">
               <a:buFont typeface="Arial" panose="020B0604020202020204" pitchFamily="34" charset="0"/>
               <a:buChar char="•"/>
             </a:pPr>
             <a:r>
-              <a:rPr lang="es-AR" sz="1400" dirty="0"/>
+              <a:rPr lang="es-AR" sz="1399" dirty="0"/>
               <a:t>Entrenamiento de diferentes clasificadores (</a:t>
             </a:r>
             <a:r>
-              <a:rPr lang="es-AR" sz="1400" dirty="0" err="1">
+              <a:rPr lang="es-AR" sz="1399" dirty="0" err="1">
                 <a:highlight>
                   <a:srgbClr val="FFFF00"/>
                 </a:highlight>
@@ -3744,11 +3370,11 @@
               <a:t>SVMClassifier</a:t>
             </a:r>
             <a:r>
-              <a:rPr lang="es-AR" sz="1400" dirty="0"/>
+              <a:rPr lang="es-AR" sz="1399" dirty="0"/>
               <a:t>, </a:t>
             </a:r>
             <a:r>
-              <a:rPr lang="es-AR" sz="1400" dirty="0" err="1">
+              <a:rPr lang="es-AR" sz="1399" dirty="0" err="1">
                 <a:highlight>
                   <a:srgbClr val="FFFF00"/>
                 </a:highlight>
@@ -3756,10 +3382,10 @@
               <a:t>NeuralNetworkClassifier</a:t>
             </a:r>
             <a:r>
-              <a:rPr lang="es-AR" sz="1400" dirty="0"/>
+              <a:rPr lang="es-AR" sz="1399" dirty="0"/>
               <a:t>, etc.)</a:t>
             </a:r>
-            <a:endParaRPr lang="es-UY" sz="1400" dirty="0"/>
+            <a:endParaRPr lang="es-UY" sz="1399" dirty="0"/>
           </a:p>
         </p:txBody>
       </p:sp>
@@ -3777,7 +3403,7 @@
         </p:nvSpPr>
         <p:spPr>
           <a:xfrm>
-            <a:off x="8699553" y="4182534"/>
+            <a:off x="9791759" y="5681134"/>
             <a:ext cx="2523301" cy="2396066"/>
           </a:xfrm>
           <a:prstGeom prst="rect">
@@ -3814,7 +3440,7 @@
           </a:fontRef>
         </p:style>
         <p:txBody>
-          <a:bodyPr rot="0" spcFirstLastPara="0" vertOverflow="overflow" horzOverflow="overflow" vert="horz" wrap="square" lIns="91440" tIns="45720" rIns="91440" bIns="45720" numCol="1" spcCol="0" rtlCol="0" fromWordArt="0" anchor="ctr" anchorCtr="0" forceAA="0" compatLnSpc="1">
+          <a:bodyPr rot="0" spcFirstLastPara="0" vertOverflow="overflow" horzOverflow="overflow" vert="horz" wrap="square" lIns="91441" tIns="45720" rIns="91441" bIns="45720" numCol="1" spcCol="0" rtlCol="0" fromWordArt="0" anchor="ctr" anchorCtr="0" forceAA="0" compatLnSpc="1">
             <a:prstTxWarp prst="textNoShape">
               <a:avLst/>
             </a:prstTxWarp>
@@ -3823,7 +3449,7 @@
           <a:lstStyle/>
           <a:p>
             <a:pPr algn="ctr"/>
-            <a:endParaRPr lang="es-UY" dirty="0"/>
+            <a:endParaRPr lang="es-UY" sz="1452" dirty="0"/>
           </a:p>
         </p:txBody>
       </p:sp>
@@ -3841,8 +3467,8 @@
         </p:nvSpPr>
         <p:spPr>
           <a:xfrm>
-            <a:off x="9378683" y="4312679"/>
-            <a:ext cx="1154483" cy="369332"/>
+            <a:off x="10563062" y="5811281"/>
+            <a:ext cx="970137" cy="315792"/>
           </a:xfrm>
           <a:prstGeom prst="rect">
             <a:avLst/>
@@ -3857,12 +3483,12 @@
           <a:p>
             <a:pPr algn="ctr"/>
             <a:r>
-              <a:rPr lang="es-AR" dirty="0">
+              <a:rPr lang="es-AR" sz="1452" dirty="0">
                 <a:latin typeface="Berlin Sans FB" panose="020E0602020502020306" pitchFamily="34" charset="0"/>
               </a:rPr>
               <a:t>Messenger</a:t>
             </a:r>
-            <a:endParaRPr lang="es-UY" dirty="0">
+            <a:endParaRPr lang="es-UY" sz="1452" dirty="0">
               <a:latin typeface="Berlin Sans FB" panose="020E0602020502020306" pitchFamily="34" charset="0"/>
             </a:endParaRPr>
           </a:p>
@@ -3882,7 +3508,7 @@
         </p:nvSpPr>
         <p:spPr>
           <a:xfrm>
-            <a:off x="8958974" y="4884466"/>
+            <a:off x="10051179" y="6383068"/>
             <a:ext cx="1993897" cy="1569660"/>
           </a:xfrm>
           <a:prstGeom prst="rect">
@@ -3949,8 +3575,8 @@
         </p:nvCxnSpPr>
         <p:spPr>
           <a:xfrm>
-            <a:off x="1469791" y="3547636"/>
-            <a:ext cx="6433" cy="634898"/>
+            <a:off x="2561996" y="5046239"/>
+            <a:ext cx="6433" cy="634899"/>
           </a:xfrm>
           <a:prstGeom prst="straightConnector1">
             <a:avLst/>
@@ -3998,9 +3624,9 @@
           <p:nvPr/>
         </p:nvCxnSpPr>
         <p:spPr>
-          <a:xfrm>
-            <a:off x="5715496" y="3547636"/>
-            <a:ext cx="25227" cy="634898"/>
+          <a:xfrm flipH="1">
+            <a:off x="6805600" y="5046238"/>
+            <a:ext cx="2098" cy="639130"/>
           </a:xfrm>
           <a:prstGeom prst="straightConnector1">
             <a:avLst/>
@@ -4048,8 +3674,8 @@
         </p:nvCxnSpPr>
         <p:spPr>
           <a:xfrm>
-            <a:off x="9961204" y="3547636"/>
-            <a:ext cx="0" cy="634898"/>
+            <a:off x="11053404" y="5046239"/>
+            <a:ext cx="0" cy="634899"/>
           </a:xfrm>
           <a:prstGeom prst="straightConnector1">
             <a:avLst/>
@@ -4094,8 +3720,8 @@
         </p:nvGrpSpPr>
         <p:grpSpPr>
           <a:xfrm>
-            <a:off x="213424" y="2401266"/>
-            <a:ext cx="11004144" cy="1146370"/>
+            <a:off x="1305625" y="3899867"/>
+            <a:ext cx="11004145" cy="1146371"/>
             <a:chOff x="214573" y="2324965"/>
             <a:chExt cx="11004144" cy="1146370"/>
           </a:xfrm>
@@ -4155,7 +3781,7 @@
             <a:lstStyle/>
             <a:p>
               <a:pPr algn="ctr"/>
-              <a:endParaRPr lang="es-UY"/>
+              <a:endParaRPr lang="es-UY" sz="1452"/>
             </a:p>
           </p:txBody>
         </p:sp>
@@ -4173,8 +3799,8 @@
           </p:nvSpPr>
           <p:spPr>
             <a:xfrm>
-              <a:off x="4915310" y="2497771"/>
-              <a:ext cx="1329210" cy="400110"/>
+              <a:off x="5049942" y="2392214"/>
+              <a:ext cx="1329210" cy="1015662"/>
             </a:xfrm>
             <a:prstGeom prst="rect">
               <a:avLst/>
@@ -4194,7 +3820,28 @@
                 </a:rPr>
                 <a:t>Core Block</a:t>
               </a:r>
+            </a:p>
+            <a:p>
+              <a:pPr algn="ctr"/>
+              <a:endParaRPr lang="es-AR" sz="2000" dirty="0">
+                <a:latin typeface="Berlin Sans FB" panose="020E0602020502020306" pitchFamily="34" charset="0"/>
+              </a:endParaRPr>
+            </a:p>
+            <a:p>
+              <a:pPr algn="ctr"/>
+              <a:r>
+                <a:rPr lang="es-AR" sz="2000" dirty="0">
+                  <a:highlight>
+                    <a:srgbClr val="FFFF00"/>
+                  </a:highlight>
+                  <a:latin typeface="Berlin Sans FB" panose="020E0602020502020306" pitchFamily="34" charset="0"/>
+                </a:rPr>
+                <a:t>Core.py</a:t>
+              </a:r>
               <a:endParaRPr lang="es-UY" sz="2000" dirty="0">
+                <a:highlight>
+                  <a:srgbClr val="FFFF00"/>
+                </a:highlight>
                 <a:latin typeface="Berlin Sans FB" panose="020E0602020502020306" pitchFamily="34" charset="0"/>
               </a:endParaRPr>
             </a:p>
@@ -4214,8 +3861,8 @@
           </p:nvSpPr>
           <p:spPr>
             <a:xfrm>
-              <a:off x="8999354" y="2525044"/>
-              <a:ext cx="1925995" cy="646331"/>
+              <a:off x="8999353" y="2525044"/>
+              <a:ext cx="1925995" cy="539250"/>
             </a:xfrm>
             <a:prstGeom prst="rect">
               <a:avLst/>
@@ -4238,10 +3885,10 @@
             <a:p>
               <a:pPr algn="ctr"/>
               <a:r>
-                <a:rPr lang="es-AR" dirty="0"/>
+                <a:rPr lang="es-AR" sz="1452" dirty="0"/>
                 <a:t>Configuración de sistema</a:t>
               </a:r>
-              <a:endParaRPr lang="es-UY" dirty="0"/>
+              <a:endParaRPr lang="es-UY" sz="1452" dirty="0"/>
             </a:p>
           </p:txBody>
         </p:sp>
@@ -4264,8 +3911,8 @@
         </p:nvCxnSpPr>
         <p:spPr>
           <a:xfrm>
-            <a:off x="2737874" y="5380567"/>
-            <a:ext cx="1255658" cy="0"/>
+            <a:off x="3830079" y="6879167"/>
+            <a:ext cx="1228330" cy="4234"/>
           </a:xfrm>
           <a:prstGeom prst="straightConnector1">
             <a:avLst/>
@@ -4312,9 +3959,9 @@
           <p:nvPr/>
         </p:nvCxnSpPr>
         <p:spPr>
-          <a:xfrm>
-            <a:off x="7487913" y="5380567"/>
-            <a:ext cx="1211640" cy="0"/>
+          <a:xfrm flipV="1">
+            <a:off x="8552790" y="6879167"/>
+            <a:ext cx="1238969" cy="4234"/>
           </a:xfrm>
           <a:prstGeom prst="straightConnector1">
             <a:avLst/>
@@ -4361,7 +4008,7 @@
         </p:nvCxnSpPr>
         <p:spPr>
           <a:xfrm>
-            <a:off x="11222854" y="5380567"/>
+            <a:off x="12315059" y="6879167"/>
             <a:ext cx="825213" cy="0"/>
           </a:xfrm>
           <a:prstGeom prst="straightConnector1">
@@ -4406,8 +4053,8 @@
         </p:nvSpPr>
         <p:spPr>
           <a:xfrm>
-            <a:off x="2840936" y="4848654"/>
-            <a:ext cx="851580" cy="461665"/>
+            <a:off x="3933139" y="6347259"/>
+            <a:ext cx="851579" cy="461665"/>
           </a:xfrm>
           <a:prstGeom prst="rect">
             <a:avLst/>
@@ -4450,7 +4097,7 @@
         </p:nvSpPr>
         <p:spPr>
           <a:xfrm>
-            <a:off x="2789639" y="5484387"/>
+            <a:off x="3881844" y="6982992"/>
             <a:ext cx="954173" cy="276999"/>
           </a:xfrm>
           <a:prstGeom prst="rect">
@@ -4487,7 +4134,7 @@
         </p:nvSpPr>
         <p:spPr>
           <a:xfrm>
-            <a:off x="7547673" y="4848653"/>
+            <a:off x="8639877" y="6347259"/>
             <a:ext cx="1066895" cy="461665"/>
           </a:xfrm>
           <a:prstGeom prst="rect">
@@ -4524,45 +4171,8 @@
         </p:nvSpPr>
         <p:spPr>
           <a:xfrm>
-            <a:off x="7604034" y="5484387"/>
+            <a:off x="8696239" y="6982992"/>
             <a:ext cx="954173" cy="276999"/>
-          </a:xfrm>
-          <a:prstGeom prst="rect">
-            <a:avLst/>
-          </a:prstGeom>
-          <a:noFill/>
-        </p:spPr>
-        <p:txBody>
-          <a:bodyPr wrap="square" rtlCol="0">
-            <a:spAutoFit/>
-          </a:bodyPr>
-          <a:lstStyle/>
-          <a:p>
-            <a:pPr algn="ctr"/>
-            <a:r>
-              <a:rPr lang="es-AR" sz="1200" dirty="0"/>
-              <a:t>Eventos</a:t>
-            </a:r>
-            <a:endParaRPr lang="es-UY" sz="1200" dirty="0"/>
-          </a:p>
-        </p:txBody>
-      </p:sp>
-      <p:sp>
-        <p:nvSpPr>
-          <p:cNvPr id="59" name="TextBox 58">
-            <a:extLst>
-              <a:ext uri="{FF2B5EF4-FFF2-40B4-BE49-F238E27FC236}">
-                <a16:creationId xmlns:a16="http://schemas.microsoft.com/office/drawing/2014/main" id="{EC53F43E-D161-4C4E-BB29-E1618FFBD218}"/>
-              </a:ext>
-            </a:extLst>
-          </p:cNvPr>
-          <p:cNvSpPr txBox="1"/>
-          <p:nvPr/>
-        </p:nvSpPr>
-        <p:spPr>
-          <a:xfrm>
-            <a:off x="5140298" y="7070132"/>
-            <a:ext cx="1150397" cy="276999"/>
           </a:xfrm>
           <a:prstGeom prst="rect">
             <a:avLst/>
@@ -4598,8 +4208,8 @@
         </p:nvSpPr>
         <p:spPr>
           <a:xfrm>
-            <a:off x="137989" y="258132"/>
-            <a:ext cx="3781805" cy="369332"/>
+            <a:off x="354015" y="102973"/>
+            <a:ext cx="3379451" cy="338554"/>
           </a:xfrm>
           <a:prstGeom prst="rect">
             <a:avLst/>
@@ -4613,12 +4223,12 @@
           <a:lstStyle/>
           <a:p>
             <a:r>
-              <a:rPr lang="es-AR" dirty="0">
+              <a:rPr lang="es-AR" sz="1600" dirty="0">
                 <a:latin typeface="Berlin Sans FB" panose="020E0602020502020306" pitchFamily="34" charset="0"/>
               </a:rPr>
-              <a:t>Diagrama de bloques para BCI – V1.3</a:t>
-            </a:r>
-            <a:endParaRPr lang="es-UY" dirty="0">
+              <a:t>Diagrama de bloques para BCI – V1.4</a:t>
+            </a:r>
+            <a:endParaRPr lang="es-UY" sz="1600" dirty="0">
               <a:latin typeface="Berlin Sans FB" panose="020E0602020502020306" pitchFamily="34" charset="0"/>
             </a:endParaRPr>
           </a:p>
@@ -4638,7 +4248,7 @@
         </p:nvSpPr>
         <p:spPr>
           <a:xfrm>
-            <a:off x="11125105" y="4638531"/>
+            <a:off x="12217309" y="6137136"/>
             <a:ext cx="1066895" cy="646331"/>
           </a:xfrm>
           <a:prstGeom prst="rect">
@@ -4675,8 +4285,8 @@
         </p:nvSpPr>
         <p:spPr>
           <a:xfrm>
-            <a:off x="8694267" y="147706"/>
-            <a:ext cx="2523301" cy="1821078"/>
+            <a:off x="9781187" y="752913"/>
+            <a:ext cx="2523301" cy="2370669"/>
           </a:xfrm>
           <a:prstGeom prst="rect">
             <a:avLst/>
@@ -4712,7 +4322,7 @@
           </a:fontRef>
         </p:style>
         <p:txBody>
-          <a:bodyPr rot="0" spcFirstLastPara="0" vertOverflow="overflow" horzOverflow="overflow" vert="horz" wrap="square" lIns="91440" tIns="45720" rIns="91440" bIns="45720" numCol="1" spcCol="0" rtlCol="0" fromWordArt="0" anchor="ctr" anchorCtr="0" forceAA="0" compatLnSpc="1">
+          <a:bodyPr rot="0" spcFirstLastPara="0" vertOverflow="overflow" horzOverflow="overflow" vert="horz" wrap="square" lIns="91441" tIns="45720" rIns="91441" bIns="45720" numCol="1" spcCol="0" rtlCol="0" fromWordArt="0" anchor="ctr" anchorCtr="0" forceAA="0" compatLnSpc="1">
             <a:prstTxWarp prst="textNoShape">
               <a:avLst/>
             </a:prstTxWarp>
@@ -4721,7 +4331,7 @@
           <a:lstStyle/>
           <a:p>
             <a:pPr algn="ctr"/>
-            <a:endParaRPr lang="es-UY"/>
+            <a:endParaRPr lang="es-UY" sz="1452"/>
           </a:p>
         </p:txBody>
       </p:sp>
@@ -4739,8 +4349,8 @@
         </p:nvSpPr>
         <p:spPr>
           <a:xfrm>
-            <a:off x="9677162" y="264830"/>
-            <a:ext cx="546945" cy="369332"/>
+            <a:off x="10606664" y="859866"/>
+            <a:ext cx="872355" cy="315792"/>
           </a:xfrm>
           <a:prstGeom prst="rect">
             <a:avLst/>
@@ -4755,12 +4365,12 @@
           <a:p>
             <a:pPr algn="ctr"/>
             <a:r>
-              <a:rPr lang="es-AR" dirty="0">
+              <a:rPr lang="es-AR" sz="1452" dirty="0" err="1">
                 <a:latin typeface="Berlin Sans FB" panose="020E0602020502020306" pitchFamily="34" charset="0"/>
               </a:rPr>
-              <a:t>GUI</a:t>
-            </a:r>
-            <a:endParaRPr lang="es-UY" dirty="0">
+              <a:t>Indicator</a:t>
+            </a:r>
+            <a:endParaRPr lang="es-UY" sz="1452" dirty="0">
               <a:latin typeface="Berlin Sans FB" panose="020E0602020502020306" pitchFamily="34" charset="0"/>
             </a:endParaRPr>
           </a:p>
@@ -4780,8 +4390,8 @@
         </p:nvSpPr>
         <p:spPr>
           <a:xfrm>
-            <a:off x="8864922" y="714334"/>
-            <a:ext cx="2171421" cy="1077218"/>
+            <a:off x="9957128" y="1209946"/>
+            <a:ext cx="2171421" cy="1815882"/>
           </a:xfrm>
           <a:prstGeom prst="rect">
             <a:avLst/>
@@ -4805,31 +4415,352 @@
             <a:pPr algn="ctr"/>
             <a:r>
               <a:rPr lang="es-AR" sz="1600" dirty="0"/>
-              <a:t>Indica al usuario qué debe hacer (ejecutar/imaginar un movimiento)</a:t>
-            </a:r>
-            <a:endParaRPr lang="es-UY" sz="1600" dirty="0"/>
+              <a:t>Indica al usuario que movimiento (pie, mano) y qué tipo (ejecución/imaginación) debe realizar el sujeto</a:t>
+            </a:r>
+          </a:p>
+          <a:p>
+            <a:pPr algn="ctr"/>
+            <a:endParaRPr lang="es-AR" sz="1600" dirty="0"/>
+          </a:p>
+          <a:p>
+            <a:pPr algn="ctr"/>
+            <a:r>
+              <a:rPr lang="es-AR" sz="1600" dirty="0">
+                <a:highlight>
+                  <a:srgbClr val="FFFF00"/>
+                </a:highlight>
+              </a:rPr>
+              <a:t>Indicator.py</a:t>
+            </a:r>
+            <a:endParaRPr lang="es-UY" sz="1600" dirty="0">
+              <a:highlight>
+                <a:srgbClr val="FFFF00"/>
+              </a:highlight>
+            </a:endParaRPr>
+          </a:p>
+        </p:txBody>
+      </p:sp>
+      <p:sp>
+        <p:nvSpPr>
+          <p:cNvPr id="100" name="TextBox 99">
+            <a:extLst>
+              <a:ext uri="{FF2B5EF4-FFF2-40B4-BE49-F238E27FC236}">
+                <a16:creationId xmlns:a16="http://schemas.microsoft.com/office/drawing/2014/main" id="{6103C743-2698-4024-974F-4FDA19085B1E}"/>
+              </a:ext>
+            </a:extLst>
+          </p:cNvPr>
+          <p:cNvSpPr txBox="1"/>
+          <p:nvPr/>
+        </p:nvSpPr>
+        <p:spPr>
+          <a:xfrm>
+            <a:off x="1764177" y="4544123"/>
+            <a:ext cx="2629669" cy="315792"/>
+          </a:xfrm>
+          <a:prstGeom prst="rect">
+            <a:avLst/>
+          </a:prstGeom>
+          <a:solidFill>
+            <a:schemeClr val="bg1"/>
+          </a:solidFill>
+          <a:ln>
+            <a:solidFill>
+              <a:srgbClr val="002060"/>
+            </a:solidFill>
+            <a:prstDash val="dash"/>
+          </a:ln>
+        </p:spPr>
+        <p:txBody>
+          <a:bodyPr wrap="square" rtlCol="0">
+            <a:spAutoFit/>
+          </a:bodyPr>
+          <a:lstStyle/>
+          <a:p>
+            <a:pPr algn="ctr"/>
+            <a:r>
+              <a:rPr lang="es-AR" sz="1452" dirty="0"/>
+              <a:t>Gestiona tiempos</a:t>
+            </a:r>
+            <a:endParaRPr lang="es-UY" sz="1452" dirty="0"/>
+          </a:p>
+        </p:txBody>
+      </p:sp>
+      <p:sp>
+        <p:nvSpPr>
+          <p:cNvPr id="35" name="TextBox 34">
+            <a:extLst>
+              <a:ext uri="{FF2B5EF4-FFF2-40B4-BE49-F238E27FC236}">
+                <a16:creationId xmlns:a16="http://schemas.microsoft.com/office/drawing/2014/main" id="{9B0BD3CB-A1E6-4DC8-B272-FF1519794856}"/>
+              </a:ext>
+            </a:extLst>
+          </p:cNvPr>
+          <p:cNvSpPr txBox="1"/>
+          <p:nvPr/>
+        </p:nvSpPr>
+        <p:spPr>
+          <a:xfrm>
+            <a:off x="1764177" y="4103721"/>
+            <a:ext cx="2629669" cy="315792"/>
+          </a:xfrm>
+          <a:prstGeom prst="rect">
+            <a:avLst/>
+          </a:prstGeom>
+          <a:solidFill>
+            <a:schemeClr val="bg1"/>
+          </a:solidFill>
+          <a:ln>
+            <a:solidFill>
+              <a:srgbClr val="002060"/>
+            </a:solidFill>
+            <a:prstDash val="dash"/>
+          </a:ln>
+        </p:spPr>
+        <p:txBody>
+          <a:bodyPr wrap="square" rtlCol="0">
+            <a:spAutoFit/>
+          </a:bodyPr>
+          <a:lstStyle/>
+          <a:p>
+            <a:pPr algn="ctr"/>
+            <a:r>
+              <a:rPr lang="es-AR" sz="1452" dirty="0"/>
+              <a:t>Genera y Registra eventos</a:t>
+            </a:r>
+            <a:endParaRPr lang="es-UY" sz="1452" dirty="0"/>
+          </a:p>
+        </p:txBody>
+      </p:sp>
+      <p:sp>
+        <p:nvSpPr>
+          <p:cNvPr id="36" name="TextBox 35">
+            <a:extLst>
+              <a:ext uri="{FF2B5EF4-FFF2-40B4-BE49-F238E27FC236}">
+                <a16:creationId xmlns:a16="http://schemas.microsoft.com/office/drawing/2014/main" id="{CDA3189F-6290-498E-B1C3-A00778530965}"/>
+              </a:ext>
+            </a:extLst>
+          </p:cNvPr>
+          <p:cNvSpPr txBox="1"/>
+          <p:nvPr/>
+        </p:nvSpPr>
+        <p:spPr>
+          <a:xfrm>
+            <a:off x="11099978" y="3394411"/>
+            <a:ext cx="2234660" cy="276999"/>
+          </a:xfrm>
+          <a:prstGeom prst="rect">
+            <a:avLst/>
+          </a:prstGeom>
+          <a:noFill/>
+        </p:spPr>
+        <p:txBody>
+          <a:bodyPr wrap="square" rtlCol="0">
+            <a:spAutoFit/>
+          </a:bodyPr>
+          <a:lstStyle/>
+          <a:p>
+            <a:pPr algn="ctr"/>
+            <a:r>
+              <a:rPr lang="es-AR" sz="1200" dirty="0"/>
+              <a:t>Eventos para actualizar pantalla</a:t>
+            </a:r>
+            <a:endParaRPr lang="es-UY" sz="1200" dirty="0"/>
+          </a:p>
+        </p:txBody>
+      </p:sp>
+      <p:sp>
+        <p:nvSpPr>
+          <p:cNvPr id="37" name="Rectangle 36">
+            <a:extLst>
+              <a:ext uri="{FF2B5EF4-FFF2-40B4-BE49-F238E27FC236}">
+                <a16:creationId xmlns:a16="http://schemas.microsoft.com/office/drawing/2014/main" id="{D3568AEB-AA3D-4F16-9285-E9883589DE73}"/>
+              </a:ext>
+            </a:extLst>
+          </p:cNvPr>
+          <p:cNvSpPr/>
+          <p:nvPr/>
+        </p:nvSpPr>
+        <p:spPr>
+          <a:xfrm>
+            <a:off x="1300345" y="724701"/>
+            <a:ext cx="2523301" cy="2370670"/>
+          </a:xfrm>
+          <a:prstGeom prst="rect">
+            <a:avLst/>
+          </a:prstGeom>
+          <a:solidFill>
+            <a:schemeClr val="bg1">
+              <a:lumMod val="75000"/>
+            </a:schemeClr>
+          </a:solidFill>
+          <a:ln>
+            <a:solidFill>
+              <a:schemeClr val="tx1">
+                <a:lumMod val="75000"/>
+                <a:lumOff val="25000"/>
+              </a:schemeClr>
+            </a:solidFill>
+          </a:ln>
+        </p:spPr>
+        <p:style>
+          <a:lnRef idx="2">
+            <a:schemeClr val="accent1">
+              <a:shade val="50000"/>
+            </a:schemeClr>
+          </a:lnRef>
+          <a:fillRef idx="1">
+            <a:schemeClr val="accent1"/>
+          </a:fillRef>
+          <a:effectRef idx="0">
+            <a:schemeClr val="accent1"/>
+          </a:effectRef>
+          <a:fontRef idx="minor">
+            <a:schemeClr val="lt1"/>
+          </a:fontRef>
+        </p:style>
+        <p:txBody>
+          <a:bodyPr rot="0" spcFirstLastPara="0" vertOverflow="overflow" horzOverflow="overflow" vert="horz" wrap="square" lIns="91441" tIns="45720" rIns="91441" bIns="45720" numCol="1" spcCol="0" rtlCol="0" fromWordArt="0" anchor="ctr" anchorCtr="0" forceAA="0" compatLnSpc="1">
+            <a:prstTxWarp prst="textNoShape">
+              <a:avLst/>
+            </a:prstTxWarp>
+            <a:noAutofit/>
+          </a:bodyPr>
+          <a:lstStyle/>
+          <a:p>
+            <a:pPr algn="ctr"/>
+            <a:endParaRPr lang="es-UY" sz="1452"/>
+          </a:p>
+        </p:txBody>
+      </p:sp>
+      <p:sp>
+        <p:nvSpPr>
+          <p:cNvPr id="38" name="TextBox 37">
+            <a:extLst>
+              <a:ext uri="{FF2B5EF4-FFF2-40B4-BE49-F238E27FC236}">
+                <a16:creationId xmlns:a16="http://schemas.microsoft.com/office/drawing/2014/main" id="{81314138-EA98-4C74-A841-26EE07E6636C}"/>
+              </a:ext>
+            </a:extLst>
+          </p:cNvPr>
+          <p:cNvSpPr txBox="1"/>
+          <p:nvPr/>
+        </p:nvSpPr>
+        <p:spPr>
+          <a:xfrm>
+            <a:off x="1743032" y="863944"/>
+            <a:ext cx="1627369" cy="315792"/>
+          </a:xfrm>
+          <a:prstGeom prst="rect">
+            <a:avLst/>
+          </a:prstGeom>
+          <a:noFill/>
+        </p:spPr>
+        <p:txBody>
+          <a:bodyPr wrap="none" rtlCol="0">
+            <a:spAutoFit/>
+          </a:bodyPr>
+          <a:lstStyle/>
+          <a:p>
+            <a:pPr algn="ctr"/>
+            <a:r>
+              <a:rPr lang="es-AR" sz="1452" dirty="0">
+                <a:latin typeface="Berlin Sans FB" panose="020E0602020502020306" pitchFamily="34" charset="0"/>
+              </a:rPr>
+              <a:t>GUI - </a:t>
+            </a:r>
+            <a:r>
+              <a:rPr lang="es-AR" sz="1452" dirty="0" err="1">
+                <a:latin typeface="Berlin Sans FB" panose="020E0602020502020306" pitchFamily="34" charset="0"/>
+              </a:rPr>
+              <a:t>Configurator</a:t>
+            </a:r>
+            <a:endParaRPr lang="es-UY" sz="1452" dirty="0">
+              <a:latin typeface="Berlin Sans FB" panose="020E0602020502020306" pitchFamily="34" charset="0"/>
+            </a:endParaRPr>
+          </a:p>
+        </p:txBody>
+      </p:sp>
+      <p:sp>
+        <p:nvSpPr>
+          <p:cNvPr id="40" name="TextBox 39">
+            <a:extLst>
+              <a:ext uri="{FF2B5EF4-FFF2-40B4-BE49-F238E27FC236}">
+                <a16:creationId xmlns:a16="http://schemas.microsoft.com/office/drawing/2014/main" id="{50770F53-FD8A-4BE2-B250-B70F91773D17}"/>
+              </a:ext>
+            </a:extLst>
+          </p:cNvPr>
+          <p:cNvSpPr txBox="1"/>
+          <p:nvPr/>
+        </p:nvSpPr>
+        <p:spPr>
+          <a:xfrm>
+            <a:off x="1471002" y="1209946"/>
+            <a:ext cx="2171421" cy="1815882"/>
+          </a:xfrm>
+          <a:prstGeom prst="rect">
+            <a:avLst/>
+          </a:prstGeom>
+          <a:solidFill>
+            <a:schemeClr val="bg1"/>
+          </a:solidFill>
+          <a:ln>
+            <a:solidFill>
+              <a:srgbClr val="002060"/>
+            </a:solidFill>
+            <a:prstDash val="dash"/>
+          </a:ln>
+        </p:spPr>
+        <p:txBody>
+          <a:bodyPr wrap="square" rtlCol="0">
+            <a:spAutoFit/>
+          </a:bodyPr>
+          <a:lstStyle/>
+          <a:p>
+            <a:pPr algn="ctr"/>
+            <a:r>
+              <a:rPr lang="es-AR" sz="1600" dirty="0"/>
+              <a:t>Entorno gráfico para que el operador pueda configurar los parámetros de la sesión a ejecutar.</a:t>
+            </a:r>
+          </a:p>
+          <a:p>
+            <a:pPr algn="ctr"/>
+            <a:endParaRPr lang="es-AR" sz="1600" dirty="0"/>
+          </a:p>
+          <a:p>
+            <a:pPr algn="ctr"/>
+            <a:r>
+              <a:rPr lang="es-AR" sz="1600" dirty="0">
+                <a:highlight>
+                  <a:srgbClr val="FFFF00"/>
+                </a:highlight>
+              </a:rPr>
+              <a:t>ConfGUI.py</a:t>
+            </a:r>
+            <a:endParaRPr lang="es-UY" sz="1600" dirty="0">
+              <a:highlight>
+                <a:srgbClr val="FFFF00"/>
+              </a:highlight>
+            </a:endParaRPr>
           </a:p>
         </p:txBody>
       </p:sp>
       <p:cxnSp>
         <p:nvCxnSpPr>
-          <p:cNvPr id="94" name="Straight Arrow Connector 93">
+          <p:cNvPr id="41" name="Straight Arrow Connector 40">
             <a:extLst>
               <a:ext uri="{FF2B5EF4-FFF2-40B4-BE49-F238E27FC236}">
-                <a16:creationId xmlns:a16="http://schemas.microsoft.com/office/drawing/2014/main" id="{EB9CDB59-5F21-49EA-A3AD-3CEC0054F6E0}"/>
+                <a16:creationId xmlns:a16="http://schemas.microsoft.com/office/drawing/2014/main" id="{2F1971CF-3ED7-4D62-95E2-DB410E0C658A}"/>
               </a:ext>
             </a:extLst>
           </p:cNvPr>
           <p:cNvCxnSpPr>
             <a:cxnSpLocks/>
-            <a:stCxn id="84" idx="2"/>
+            <a:endCxn id="84" idx="2"/>
           </p:cNvCxnSpPr>
           <p:nvPr/>
         </p:nvCxnSpPr>
         <p:spPr>
-          <a:xfrm>
-            <a:off x="9955918" y="1968784"/>
-            <a:ext cx="1" cy="457666"/>
+          <a:xfrm flipH="1" flipV="1">
+            <a:off x="11042838" y="3123582"/>
+            <a:ext cx="5280" cy="821670"/>
           </a:xfrm>
           <a:prstGeom prst="straightConnector1">
             <a:avLst/>
@@ -4841,7 +4772,6 @@
                 <a:lumOff val="25000"/>
               </a:schemeClr>
             </a:solidFill>
-            <a:headEnd type="triangle"/>
             <a:tailEnd type="triangle"/>
           </a:ln>
         </p:spPr>
@@ -4860,133 +4790,54 @@
           </a:fontRef>
         </p:style>
       </p:cxnSp>
-      <p:sp>
-        <p:nvSpPr>
-          <p:cNvPr id="100" name="TextBox 99">
+      <p:cxnSp>
+        <p:nvCxnSpPr>
+          <p:cNvPr id="43" name="Straight Arrow Connector 42">
             <a:extLst>
               <a:ext uri="{FF2B5EF4-FFF2-40B4-BE49-F238E27FC236}">
-                <a16:creationId xmlns:a16="http://schemas.microsoft.com/office/drawing/2014/main" id="{6103C743-2698-4024-974F-4FDA19085B1E}"/>
+                <a16:creationId xmlns:a16="http://schemas.microsoft.com/office/drawing/2014/main" id="{95FA198D-4C82-4898-9B48-9EA513310A1F}"/>
               </a:ext>
             </a:extLst>
           </p:cNvPr>
-          <p:cNvSpPr txBox="1"/>
+          <p:cNvCxnSpPr>
+            <a:cxnSpLocks/>
+            <a:stCxn id="37" idx="2"/>
+          </p:cNvCxnSpPr>
           <p:nvPr/>
-        </p:nvSpPr>
-        <p:spPr>
-          <a:xfrm>
-            <a:off x="671972" y="3045521"/>
-            <a:ext cx="2629669" cy="369332"/>
-          </a:xfrm>
-          <a:prstGeom prst="rect">
+        </p:nvCxnSpPr>
+        <p:spPr>
+          <a:xfrm>
+            <a:off x="2561996" y="3095371"/>
+            <a:ext cx="6432" cy="821226"/>
+          </a:xfrm>
+          <a:prstGeom prst="straightConnector1">
             <a:avLst/>
           </a:prstGeom>
-          <a:solidFill>
-            <a:schemeClr val="bg1"/>
-          </a:solidFill>
-          <a:ln>
+          <a:ln w="57150">
             <a:solidFill>
-              <a:srgbClr val="002060"/>
+              <a:schemeClr val="tx1">
+                <a:lumMod val="75000"/>
+                <a:lumOff val="25000"/>
+              </a:schemeClr>
             </a:solidFill>
-            <a:prstDash val="dash"/>
+            <a:tailEnd type="triangle"/>
           </a:ln>
         </p:spPr>
-        <p:txBody>
-          <a:bodyPr wrap="square" rtlCol="0">
-            <a:spAutoFit/>
-          </a:bodyPr>
-          <a:lstStyle/>
-          <a:p>
-            <a:pPr algn="ctr"/>
-            <a:r>
-              <a:rPr lang="es-AR" dirty="0"/>
-              <a:t>Gestiona tiempos</a:t>
-            </a:r>
-            <a:endParaRPr lang="es-UY" dirty="0"/>
-          </a:p>
-        </p:txBody>
-      </p:sp>
-      <p:sp>
-        <p:nvSpPr>
-          <p:cNvPr id="35" name="TextBox 34">
-            <a:extLst>
-              <a:ext uri="{FF2B5EF4-FFF2-40B4-BE49-F238E27FC236}">
-                <a16:creationId xmlns:a16="http://schemas.microsoft.com/office/drawing/2014/main" id="{9B0BD3CB-A1E6-4DC8-B272-FF1519794856}"/>
-              </a:ext>
-            </a:extLst>
-          </p:cNvPr>
-          <p:cNvSpPr txBox="1"/>
-          <p:nvPr/>
-        </p:nvSpPr>
-        <p:spPr>
-          <a:xfrm>
-            <a:off x="671972" y="2605119"/>
-            <a:ext cx="2629669" cy="369332"/>
-          </a:xfrm>
-          <a:prstGeom prst="rect">
-            <a:avLst/>
-          </a:prstGeom>
-          <a:solidFill>
-            <a:schemeClr val="bg1"/>
-          </a:solidFill>
-          <a:ln>
-            <a:solidFill>
-              <a:srgbClr val="002060"/>
-            </a:solidFill>
-            <a:prstDash val="dash"/>
-          </a:ln>
-        </p:spPr>
-        <p:txBody>
-          <a:bodyPr wrap="square" rtlCol="0">
-            <a:spAutoFit/>
-          </a:bodyPr>
-          <a:lstStyle/>
-          <a:p>
-            <a:pPr algn="ctr"/>
-            <a:r>
-              <a:rPr lang="es-AR" dirty="0"/>
-              <a:t>Genera y Registra eventos</a:t>
-            </a:r>
-            <a:endParaRPr lang="es-UY" dirty="0"/>
-          </a:p>
-        </p:txBody>
-      </p:sp>
-      <p:sp>
-        <p:nvSpPr>
-          <p:cNvPr id="36" name="TextBox 35">
-            <a:extLst>
-              <a:ext uri="{FF2B5EF4-FFF2-40B4-BE49-F238E27FC236}">
-                <a16:creationId xmlns:a16="http://schemas.microsoft.com/office/drawing/2014/main" id="{CDA3189F-6290-498E-B1C3-A00778530965}"/>
-              </a:ext>
-            </a:extLst>
-          </p:cNvPr>
-          <p:cNvSpPr txBox="1"/>
-          <p:nvPr/>
-        </p:nvSpPr>
-        <p:spPr>
-          <a:xfrm>
-            <a:off x="10016047" y="2046525"/>
-            <a:ext cx="954173" cy="276999"/>
-          </a:xfrm>
-          <a:prstGeom prst="rect">
-            <a:avLst/>
-          </a:prstGeom>
-          <a:noFill/>
-        </p:spPr>
-        <p:txBody>
-          <a:bodyPr wrap="square" rtlCol="0">
-            <a:spAutoFit/>
-          </a:bodyPr>
-          <a:lstStyle/>
-          <a:p>
-            <a:pPr algn="ctr"/>
-            <a:r>
-              <a:rPr lang="es-AR" sz="1200" dirty="0"/>
-              <a:t>Eventos</a:t>
-            </a:r>
-            <a:endParaRPr lang="es-UY" sz="1200" dirty="0"/>
-          </a:p>
-        </p:txBody>
-      </p:sp>
+        <p:style>
+          <a:lnRef idx="1">
+            <a:schemeClr val="accent1"/>
+          </a:lnRef>
+          <a:fillRef idx="0">
+            <a:schemeClr val="accent1"/>
+          </a:fillRef>
+          <a:effectRef idx="0">
+            <a:schemeClr val="accent1"/>
+          </a:effectRef>
+          <a:fontRef idx="minor">
+            <a:schemeClr val="tx1"/>
+          </a:fontRef>
+        </p:style>
+      </p:cxnSp>
     </p:spTree>
     <p:extLst>
       <p:ext uri="{BB962C8B-B14F-4D97-AF65-F5344CB8AC3E}">
@@ -5003,7 +4854,7 @@
 <file path=ppt/theme/theme1.xml><?xml version="1.0" encoding="utf-8"?>
 <a:theme xmlns:a="http://schemas.openxmlformats.org/drawingml/2006/main" name="Office Theme">
   <a:themeElements>
-    <a:clrScheme name="Office">
+    <a:clrScheme name="Office Theme">
       <a:dk1>
         <a:sysClr val="windowText" lastClr="000000"/>
       </a:dk1>
@@ -5041,7 +4892,7 @@
         <a:srgbClr val="954F72"/>
       </a:folHlink>
     </a:clrScheme>
-    <a:fontScheme name="Office">
+    <a:fontScheme name="Office Theme">
       <a:majorFont>
         <a:latin typeface="Calibri Light" panose="020F0302020204030204"/>
         <a:ea typeface=""/>
@@ -5076,23 +4927,6 @@
         <a:font script="Viet" typeface="Times New Roman"/>
         <a:font script="Uigh" typeface="Microsoft Uighur"/>
         <a:font script="Geor" typeface="Sylfaen"/>
-        <a:font script="Armn" typeface="Arial"/>
-        <a:font script="Bugi" typeface="Leelawadee UI"/>
-        <a:font script="Bopo" typeface="Microsoft JhengHei"/>
-        <a:font script="Java" typeface="Javanese Text"/>
-        <a:font script="Lisu" typeface="Segoe UI"/>
-        <a:font script="Mymr" typeface="Myanmar Text"/>
-        <a:font script="Nkoo" typeface="Ebrima"/>
-        <a:font script="Olck" typeface="Nirmala UI"/>
-        <a:font script="Osma" typeface="Ebrima"/>
-        <a:font script="Phag" typeface="Phagspa"/>
-        <a:font script="Syrn" typeface="Estrangelo Edessa"/>
-        <a:font script="Syrj" typeface="Estrangelo Edessa"/>
-        <a:font script="Syre" typeface="Estrangelo Edessa"/>
-        <a:font script="Sora" typeface="Nirmala UI"/>
-        <a:font script="Tale" typeface="Microsoft Tai Le"/>
-        <a:font script="Talu" typeface="Microsoft New Tai Lue"/>
-        <a:font script="Tfng" typeface="Ebrima"/>
       </a:majorFont>
       <a:minorFont>
         <a:latin typeface="Calibri" panose="020F0502020204030204"/>
@@ -5128,26 +4962,9 @@
         <a:font script="Viet" typeface="Arial"/>
         <a:font script="Uigh" typeface="Microsoft Uighur"/>
         <a:font script="Geor" typeface="Sylfaen"/>
-        <a:font script="Armn" typeface="Arial"/>
-        <a:font script="Bugi" typeface="Leelawadee UI"/>
-        <a:font script="Bopo" typeface="Microsoft JhengHei"/>
-        <a:font script="Java" typeface="Javanese Text"/>
-        <a:font script="Lisu" typeface="Segoe UI"/>
-        <a:font script="Mymr" typeface="Myanmar Text"/>
-        <a:font script="Nkoo" typeface="Ebrima"/>
-        <a:font script="Olck" typeface="Nirmala UI"/>
-        <a:font script="Osma" typeface="Ebrima"/>
-        <a:font script="Phag" typeface="Phagspa"/>
-        <a:font script="Syrn" typeface="Estrangelo Edessa"/>
-        <a:font script="Syrj" typeface="Estrangelo Edessa"/>
-        <a:font script="Syre" typeface="Estrangelo Edessa"/>
-        <a:font script="Sora" typeface="Nirmala UI"/>
-        <a:font script="Tale" typeface="Microsoft Tai Le"/>
-        <a:font script="Talu" typeface="Microsoft New Tai Lue"/>
-        <a:font script="Tfng" typeface="Ebrima"/>
       </a:minorFont>
     </a:fontScheme>
-    <a:fmtScheme name="Office">
+    <a:fmtScheme name="Office Theme">
       <a:fillStyleLst>
         <a:solidFill>
           <a:schemeClr val="phClr"/>

</xml_diff>